<commit_message>
Added some presenters notes
</commit_message>
<xml_diff>
--- a/docs/presentations/SYSC3010-teamF5-test-review.pptx
+++ b/docs/presentations/SYSC3010-teamF5-test-review.pptx
@@ -234,7 +234,7 @@
           <a:p>
             <a:fld id="{48B232C6-1FF7-46FF-8CAF-89BA555C4B4E}" type="datetimeFigureOut">
               <a:rPr lang="en-CA" smtClean="0"/>
-              <a:t>12/03/2017</a:t>
+              <a:t>2017-03-12</a:t>
             </a:fld>
             <a:endParaRPr lang="en-CA"/>
           </a:p>
@@ -808,7 +808,20 @@
           <a:p>
             <a:r>
               <a:rPr lang="en-US" baseline="0" dirty="0"/>
-              <a:t>The system should be highly modular, to make adding new modules easy, as well as encourage the use of modules</a:t>
+              <a:t>The system should be highly modular, to make adding new modules easy, as well as encourage the use of </a:t>
+            </a:r>
+            <a:r>
+              <a:rPr lang="en-US" baseline="0" dirty="0" smtClean="0"/>
+              <a:t>modules</a:t>
+            </a:r>
+          </a:p>
+          <a:p>
+            <a:endParaRPr lang="en-US" baseline="0" dirty="0" smtClean="0"/>
+          </a:p>
+          <a:p>
+            <a:r>
+              <a:rPr lang="en-US" baseline="0" dirty="0" smtClean="0"/>
+              <a:t>-Server stress tester ensures, timely delivery</a:t>
             </a:r>
             <a:endParaRPr lang="en-US" dirty="0"/>
           </a:p>
@@ -851,6 +864,226 @@
 </file>
 
 <file path=ppt/notesSlides/notesSlide11.xml><?xml version="1.0" encoding="utf-8"?>
+<p:notes xmlns:a="http://schemas.openxmlformats.org/drawingml/2006/main" xmlns:r="http://schemas.openxmlformats.org/officeDocument/2006/relationships" xmlns:p="http://schemas.openxmlformats.org/presentationml/2006/main">
+  <p:cSld>
+    <p:spTree>
+      <p:nvGrpSpPr>
+        <p:cNvPr id="1" name=""/>
+        <p:cNvGrpSpPr/>
+        <p:nvPr/>
+      </p:nvGrpSpPr>
+      <p:grpSpPr>
+        <a:xfrm>
+          <a:off x="0" y="0"/>
+          <a:ext cx="0" cy="0"/>
+          <a:chOff x="0" y="0"/>
+          <a:chExt cx="0" cy="0"/>
+        </a:xfrm>
+      </p:grpSpPr>
+      <p:sp>
+        <p:nvSpPr>
+          <p:cNvPr id="2" name="Slide Image Placeholder 1"/>
+          <p:cNvSpPr>
+            <a:spLocks noGrp="1" noRot="1" noChangeAspect="1"/>
+          </p:cNvSpPr>
+          <p:nvPr>
+            <p:ph type="sldImg"/>
+          </p:nvPr>
+        </p:nvSpPr>
+        <p:spPr/>
+      </p:sp>
+      <p:sp>
+        <p:nvSpPr>
+          <p:cNvPr id="3" name="Notes Placeholder 2"/>
+          <p:cNvSpPr>
+            <a:spLocks noGrp="1"/>
+          </p:cNvSpPr>
+          <p:nvPr>
+            <p:ph type="body" idx="1"/>
+          </p:nvPr>
+        </p:nvSpPr>
+        <p:spPr/>
+        <p:txBody>
+          <a:bodyPr/>
+          <a:lstStyle/>
+          <a:p>
+            <a:r>
+              <a:rPr lang="en-US" dirty="0" smtClean="0"/>
+              <a:t>-Delegation to modules</a:t>
+            </a:r>
+          </a:p>
+          <a:p>
+            <a:endParaRPr lang="en-US" dirty="0" smtClean="0"/>
+          </a:p>
+          <a:p>
+            <a:r>
+              <a:rPr lang="en-US" dirty="0" smtClean="0"/>
+              <a:t>Server Event Timer:</a:t>
+            </a:r>
+          </a:p>
+          <a:p>
+            <a:r>
+              <a:rPr lang="en-US" dirty="0" smtClean="0"/>
+              <a:t>-Thread</a:t>
+            </a:r>
+            <a:r>
+              <a:rPr lang="en-US" baseline="0" dirty="0" smtClean="0"/>
+              <a:t> that sleeps until the required time</a:t>
+            </a:r>
+          </a:p>
+          <a:p>
+            <a:endParaRPr lang="en-US" dirty="0"/>
+          </a:p>
+        </p:txBody>
+      </p:sp>
+      <p:sp>
+        <p:nvSpPr>
+          <p:cNvPr id="4" name="Slide Number Placeholder 3"/>
+          <p:cNvSpPr>
+            <a:spLocks noGrp="1"/>
+          </p:cNvSpPr>
+          <p:nvPr>
+            <p:ph type="sldNum" sz="quarter" idx="10"/>
+          </p:nvPr>
+        </p:nvSpPr>
+        <p:spPr/>
+        <p:txBody>
+          <a:bodyPr/>
+          <a:lstStyle/>
+          <a:p>
+            <a:fld id="{377211F2-1C6A-4F10-9506-C7C062274F4F}" type="slidenum">
+              <a:rPr lang="en-CA" smtClean="0"/>
+              <a:t>24</a:t>
+            </a:fld>
+            <a:endParaRPr lang="en-CA"/>
+          </a:p>
+        </p:txBody>
+      </p:sp>
+    </p:spTree>
+    <p:extLst>
+      <p:ext uri="{BB962C8B-B14F-4D97-AF65-F5344CB8AC3E}">
+        <p14:creationId xmlns:p14="http://schemas.microsoft.com/office/powerpoint/2010/main" val="210964540"/>
+      </p:ext>
+    </p:extLst>
+  </p:cSld>
+  <p:clrMapOvr>
+    <a:masterClrMapping/>
+  </p:clrMapOvr>
+</p:notes>
+</file>
+
+<file path=ppt/notesSlides/notesSlide12.xml><?xml version="1.0" encoding="utf-8"?>
+<p:notes xmlns:a="http://schemas.openxmlformats.org/drawingml/2006/main" xmlns:r="http://schemas.openxmlformats.org/officeDocument/2006/relationships" xmlns:p="http://schemas.openxmlformats.org/presentationml/2006/main">
+  <p:cSld>
+    <p:spTree>
+      <p:nvGrpSpPr>
+        <p:cNvPr id="1" name=""/>
+        <p:cNvGrpSpPr/>
+        <p:nvPr/>
+      </p:nvGrpSpPr>
+      <p:grpSpPr>
+        <a:xfrm>
+          <a:off x="0" y="0"/>
+          <a:ext cx="0" cy="0"/>
+          <a:chOff x="0" y="0"/>
+          <a:chExt cx="0" cy="0"/>
+        </a:xfrm>
+      </p:grpSpPr>
+      <p:sp>
+        <p:nvSpPr>
+          <p:cNvPr id="2" name="Slide Image Placeholder 1"/>
+          <p:cNvSpPr>
+            <a:spLocks noGrp="1" noRot="1" noChangeAspect="1"/>
+          </p:cNvSpPr>
+          <p:nvPr>
+            <p:ph type="sldImg"/>
+          </p:nvPr>
+        </p:nvSpPr>
+        <p:spPr/>
+      </p:sp>
+      <p:sp>
+        <p:nvSpPr>
+          <p:cNvPr id="3" name="Notes Placeholder 2"/>
+          <p:cNvSpPr>
+            <a:spLocks noGrp="1"/>
+          </p:cNvSpPr>
+          <p:nvPr>
+            <p:ph type="body" idx="1"/>
+          </p:nvPr>
+        </p:nvSpPr>
+        <p:spPr/>
+        <p:txBody>
+          <a:bodyPr/>
+          <a:lstStyle/>
+          <a:p>
+            <a:r>
+              <a:rPr lang="en-US" dirty="0" smtClean="0"/>
+              <a:t>The</a:t>
+            </a:r>
+            <a:r>
+              <a:rPr lang="en-US" baseline="0" dirty="0" smtClean="0"/>
+              <a:t> </a:t>
+            </a:r>
+            <a:r>
+              <a:rPr lang="en-US" baseline="0" dirty="0" err="1" smtClean="0"/>
+              <a:t>RPi</a:t>
+            </a:r>
+            <a:r>
+              <a:rPr lang="en-US" baseline="0" dirty="0" smtClean="0"/>
+              <a:t> relays control a 120V rated relay that connects the coffee maker to a 120V AC wall voltage.</a:t>
+            </a:r>
+          </a:p>
+          <a:p>
+            <a:r>
+              <a:rPr lang="en-US" baseline="0" dirty="0" smtClean="0"/>
+              <a:t>A 130 ohm resistor combined with an LED demonstrates that current is present. </a:t>
+            </a:r>
+          </a:p>
+          <a:p>
+            <a:r>
+              <a:rPr lang="en-US" baseline="0" dirty="0" smtClean="0"/>
+              <a:t>Water is boiled by a heating element.</a:t>
+            </a:r>
+          </a:p>
+        </p:txBody>
+      </p:sp>
+      <p:sp>
+        <p:nvSpPr>
+          <p:cNvPr id="4" name="Slide Number Placeholder 3"/>
+          <p:cNvSpPr>
+            <a:spLocks noGrp="1"/>
+          </p:cNvSpPr>
+          <p:nvPr>
+            <p:ph type="sldNum" sz="quarter" idx="10"/>
+          </p:nvPr>
+        </p:nvSpPr>
+        <p:spPr/>
+        <p:txBody>
+          <a:bodyPr/>
+          <a:lstStyle/>
+          <a:p>
+            <a:fld id="{377211F2-1C6A-4F10-9506-C7C062274F4F}" type="slidenum">
+              <a:rPr lang="en-CA" smtClean="0"/>
+              <a:t>25</a:t>
+            </a:fld>
+            <a:endParaRPr lang="en-CA"/>
+          </a:p>
+        </p:txBody>
+      </p:sp>
+    </p:spTree>
+    <p:extLst>
+      <p:ext uri="{BB962C8B-B14F-4D97-AF65-F5344CB8AC3E}">
+        <p14:creationId xmlns:p14="http://schemas.microsoft.com/office/powerpoint/2010/main" val="235079551"/>
+      </p:ext>
+    </p:extLst>
+  </p:cSld>
+  <p:clrMapOvr>
+    <a:masterClrMapping/>
+  </p:clrMapOvr>
+</p:notes>
+</file>
+
+<file path=ppt/notesSlides/notesSlide13.xml><?xml version="1.0" encoding="utf-8"?>
 <p:notes xmlns:a="http://schemas.openxmlformats.org/drawingml/2006/main" xmlns:r="http://schemas.openxmlformats.org/officeDocument/2006/relationships" xmlns:p="http://schemas.openxmlformats.org/presentationml/2006/main">
   <p:cSld>
     <p:spTree>
@@ -2270,7 +2503,7 @@
           <a:p>
             <a:fld id="{96DFF08F-DC6B-4601-B491-B0F83F6DD2DA}" type="datetimeFigureOut">
               <a:rPr lang="en-US" smtClean="0"/>
-              <a:t>3/12/2017</a:t>
+              <a:t>3/12/17</a:t>
             </a:fld>
             <a:endParaRPr lang="en-US" dirty="0"/>
           </a:p>
@@ -2483,7 +2716,7 @@
           <a:p>
             <a:fld id="{96DFF08F-DC6B-4601-B491-B0F83F6DD2DA}" type="datetimeFigureOut">
               <a:rPr lang="en-US" smtClean="0"/>
-              <a:t>3/12/2017</a:t>
+              <a:t>3/12/17</a:t>
             </a:fld>
             <a:endParaRPr lang="en-US" dirty="0"/>
           </a:p>
@@ -2739,7 +2972,7 @@
           <a:p>
             <a:fld id="{96DFF08F-DC6B-4601-B491-B0F83F6DD2DA}" type="datetimeFigureOut">
               <a:rPr lang="en-US" smtClean="0"/>
-              <a:t>3/12/2017</a:t>
+              <a:t>3/12/17</a:t>
             </a:fld>
             <a:endParaRPr lang="en-US" dirty="0"/>
           </a:p>
@@ -2909,7 +3142,7 @@
           <a:p>
             <a:fld id="{96DFF08F-DC6B-4601-B491-B0F83F6DD2DA}" type="datetimeFigureOut">
               <a:rPr lang="en-US" smtClean="0"/>
-              <a:t>3/12/2017</a:t>
+              <a:t>3/12/17</a:t>
             </a:fld>
             <a:endParaRPr lang="en-US" dirty="0"/>
           </a:p>
@@ -3253,7 +3486,7 @@
             <a:fld id="{96DFF08F-DC6B-4601-B491-B0F83F6DD2DA}" type="datetimeFigureOut">
               <a:rPr lang="en-US" smtClean="0"/>
               <a:pPr/>
-              <a:t>3/12/2017</a:t>
+              <a:t>3/12/17</a:t>
             </a:fld>
             <a:endParaRPr lang="en-US" dirty="0"/>
           </a:p>
@@ -3529,7 +3762,7 @@
           <a:p>
             <a:fld id="{96DFF08F-DC6B-4601-B491-B0F83F6DD2DA}" type="datetimeFigureOut">
               <a:rPr lang="en-US" smtClean="0"/>
-              <a:t>3/12/2017</a:t>
+              <a:t>3/12/17</a:t>
             </a:fld>
             <a:endParaRPr lang="en-US" dirty="0"/>
           </a:p>
@@ -3913,7 +4146,7 @@
           <a:p>
             <a:fld id="{96DFF08F-DC6B-4601-B491-B0F83F6DD2DA}" type="datetimeFigureOut">
               <a:rPr lang="en-US" smtClean="0"/>
-              <a:t>3/12/2017</a:t>
+              <a:t>3/12/17</a:t>
             </a:fld>
             <a:endParaRPr lang="en-US" dirty="0"/>
           </a:p>
@@ -4036,7 +4269,7 @@
           <a:p>
             <a:fld id="{96DFF08F-DC6B-4601-B491-B0F83F6DD2DA}" type="datetimeFigureOut">
               <a:rPr lang="en-US" smtClean="0"/>
-              <a:t>3/12/2017</a:t>
+              <a:t>3/12/17</a:t>
             </a:fld>
             <a:endParaRPr lang="en-US" dirty="0"/>
           </a:p>
@@ -4207,7 +4440,7 @@
           <a:p>
             <a:fld id="{96DFF08F-DC6B-4601-B491-B0F83F6DD2DA}" type="datetimeFigureOut">
               <a:rPr lang="en-US" smtClean="0"/>
-              <a:t>3/12/2017</a:t>
+              <a:t>3/12/17</a:t>
             </a:fld>
             <a:endParaRPr lang="en-US" dirty="0"/>
           </a:p>
@@ -4566,7 +4799,7 @@
           <a:p>
             <a:fld id="{96DFF08F-DC6B-4601-B491-B0F83F6DD2DA}" type="datetimeFigureOut">
               <a:rPr lang="en-US" smtClean="0"/>
-              <a:t>3/12/2017</a:t>
+              <a:t>3/12/17</a:t>
             </a:fld>
             <a:endParaRPr lang="en-US" dirty="0"/>
           </a:p>
@@ -4948,7 +5181,7 @@
           <a:p>
             <a:fld id="{96DFF08F-DC6B-4601-B491-B0F83F6DD2DA}" type="datetimeFigureOut">
               <a:rPr lang="en-US" smtClean="0"/>
-              <a:t>3/12/2017</a:t>
+              <a:t>3/12/17</a:t>
             </a:fld>
             <a:endParaRPr lang="en-US" dirty="0"/>
           </a:p>
@@ -5236,7 +5469,7 @@
             <a:fld id="{96DFF08F-DC6B-4601-B491-B0F83F6DD2DA}" type="datetimeFigureOut">
               <a:rPr lang="en-US" smtClean="0"/>
               <a:pPr/>
-              <a:t>3/12/2017</a:t>
+              <a:t>3/12/17</a:t>
             </a:fld>
             <a:endParaRPr lang="en-US" dirty="0"/>
           </a:p>
@@ -7035,35 +7268,35 @@
                 <a:gridCol w="894599">
                   <a:extLst>
                     <a:ext uri="{9D8B030D-6E8A-4147-A177-3AD203B41FA5}">
-                      <a16:colId xmlns:a16="http://schemas.microsoft.com/office/drawing/2014/main" xmlns="" val="3950110134"/>
+                      <a16:colId xmlns="" xmlns:a16="http://schemas.microsoft.com/office/drawing/2014/main" val="3950110134"/>
                     </a:ext>
                   </a:extLst>
                 </a:gridCol>
                 <a:gridCol w="2089899">
                   <a:extLst>
                     <a:ext uri="{9D8B030D-6E8A-4147-A177-3AD203B41FA5}">
-                      <a16:colId xmlns:a16="http://schemas.microsoft.com/office/drawing/2014/main" xmlns="" val="3506418350"/>
+                      <a16:colId xmlns="" xmlns:a16="http://schemas.microsoft.com/office/drawing/2014/main" val="3506418350"/>
                     </a:ext>
                   </a:extLst>
                 </a:gridCol>
                 <a:gridCol w="1638300">
                   <a:extLst>
                     <a:ext uri="{9D8B030D-6E8A-4147-A177-3AD203B41FA5}">
-                      <a16:colId xmlns:a16="http://schemas.microsoft.com/office/drawing/2014/main" xmlns="" val="3436258832"/>
+                      <a16:colId xmlns="" xmlns:a16="http://schemas.microsoft.com/office/drawing/2014/main" val="3436258832"/>
                     </a:ext>
                   </a:extLst>
                 </a:gridCol>
                 <a:gridCol w="3924300">
                   <a:extLst>
                     <a:ext uri="{9D8B030D-6E8A-4147-A177-3AD203B41FA5}">
-                      <a16:colId xmlns:a16="http://schemas.microsoft.com/office/drawing/2014/main" xmlns="" val="927178543"/>
+                      <a16:colId xmlns="" xmlns:a16="http://schemas.microsoft.com/office/drawing/2014/main" val="927178543"/>
                     </a:ext>
                   </a:extLst>
                 </a:gridCol>
                 <a:gridCol w="3644900">
                   <a:extLst>
                     <a:ext uri="{9D8B030D-6E8A-4147-A177-3AD203B41FA5}">
-                      <a16:colId xmlns:a16="http://schemas.microsoft.com/office/drawing/2014/main" xmlns="" val="1058635423"/>
+                      <a16:colId xmlns="" xmlns:a16="http://schemas.microsoft.com/office/drawing/2014/main" val="1058635423"/>
                     </a:ext>
                   </a:extLst>
                 </a:gridCol>
@@ -7156,7 +7389,7 @@
                 </a:tc>
                 <a:extLst>
                   <a:ext uri="{0D108BD9-81ED-4DB2-BD59-A6C34878D82A}">
-                    <a16:rowId xmlns:a16="http://schemas.microsoft.com/office/drawing/2014/main" xmlns="" val="2518014868"/>
+                    <a16:rowId xmlns="" xmlns:a16="http://schemas.microsoft.com/office/drawing/2014/main" val="2518014868"/>
                   </a:ext>
                 </a:extLst>
               </a:tr>
@@ -7269,7 +7502,7 @@
                 </a:tc>
                 <a:extLst>
                   <a:ext uri="{0D108BD9-81ED-4DB2-BD59-A6C34878D82A}">
-                    <a16:rowId xmlns:a16="http://schemas.microsoft.com/office/drawing/2014/main" xmlns="" val="1506722424"/>
+                    <a16:rowId xmlns="" xmlns:a16="http://schemas.microsoft.com/office/drawing/2014/main" val="1506722424"/>
                   </a:ext>
                 </a:extLst>
               </a:tr>
@@ -7407,7 +7640,7 @@
                 </a:tc>
                 <a:extLst>
                   <a:ext uri="{0D108BD9-81ED-4DB2-BD59-A6C34878D82A}">
-                    <a16:rowId xmlns:a16="http://schemas.microsoft.com/office/drawing/2014/main" xmlns="" val="1020769687"/>
+                    <a16:rowId xmlns="" xmlns:a16="http://schemas.microsoft.com/office/drawing/2014/main" val="1020769687"/>
                   </a:ext>
                 </a:extLst>
               </a:tr>
@@ -7537,7 +7770,7 @@
                 </a:tc>
                 <a:extLst>
                   <a:ext uri="{0D108BD9-81ED-4DB2-BD59-A6C34878D82A}">
-                    <a16:rowId xmlns:a16="http://schemas.microsoft.com/office/drawing/2014/main" xmlns="" val="4009803894"/>
+                    <a16:rowId xmlns="" xmlns:a16="http://schemas.microsoft.com/office/drawing/2014/main" val="4009803894"/>
                   </a:ext>
                 </a:extLst>
               </a:tr>
@@ -7675,7 +7908,7 @@
                 </a:tc>
                 <a:extLst>
                   <a:ext uri="{0D108BD9-81ED-4DB2-BD59-A6C34878D82A}">
-                    <a16:rowId xmlns:a16="http://schemas.microsoft.com/office/drawing/2014/main" xmlns="" val="3597353604"/>
+                    <a16:rowId xmlns="" xmlns:a16="http://schemas.microsoft.com/office/drawing/2014/main" val="3597353604"/>
                   </a:ext>
                 </a:extLst>
               </a:tr>
@@ -7816,7 +8049,7 @@
                 </a:tc>
                 <a:extLst>
                   <a:ext uri="{0D108BD9-81ED-4DB2-BD59-A6C34878D82A}">
-                    <a16:rowId xmlns:a16="http://schemas.microsoft.com/office/drawing/2014/main" xmlns="" val="905511772"/>
+                    <a16:rowId xmlns="" xmlns:a16="http://schemas.microsoft.com/office/drawing/2014/main" val="905511772"/>
                   </a:ext>
                 </a:extLst>
               </a:tr>
@@ -7957,7 +8190,7 @@
                 </a:tc>
                 <a:extLst>
                   <a:ext uri="{0D108BD9-81ED-4DB2-BD59-A6C34878D82A}">
-                    <a16:rowId xmlns:a16="http://schemas.microsoft.com/office/drawing/2014/main" xmlns="" val="3520352664"/>
+                    <a16:rowId xmlns="" xmlns:a16="http://schemas.microsoft.com/office/drawing/2014/main" val="3520352664"/>
                   </a:ext>
                 </a:extLst>
               </a:tr>
@@ -8101,7 +8334,7 @@
                 </a:tc>
                 <a:extLst>
                   <a:ext uri="{0D108BD9-81ED-4DB2-BD59-A6C34878D82A}">
-                    <a16:rowId xmlns:a16="http://schemas.microsoft.com/office/drawing/2014/main" xmlns="" val="1210360995"/>
+                    <a16:rowId xmlns="" xmlns:a16="http://schemas.microsoft.com/office/drawing/2014/main" val="1210360995"/>
                   </a:ext>
                 </a:extLst>
               </a:tr>
@@ -8232,7 +8465,7 @@
                 </a:tc>
                 <a:extLst>
                   <a:ext uri="{0D108BD9-81ED-4DB2-BD59-A6C34878D82A}">
-                    <a16:rowId xmlns:a16="http://schemas.microsoft.com/office/drawing/2014/main" xmlns="" val="10008"/>
+                    <a16:rowId xmlns="" xmlns:a16="http://schemas.microsoft.com/office/drawing/2014/main" val="10008"/>
                   </a:ext>
                 </a:extLst>
               </a:tr>
@@ -8369,7 +8602,7 @@
                 </a:tc>
                 <a:extLst>
                   <a:ext uri="{0D108BD9-81ED-4DB2-BD59-A6C34878D82A}">
-                    <a16:rowId xmlns:a16="http://schemas.microsoft.com/office/drawing/2014/main" xmlns="" val="10009"/>
+                    <a16:rowId xmlns="" xmlns:a16="http://schemas.microsoft.com/office/drawing/2014/main" val="10009"/>
                   </a:ext>
                 </a:extLst>
               </a:tr>
@@ -9520,35 +9753,35 @@
                 <a:gridCol w="576650">
                   <a:extLst>
                     <a:ext uri="{9D8B030D-6E8A-4147-A177-3AD203B41FA5}">
-                      <a16:colId xmlns:a16="http://schemas.microsoft.com/office/drawing/2014/main" xmlns="" val="3950110134"/>
+                      <a16:colId xmlns="" xmlns:a16="http://schemas.microsoft.com/office/drawing/2014/main" val="3950110134"/>
                     </a:ext>
                   </a:extLst>
                 </a:gridCol>
                 <a:gridCol w="2054479">
                   <a:extLst>
                     <a:ext uri="{9D8B030D-6E8A-4147-A177-3AD203B41FA5}">
-                      <a16:colId xmlns:a16="http://schemas.microsoft.com/office/drawing/2014/main" xmlns="" val="3506418350"/>
+                      <a16:colId xmlns="" xmlns:a16="http://schemas.microsoft.com/office/drawing/2014/main" val="3506418350"/>
                     </a:ext>
                   </a:extLst>
                 </a:gridCol>
                 <a:gridCol w="2040618">
                   <a:extLst>
                     <a:ext uri="{9D8B030D-6E8A-4147-A177-3AD203B41FA5}">
-                      <a16:colId xmlns:a16="http://schemas.microsoft.com/office/drawing/2014/main" xmlns="" val="3436258832"/>
+                      <a16:colId xmlns="" xmlns:a16="http://schemas.microsoft.com/office/drawing/2014/main" val="3436258832"/>
                     </a:ext>
                   </a:extLst>
                 </a:gridCol>
                 <a:gridCol w="2805848">
                   <a:extLst>
                     <a:ext uri="{9D8B030D-6E8A-4147-A177-3AD203B41FA5}">
-                      <a16:colId xmlns:a16="http://schemas.microsoft.com/office/drawing/2014/main" xmlns="" val="927178543"/>
+                      <a16:colId xmlns="" xmlns:a16="http://schemas.microsoft.com/office/drawing/2014/main" val="927178543"/>
                     </a:ext>
                   </a:extLst>
                 </a:gridCol>
                 <a:gridCol w="2671081">
                   <a:extLst>
                     <a:ext uri="{9D8B030D-6E8A-4147-A177-3AD203B41FA5}">
-                      <a16:colId xmlns:a16="http://schemas.microsoft.com/office/drawing/2014/main" xmlns="" val="1058635423"/>
+                      <a16:colId xmlns="" xmlns:a16="http://schemas.microsoft.com/office/drawing/2014/main" val="1058635423"/>
                     </a:ext>
                   </a:extLst>
                 </a:gridCol>
@@ -9641,7 +9874,7 @@
                 </a:tc>
                 <a:extLst>
                   <a:ext uri="{0D108BD9-81ED-4DB2-BD59-A6C34878D82A}">
-                    <a16:rowId xmlns:a16="http://schemas.microsoft.com/office/drawing/2014/main" xmlns="" val="2518014868"/>
+                    <a16:rowId xmlns="" xmlns:a16="http://schemas.microsoft.com/office/drawing/2014/main" val="2518014868"/>
                   </a:ext>
                 </a:extLst>
               </a:tr>
@@ -9737,7 +9970,7 @@
                 </a:tc>
                 <a:extLst>
                   <a:ext uri="{0D108BD9-81ED-4DB2-BD59-A6C34878D82A}">
-                    <a16:rowId xmlns:a16="http://schemas.microsoft.com/office/drawing/2014/main" xmlns="" val="1020769687"/>
+                    <a16:rowId xmlns="" xmlns:a16="http://schemas.microsoft.com/office/drawing/2014/main" val="1020769687"/>
                   </a:ext>
                 </a:extLst>
               </a:tr>
@@ -9849,7 +10082,7 @@
                 </a:tc>
                 <a:extLst>
                   <a:ext uri="{0D108BD9-81ED-4DB2-BD59-A6C34878D82A}">
-                    <a16:rowId xmlns:a16="http://schemas.microsoft.com/office/drawing/2014/main" xmlns="" val="4009803894"/>
+                    <a16:rowId xmlns="" xmlns:a16="http://schemas.microsoft.com/office/drawing/2014/main" val="4009803894"/>
                   </a:ext>
                 </a:extLst>
               </a:tr>
@@ -9946,7 +10179,7 @@
                 </a:tc>
                 <a:extLst>
                   <a:ext uri="{0D108BD9-81ED-4DB2-BD59-A6C34878D82A}">
-                    <a16:rowId xmlns:a16="http://schemas.microsoft.com/office/drawing/2014/main" xmlns="" val="3597353604"/>
+                    <a16:rowId xmlns="" xmlns:a16="http://schemas.microsoft.com/office/drawing/2014/main" val="3597353604"/>
                   </a:ext>
                 </a:extLst>
               </a:tr>
@@ -10387,28 +10620,28 @@
                 <a:gridCol w="1138213">
                   <a:extLst>
                     <a:ext uri="{9D8B030D-6E8A-4147-A177-3AD203B41FA5}">
-                      <a16:colId xmlns:a16="http://schemas.microsoft.com/office/drawing/2014/main" xmlns="" val="3950110134"/>
+                      <a16:colId xmlns="" xmlns:a16="http://schemas.microsoft.com/office/drawing/2014/main" val="3950110134"/>
                     </a:ext>
                   </a:extLst>
                 </a:gridCol>
                 <a:gridCol w="1876812">
                   <a:extLst>
                     <a:ext uri="{9D8B030D-6E8A-4147-A177-3AD203B41FA5}">
-                      <a16:colId xmlns:a16="http://schemas.microsoft.com/office/drawing/2014/main" xmlns="" val="3506418350"/>
+                      <a16:colId xmlns="" xmlns:a16="http://schemas.microsoft.com/office/drawing/2014/main" val="3506418350"/>
                     </a:ext>
                   </a:extLst>
                 </a:gridCol>
                 <a:gridCol w="4834253">
                   <a:extLst>
                     <a:ext uri="{9D8B030D-6E8A-4147-A177-3AD203B41FA5}">
-                      <a16:colId xmlns:a16="http://schemas.microsoft.com/office/drawing/2014/main" xmlns="" val="927178543"/>
+                      <a16:colId xmlns="" xmlns:a16="http://schemas.microsoft.com/office/drawing/2014/main" val="927178543"/>
                     </a:ext>
                   </a:extLst>
                 </a:gridCol>
                 <a:gridCol w="3355532">
                   <a:extLst>
                     <a:ext uri="{9D8B030D-6E8A-4147-A177-3AD203B41FA5}">
-                      <a16:colId xmlns:a16="http://schemas.microsoft.com/office/drawing/2014/main" xmlns="" val="1058635423"/>
+                      <a16:colId xmlns="" xmlns:a16="http://schemas.microsoft.com/office/drawing/2014/main" val="1058635423"/>
                     </a:ext>
                   </a:extLst>
                 </a:gridCol>
@@ -10485,7 +10718,7 @@
                 </a:tc>
                 <a:extLst>
                   <a:ext uri="{0D108BD9-81ED-4DB2-BD59-A6C34878D82A}">
-                    <a16:rowId xmlns:a16="http://schemas.microsoft.com/office/drawing/2014/main" xmlns="" val="2518014868"/>
+                    <a16:rowId xmlns="" xmlns:a16="http://schemas.microsoft.com/office/drawing/2014/main" val="2518014868"/>
                   </a:ext>
                 </a:extLst>
               </a:tr>
@@ -10564,7 +10797,7 @@
                 </a:tc>
                 <a:extLst>
                   <a:ext uri="{0D108BD9-81ED-4DB2-BD59-A6C34878D82A}">
-                    <a16:rowId xmlns:a16="http://schemas.microsoft.com/office/drawing/2014/main" xmlns="" val="1506722424"/>
+                    <a16:rowId xmlns="" xmlns:a16="http://schemas.microsoft.com/office/drawing/2014/main" val="1506722424"/>
                   </a:ext>
                 </a:extLst>
               </a:tr>
@@ -10676,7 +10909,7 @@
                 </a:tc>
                 <a:extLst>
                   <a:ext uri="{0D108BD9-81ED-4DB2-BD59-A6C34878D82A}">
-                    <a16:rowId xmlns:a16="http://schemas.microsoft.com/office/drawing/2014/main" xmlns="" val="1020769687"/>
+                    <a16:rowId xmlns="" xmlns:a16="http://schemas.microsoft.com/office/drawing/2014/main" val="1020769687"/>
                   </a:ext>
                 </a:extLst>
               </a:tr>
@@ -10784,7 +11017,7 @@
                 </a:tc>
                 <a:extLst>
                   <a:ext uri="{0D108BD9-81ED-4DB2-BD59-A6C34878D82A}">
-                    <a16:rowId xmlns:a16="http://schemas.microsoft.com/office/drawing/2014/main" xmlns="" val="4009803894"/>
+                    <a16:rowId xmlns="" xmlns:a16="http://schemas.microsoft.com/office/drawing/2014/main" val="4009803894"/>
                   </a:ext>
                 </a:extLst>
               </a:tr>
@@ -10871,7 +11104,7 @@
                 </a:tc>
                 <a:extLst>
                   <a:ext uri="{0D108BD9-81ED-4DB2-BD59-A6C34878D82A}">
-                    <a16:rowId xmlns:a16="http://schemas.microsoft.com/office/drawing/2014/main" xmlns="" val="3597353604"/>
+                    <a16:rowId xmlns="" xmlns:a16="http://schemas.microsoft.com/office/drawing/2014/main" val="3597353604"/>
                   </a:ext>
                 </a:extLst>
               </a:tr>
@@ -10950,7 +11183,7 @@
                 </a:tc>
                 <a:extLst>
                   <a:ext uri="{0D108BD9-81ED-4DB2-BD59-A6C34878D82A}">
-                    <a16:rowId xmlns:a16="http://schemas.microsoft.com/office/drawing/2014/main" xmlns="" val="905511772"/>
+                    <a16:rowId xmlns="" xmlns:a16="http://schemas.microsoft.com/office/drawing/2014/main" val="905511772"/>
                   </a:ext>
                 </a:extLst>
               </a:tr>
@@ -11053,7 +11286,7 @@
                 </a:tc>
                 <a:extLst>
                   <a:ext uri="{0D108BD9-81ED-4DB2-BD59-A6C34878D82A}">
-                    <a16:rowId xmlns:a16="http://schemas.microsoft.com/office/drawing/2014/main" xmlns="" val="3520352664"/>
+                    <a16:rowId xmlns="" xmlns:a16="http://schemas.microsoft.com/office/drawing/2014/main" val="3520352664"/>
                   </a:ext>
                 </a:extLst>
               </a:tr>
@@ -11144,7 +11377,7 @@
                 </a:tc>
                 <a:extLst>
                   <a:ext uri="{0D108BD9-81ED-4DB2-BD59-A6C34878D82A}">
-                    <a16:rowId xmlns:a16="http://schemas.microsoft.com/office/drawing/2014/main" xmlns="" val="1210360995"/>
+                    <a16:rowId xmlns="" xmlns:a16="http://schemas.microsoft.com/office/drawing/2014/main" val="1210360995"/>
                   </a:ext>
                 </a:extLst>
               </a:tr>
@@ -11326,28 +11559,28 @@
                 <a:gridCol w="771286">
                   <a:extLst>
                     <a:ext uri="{9D8B030D-6E8A-4147-A177-3AD203B41FA5}">
-                      <a16:colId xmlns:a16="http://schemas.microsoft.com/office/drawing/2014/main" xmlns="" val="3950110134"/>
+                      <a16:colId xmlns="" xmlns:a16="http://schemas.microsoft.com/office/drawing/2014/main" val="3950110134"/>
                     </a:ext>
                   </a:extLst>
                 </a:gridCol>
                 <a:gridCol w="1944243">
                   <a:extLst>
                     <a:ext uri="{9D8B030D-6E8A-4147-A177-3AD203B41FA5}">
-                      <a16:colId xmlns:a16="http://schemas.microsoft.com/office/drawing/2014/main" xmlns="" val="3506418350"/>
+                      <a16:colId xmlns="" xmlns:a16="http://schemas.microsoft.com/office/drawing/2014/main" val="3506418350"/>
                     </a:ext>
                   </a:extLst>
                 </a:gridCol>
                 <a:gridCol w="3520131">
                   <a:extLst>
                     <a:ext uri="{9D8B030D-6E8A-4147-A177-3AD203B41FA5}">
-                      <a16:colId xmlns:a16="http://schemas.microsoft.com/office/drawing/2014/main" xmlns="" val="927178543"/>
+                      <a16:colId xmlns="" xmlns:a16="http://schemas.microsoft.com/office/drawing/2014/main" val="927178543"/>
                     </a:ext>
                   </a:extLst>
                 </a:gridCol>
                 <a:gridCol w="5354493">
                   <a:extLst>
                     <a:ext uri="{9D8B030D-6E8A-4147-A177-3AD203B41FA5}">
-                      <a16:colId xmlns:a16="http://schemas.microsoft.com/office/drawing/2014/main" xmlns="" val="1058635423"/>
+                      <a16:colId xmlns="" xmlns:a16="http://schemas.microsoft.com/office/drawing/2014/main" val="1058635423"/>
                     </a:ext>
                   </a:extLst>
                 </a:gridCol>
@@ -11424,7 +11657,7 @@
                 </a:tc>
                 <a:extLst>
                   <a:ext uri="{0D108BD9-81ED-4DB2-BD59-A6C34878D82A}">
-                    <a16:rowId xmlns:a16="http://schemas.microsoft.com/office/drawing/2014/main" xmlns="" val="2518014868"/>
+                    <a16:rowId xmlns="" xmlns:a16="http://schemas.microsoft.com/office/drawing/2014/main" val="2518014868"/>
                   </a:ext>
                 </a:extLst>
               </a:tr>
@@ -11507,7 +11740,7 @@
                 </a:tc>
                 <a:extLst>
                   <a:ext uri="{0D108BD9-81ED-4DB2-BD59-A6C34878D82A}">
-                    <a16:rowId xmlns:a16="http://schemas.microsoft.com/office/drawing/2014/main" xmlns="" val="1506722424"/>
+                    <a16:rowId xmlns="" xmlns:a16="http://schemas.microsoft.com/office/drawing/2014/main" val="1506722424"/>
                   </a:ext>
                 </a:extLst>
               </a:tr>
@@ -11598,7 +11831,7 @@
                 </a:tc>
                 <a:extLst>
                   <a:ext uri="{0D108BD9-81ED-4DB2-BD59-A6C34878D82A}">
-                    <a16:rowId xmlns:a16="http://schemas.microsoft.com/office/drawing/2014/main" xmlns="" val="1020769687"/>
+                    <a16:rowId xmlns="" xmlns:a16="http://schemas.microsoft.com/office/drawing/2014/main" val="1020769687"/>
                   </a:ext>
                 </a:extLst>
               </a:tr>
@@ -11685,7 +11918,7 @@
                 </a:tc>
                 <a:extLst>
                   <a:ext uri="{0D108BD9-81ED-4DB2-BD59-A6C34878D82A}">
-                    <a16:rowId xmlns:a16="http://schemas.microsoft.com/office/drawing/2014/main" xmlns="" val="4009803894"/>
+                    <a16:rowId xmlns="" xmlns:a16="http://schemas.microsoft.com/office/drawing/2014/main" val="4009803894"/>
                   </a:ext>
                 </a:extLst>
               </a:tr>
@@ -11772,7 +12005,7 @@
                 </a:tc>
                 <a:extLst>
                   <a:ext uri="{0D108BD9-81ED-4DB2-BD59-A6C34878D82A}">
-                    <a16:rowId xmlns:a16="http://schemas.microsoft.com/office/drawing/2014/main" xmlns="" val="3597353604"/>
+                    <a16:rowId xmlns="" xmlns:a16="http://schemas.microsoft.com/office/drawing/2014/main" val="3597353604"/>
                   </a:ext>
                 </a:extLst>
               </a:tr>
@@ -11875,7 +12108,7 @@
                 </a:tc>
                 <a:extLst>
                   <a:ext uri="{0D108BD9-81ED-4DB2-BD59-A6C34878D82A}">
-                    <a16:rowId xmlns:a16="http://schemas.microsoft.com/office/drawing/2014/main" xmlns="" val="905511772"/>
+                    <a16:rowId xmlns="" xmlns:a16="http://schemas.microsoft.com/office/drawing/2014/main" val="905511772"/>
                   </a:ext>
                 </a:extLst>
               </a:tr>
@@ -11970,7 +12203,7 @@
                 </a:tc>
                 <a:extLst>
                   <a:ext uri="{0D108BD9-81ED-4DB2-BD59-A6C34878D82A}">
-                    <a16:rowId xmlns:a16="http://schemas.microsoft.com/office/drawing/2014/main" xmlns="" val="3520352664"/>
+                    <a16:rowId xmlns="" xmlns:a16="http://schemas.microsoft.com/office/drawing/2014/main" val="3520352664"/>
                   </a:ext>
                 </a:extLst>
               </a:tr>
@@ -12172,28 +12405,28 @@
                 <a:gridCol w="832514">
                   <a:extLst>
                     <a:ext uri="{9D8B030D-6E8A-4147-A177-3AD203B41FA5}">
-                      <a16:colId xmlns:a16="http://schemas.microsoft.com/office/drawing/2014/main" xmlns="" val="3950110134"/>
+                      <a16:colId xmlns="" xmlns:a16="http://schemas.microsoft.com/office/drawing/2014/main" val="3950110134"/>
                     </a:ext>
                   </a:extLst>
                 </a:gridCol>
                 <a:gridCol w="1867511">
                   <a:extLst>
                     <a:ext uri="{9D8B030D-6E8A-4147-A177-3AD203B41FA5}">
-                      <a16:colId xmlns:a16="http://schemas.microsoft.com/office/drawing/2014/main" xmlns="" val="3506418350"/>
+                      <a16:colId xmlns="" xmlns:a16="http://schemas.microsoft.com/office/drawing/2014/main" val="3506418350"/>
                     </a:ext>
                   </a:extLst>
                 </a:gridCol>
                 <a:gridCol w="2990615">
                   <a:extLst>
                     <a:ext uri="{9D8B030D-6E8A-4147-A177-3AD203B41FA5}">
-                      <a16:colId xmlns:a16="http://schemas.microsoft.com/office/drawing/2014/main" xmlns="" val="927178543"/>
+                      <a16:colId xmlns="" xmlns:a16="http://schemas.microsoft.com/office/drawing/2014/main" val="927178543"/>
                     </a:ext>
                   </a:extLst>
                 </a:gridCol>
                 <a:gridCol w="4586125">
                   <a:extLst>
                     <a:ext uri="{9D8B030D-6E8A-4147-A177-3AD203B41FA5}">
-                      <a16:colId xmlns:a16="http://schemas.microsoft.com/office/drawing/2014/main" xmlns="" val="1058635423"/>
+                      <a16:colId xmlns="" xmlns:a16="http://schemas.microsoft.com/office/drawing/2014/main" val="1058635423"/>
                     </a:ext>
                   </a:extLst>
                 </a:gridCol>
@@ -12270,7 +12503,7 @@
                 </a:tc>
                 <a:extLst>
                   <a:ext uri="{0D108BD9-81ED-4DB2-BD59-A6C34878D82A}">
-                    <a16:rowId xmlns:a16="http://schemas.microsoft.com/office/drawing/2014/main" xmlns="" val="2518014868"/>
+                    <a16:rowId xmlns="" xmlns:a16="http://schemas.microsoft.com/office/drawing/2014/main" val="2518014868"/>
                   </a:ext>
                 </a:extLst>
               </a:tr>
@@ -12357,7 +12590,7 @@
                 </a:tc>
                 <a:extLst>
                   <a:ext uri="{0D108BD9-81ED-4DB2-BD59-A6C34878D82A}">
-                    <a16:rowId xmlns:a16="http://schemas.microsoft.com/office/drawing/2014/main" xmlns="" val="905511772"/>
+                    <a16:rowId xmlns="" xmlns:a16="http://schemas.microsoft.com/office/drawing/2014/main" val="905511772"/>
                   </a:ext>
                 </a:extLst>
               </a:tr>
@@ -12423,11 +12656,7 @@
                     <a:p>
                       <a:r>
                         <a:rPr lang="en-US" dirty="0" smtClean="0"/>
-                        <a:t>Coffee </a:t>
-                      </a:r>
-                      <a:r>
-                        <a:rPr lang="en-US" dirty="0" smtClean="0"/>
-                        <a:t>Machine turns on</a:t>
+                        <a:t>Coffee Machine turns on</a:t>
                       </a:r>
                       <a:endParaRPr lang="en-US" dirty="0"/>
                     </a:p>
@@ -12436,7 +12665,7 @@
                 </a:tc>
                 <a:extLst>
                   <a:ext uri="{0D108BD9-81ED-4DB2-BD59-A6C34878D82A}">
-                    <a16:rowId xmlns:a16="http://schemas.microsoft.com/office/drawing/2014/main" xmlns="" val="3520352664"/>
+                    <a16:rowId xmlns="" xmlns:a16="http://schemas.microsoft.com/office/drawing/2014/main" val="3520352664"/>
                   </a:ext>
                 </a:extLst>
               </a:tr>
@@ -12502,11 +12731,7 @@
                     <a:p>
                       <a:r>
                         <a:rPr lang="en-US" dirty="0" smtClean="0"/>
-                        <a:t>Coffee Machine turns </a:t>
-                      </a:r>
-                      <a:r>
-                        <a:rPr lang="en-US" dirty="0" smtClean="0"/>
-                        <a:t>off</a:t>
+                        <a:t>Coffee Machine turns off</a:t>
                       </a:r>
                       <a:endParaRPr lang="en-US" dirty="0"/>
                     </a:p>
@@ -12515,7 +12740,7 @@
                 </a:tc>
                 <a:extLst>
                   <a:ext uri="{0D108BD9-81ED-4DB2-BD59-A6C34878D82A}">
-                    <a16:rowId xmlns:a16="http://schemas.microsoft.com/office/drawing/2014/main" xmlns="" val="1210360995"/>
+                    <a16:rowId xmlns="" xmlns:a16="http://schemas.microsoft.com/office/drawing/2014/main" val="1210360995"/>
                   </a:ext>
                 </a:extLst>
               </a:tr>
@@ -12581,19 +12806,7 @@
                     <a:p>
                       <a:r>
                         <a:rPr lang="en-US" dirty="0" smtClean="0"/>
-                        <a:t>Push </a:t>
-                      </a:r>
-                      <a:r>
-                        <a:rPr lang="en-US" dirty="0" smtClean="0"/>
-                        <a:t>notification </a:t>
-                      </a:r>
-                      <a:r>
-                        <a:rPr lang="en-US" dirty="0" smtClean="0"/>
-                        <a:t>on </a:t>
-                      </a:r>
-                      <a:r>
-                        <a:rPr lang="en-US" dirty="0" smtClean="0"/>
-                        <a:t>App / Dialog print on Terminal</a:t>
+                        <a:t>Push notification on App / Dialog print on Terminal</a:t>
                       </a:r>
                       <a:endParaRPr lang="en-US" dirty="0"/>
                     </a:p>
@@ -13043,15 +13256,7 @@
             </a:r>
             <a:r>
               <a:rPr lang="en-US" sz="3000" dirty="0" smtClean="0"/>
-              <a:t>sent to </a:t>
-            </a:r>
-            <a:r>
-              <a:rPr lang="en-US" sz="3000" dirty="0" smtClean="0"/>
-              <a:t>the server </a:t>
-            </a:r>
-            <a:r>
-              <a:rPr lang="en-US" sz="3000" dirty="0" smtClean="0"/>
-              <a:t>with</a:t>
+              <a:t>sent to the server with</a:t>
             </a:r>
             <a:endParaRPr lang="en-US" sz="3000" dirty="0"/>
           </a:p>
@@ -13251,7 +13456,7 @@
           <p:nvPr/>
         </p:nvPicPr>
         <p:blipFill>
-          <a:blip r:embed="rId2">
+          <a:blip r:embed="rId3">
             <a:extLst>
               <a:ext uri="{28A0092B-C50C-407E-A947-70E740481C1C}">
                 <a14:useLocalDpi xmlns:a14="http://schemas.microsoft.com/office/drawing/2010/main" val="0"/>
@@ -13528,7 +13733,7 @@
           <p:nvPr/>
         </p:nvPicPr>
         <p:blipFill>
-          <a:blip r:embed="rId2">
+          <a:blip r:embed="rId3">
             <a:extLst>
               <a:ext uri="{28A0092B-C50C-407E-A947-70E740481C1C}">
                 <a14:useLocalDpi xmlns:a14="http://schemas.microsoft.com/office/drawing/2010/main" val="0"/>
@@ -14077,21 +14282,21 @@
                 <a:gridCol w="5018222">
                   <a:extLst>
                     <a:ext uri="{9D8B030D-6E8A-4147-A177-3AD203B41FA5}">
-                      <a16:colId xmlns:a16="http://schemas.microsoft.com/office/drawing/2014/main" xmlns="" val="20000"/>
+                      <a16:colId xmlns="" xmlns:a16="http://schemas.microsoft.com/office/drawing/2014/main" val="20000"/>
                     </a:ext>
                   </a:extLst>
                 </a:gridCol>
                 <a:gridCol w="2500314">
                   <a:extLst>
                     <a:ext uri="{9D8B030D-6E8A-4147-A177-3AD203B41FA5}">
-                      <a16:colId xmlns:a16="http://schemas.microsoft.com/office/drawing/2014/main" xmlns="" val="20001"/>
+                      <a16:colId xmlns="" xmlns:a16="http://schemas.microsoft.com/office/drawing/2014/main" val="20001"/>
                     </a:ext>
                   </a:extLst>
                 </a:gridCol>
                 <a:gridCol w="2200276">
                   <a:extLst>
                     <a:ext uri="{9D8B030D-6E8A-4147-A177-3AD203B41FA5}">
-                      <a16:colId xmlns:a16="http://schemas.microsoft.com/office/drawing/2014/main" xmlns="" val="20002"/>
+                      <a16:colId xmlns="" xmlns:a16="http://schemas.microsoft.com/office/drawing/2014/main" val="20002"/>
                     </a:ext>
                   </a:extLst>
                 </a:gridCol>
@@ -14141,7 +14346,7 @@
                 </a:tc>
                 <a:extLst>
                   <a:ext uri="{0D108BD9-81ED-4DB2-BD59-A6C34878D82A}">
-                    <a16:rowId xmlns:a16="http://schemas.microsoft.com/office/drawing/2014/main" xmlns="" val="10000"/>
+                    <a16:rowId xmlns="" xmlns:a16="http://schemas.microsoft.com/office/drawing/2014/main" val="10000"/>
                   </a:ext>
                 </a:extLst>
               </a:tr>
@@ -14216,7 +14421,7 @@
                 </a:tc>
                 <a:extLst>
                   <a:ext uri="{0D108BD9-81ED-4DB2-BD59-A6C34878D82A}">
-                    <a16:rowId xmlns:a16="http://schemas.microsoft.com/office/drawing/2014/main" xmlns="" val="10001"/>
+                    <a16:rowId xmlns="" xmlns:a16="http://schemas.microsoft.com/office/drawing/2014/main" val="10001"/>
                   </a:ext>
                 </a:extLst>
               </a:tr>
@@ -14286,7 +14491,7 @@
                 </a:tc>
                 <a:extLst>
                   <a:ext uri="{0D108BD9-81ED-4DB2-BD59-A6C34878D82A}">
-                    <a16:rowId xmlns:a16="http://schemas.microsoft.com/office/drawing/2014/main" xmlns="" val="10002"/>
+                    <a16:rowId xmlns="" xmlns:a16="http://schemas.microsoft.com/office/drawing/2014/main" val="10002"/>
                   </a:ext>
                 </a:extLst>
               </a:tr>
@@ -14357,7 +14562,7 @@
                 </a:tc>
                 <a:extLst>
                   <a:ext uri="{0D108BD9-81ED-4DB2-BD59-A6C34878D82A}">
-                    <a16:rowId xmlns:a16="http://schemas.microsoft.com/office/drawing/2014/main" xmlns="" val="10003"/>
+                    <a16:rowId xmlns="" xmlns:a16="http://schemas.microsoft.com/office/drawing/2014/main" val="10003"/>
                   </a:ext>
                 </a:extLst>
               </a:tr>
@@ -14427,7 +14632,7 @@
                 </a:tc>
                 <a:extLst>
                   <a:ext uri="{0D108BD9-81ED-4DB2-BD59-A6C34878D82A}">
-                    <a16:rowId xmlns:a16="http://schemas.microsoft.com/office/drawing/2014/main" xmlns="" val="10004"/>
+                    <a16:rowId xmlns="" xmlns:a16="http://schemas.microsoft.com/office/drawing/2014/main" val="10004"/>
                   </a:ext>
                 </a:extLst>
               </a:tr>
@@ -14493,7 +14698,7 @@
                 </a:tc>
                 <a:extLst>
                   <a:ext uri="{0D108BD9-81ED-4DB2-BD59-A6C34878D82A}">
-                    <a16:rowId xmlns:a16="http://schemas.microsoft.com/office/drawing/2014/main" xmlns="" val="10005"/>
+                    <a16:rowId xmlns="" xmlns:a16="http://schemas.microsoft.com/office/drawing/2014/main" val="10005"/>
                   </a:ext>
                 </a:extLst>
               </a:tr>
@@ -14560,7 +14765,7 @@
                 </a:tc>
                 <a:extLst>
                   <a:ext uri="{0D108BD9-81ED-4DB2-BD59-A6C34878D82A}">
-                    <a16:rowId xmlns:a16="http://schemas.microsoft.com/office/drawing/2014/main" xmlns="" val="10006"/>
+                    <a16:rowId xmlns="" xmlns:a16="http://schemas.microsoft.com/office/drawing/2014/main" val="10006"/>
                   </a:ext>
                 </a:extLst>
               </a:tr>
@@ -14622,7 +14827,7 @@
                 </a:tc>
                 <a:extLst>
                   <a:ext uri="{0D108BD9-81ED-4DB2-BD59-A6C34878D82A}">
-                    <a16:rowId xmlns:a16="http://schemas.microsoft.com/office/drawing/2014/main" xmlns="" val="10007"/>
+                    <a16:rowId xmlns="" xmlns:a16="http://schemas.microsoft.com/office/drawing/2014/main" val="10007"/>
                   </a:ext>
                 </a:extLst>
               </a:tr>

</xml_diff>

<commit_message>
Added presenter notes to JUnitTest section
</commit_message>
<xml_diff>
--- a/docs/presentations/SYSC3010-teamF5-test-review.pptx
+++ b/docs/presentations/SYSC3010-teamF5-test-review.pptx
@@ -234,7 +234,7 @@
           <a:p>
             <a:fld id="{48B232C6-1FF7-46FF-8CAF-89BA555C4B4E}" type="datetimeFigureOut">
               <a:rPr lang="en-CA" smtClean="0"/>
-              <a:t>2017-03-12</a:t>
+              <a:t>13/03/2017</a:t>
             </a:fld>
             <a:endParaRPr lang="en-CA"/>
           </a:p>
@@ -546,167 +546,7 @@
           <a:bodyPr/>
           <a:lstStyle/>
           <a:p>
-            <a:r>
-              <a:rPr lang="en-US" dirty="0"/>
-              <a:t>Windows/Linux</a:t>
-            </a:r>
-            <a:r>
-              <a:rPr lang="en-US" baseline="0" dirty="0"/>
-              <a:t> PC:</a:t>
-            </a:r>
-          </a:p>
-          <a:p>
-            <a:r>
-              <a:rPr lang="en-US" baseline="0" dirty="0"/>
-              <a:t>-will be acting as server, using a </a:t>
-            </a:r>
-            <a:r>
-              <a:rPr lang="en-US" baseline="0" dirty="0" err="1"/>
-              <a:t>MainServer</a:t>
-            </a:r>
-            <a:r>
-              <a:rPr lang="en-US" baseline="0" dirty="0"/>
-              <a:t> class, the DSKY interface and custom made datatypes</a:t>
-            </a:r>
-          </a:p>
-          <a:p>
-            <a:r>
-              <a:rPr lang="en-US" baseline="0" dirty="0"/>
-              <a:t>-able to communicate with all modules using UDP</a:t>
-            </a:r>
-          </a:p>
-          <a:p>
-            <a:r>
-              <a:rPr lang="en-US" baseline="0" dirty="0"/>
-              <a:t/>
-            </a:r>
-            <a:br>
-              <a:rPr lang="en-US" baseline="0" dirty="0"/>
-            </a:br>
-            <a:r>
-              <a:rPr lang="en-US" baseline="0" dirty="0"/>
-              <a:t>Media Controller</a:t>
-            </a:r>
-          </a:p>
-          <a:p>
-            <a:r>
-              <a:rPr lang="en-US" baseline="0" dirty="0"/>
-              <a:t>-used to play music, and possibly video</a:t>
-            </a:r>
-          </a:p>
-          <a:p>
-            <a:r>
-              <a:rPr lang="en-US" baseline="0" dirty="0"/>
-              <a:t>-Has database of music and video the user can play</a:t>
-            </a:r>
-          </a:p>
-          <a:p>
-            <a:endParaRPr lang="en-US" baseline="0" dirty="0"/>
-          </a:p>
-          <a:p>
-            <a:endParaRPr lang="en-US" baseline="0" dirty="0"/>
-          </a:p>
-          <a:p>
-            <a:r>
-              <a:rPr lang="en-US" baseline="0" dirty="0"/>
-              <a:t>Light Controller:</a:t>
-            </a:r>
-          </a:p>
-          <a:p>
-            <a:r>
-              <a:rPr lang="en-US" baseline="0" dirty="0"/>
-              <a:t>-RPi will communicate with 1 component</a:t>
-            </a:r>
-          </a:p>
-          <a:p>
-            <a:r>
-              <a:rPr lang="en-US" baseline="0" dirty="0"/>
-              <a:t>	1. LED’s: used to slowly brighten room</a:t>
-            </a:r>
-          </a:p>
-          <a:p>
-            <a:r>
-              <a:rPr lang="en-US" baseline="0" dirty="0"/>
-              <a:t>	     -will be controlled using PWM on a GPIO pin</a:t>
-            </a:r>
-          </a:p>
-          <a:p>
-            <a:r>
-              <a:rPr lang="en-US" baseline="0" dirty="0"/>
-              <a:t>-also has a speaker used to play an alarm (using the 3.5mm jack on the RPi)</a:t>
-            </a:r>
-          </a:p>
-          <a:p>
-            <a:endParaRPr lang="en-US" baseline="0" dirty="0"/>
-          </a:p>
-          <a:p>
-            <a:endParaRPr lang="en-US" baseline="0" dirty="0"/>
-          </a:p>
-          <a:p>
-            <a:r>
-              <a:rPr lang="en-US" baseline="0" dirty="0"/>
-              <a:t>Coffee Maker:</a:t>
-            </a:r>
-          </a:p>
-          <a:p>
-            <a:r>
-              <a:rPr lang="en-US" baseline="0" dirty="0"/>
-              <a:t>-RPi will communicate with 3 components:</a:t>
-            </a:r>
-          </a:p>
-          <a:p>
-            <a:r>
-              <a:rPr lang="en-US" baseline="0" dirty="0"/>
-              <a:t>	1. Electronic Scale: used to weigh cup before and during coffee making to make sure proper amounts of coffee are made</a:t>
-            </a:r>
-          </a:p>
-          <a:p>
-            <a:r>
-              <a:rPr lang="en-US" baseline="0" dirty="0"/>
-              <a:t>	     -interfaced using USB port on RPi</a:t>
-            </a:r>
-          </a:p>
-          <a:p>
-            <a:r>
-              <a:rPr lang="en-US" baseline="0" dirty="0"/>
-              <a:t>	2. Thermometer: used to monitor water temp</a:t>
-            </a:r>
-          </a:p>
-          <a:p>
-            <a:r>
-              <a:rPr lang="en-US" baseline="0" dirty="0"/>
-              <a:t>	    -interfaced using AD converted on Gertboard</a:t>
-            </a:r>
-          </a:p>
-          <a:p>
-            <a:r>
-              <a:rPr lang="en-US" baseline="0" dirty="0"/>
-              <a:t>	3. Heating Element: used to heat water</a:t>
-            </a:r>
-          </a:p>
-          <a:p>
-            <a:r>
-              <a:rPr lang="en-US" baseline="0" dirty="0"/>
-              <a:t>	    -interfaced via RPi GPIO connected to a simple transistor</a:t>
-            </a:r>
-          </a:p>
-          <a:p>
-            <a:endParaRPr lang="en-US" baseline="0" dirty="0"/>
-          </a:p>
-          <a:p>
-            <a:r>
-              <a:rPr lang="en-US" baseline="0" dirty="0"/>
-              <a:t>Terminal:</a:t>
-            </a:r>
-          </a:p>
-          <a:p>
-            <a:r>
-              <a:rPr lang="en-US" baseline="0" dirty="0"/>
-              <a:t>-GUI for user to enter commands to AVA</a:t>
-            </a:r>
-          </a:p>
-          <a:p>
-            <a:endParaRPr lang="en-US" baseline="0" dirty="0"/>
+            <a:endParaRPr lang="en-US" dirty="0"/>
           </a:p>
         </p:txBody>
       </p:sp>
@@ -727,7 +567,7 @@
           <a:p>
             <a:fld id="{377211F2-1C6A-4F10-9506-C7C062274F4F}" type="slidenum">
               <a:rPr lang="en-CA" smtClean="0"/>
-              <a:t>2</a:t>
+              <a:t>1</a:t>
             </a:fld>
             <a:endParaRPr lang="en-CA"/>
           </a:p>
@@ -736,7 +576,7 @@
     </p:spTree>
     <p:extLst>
       <p:ext uri="{BB962C8B-B14F-4D97-AF65-F5344CB8AC3E}">
-        <p14:creationId xmlns:p14="http://schemas.microsoft.com/office/powerpoint/2010/main" val="4293445802"/>
+        <p14:creationId xmlns:p14="http://schemas.microsoft.com/office/powerpoint/2010/main" val="1156663262"/>
       </p:ext>
     </p:extLst>
   </p:cSld>
@@ -791,28 +631,18 @@
           <a:lstStyle/>
           <a:p>
             <a:r>
-              <a:rPr lang="en-US" dirty="0"/>
-              <a:t>The system will need to be able to execute certain</a:t>
-            </a:r>
-            <a:r>
-              <a:rPr lang="en-US" baseline="0" dirty="0"/>
-              <a:t> actions at pre-defined times, such as brightening the wake-up lamp a certain time before wake-up</a:t>
-            </a:r>
-          </a:p>
-          <a:p>
-            <a:r>
-              <a:rPr lang="en-US" baseline="0" dirty="0"/>
-              <a:t>The system will need to answer and execute user commands quickly, with little perceived delay</a:t>
-            </a:r>
-          </a:p>
-          <a:p>
-            <a:r>
-              <a:rPr lang="en-US" baseline="0" dirty="0"/>
-              <a:t>The system should be highly modular, to make adding new modules easy, as well as encourage the use of </a:t>
+              <a:rPr lang="en-US" dirty="0" smtClean="0"/>
+              <a:t>Info </a:t>
             </a:r>
             <a:r>
               <a:rPr lang="en-US" baseline="0" dirty="0" smtClean="0"/>
-              <a:t>modules</a:t>
+              <a:t>packets contain one field of data, they are used to send information on objects/status updates between server and modules</a:t>
+            </a:r>
+          </a:p>
+          <a:p>
+            <a:r>
+              <a:rPr lang="en-US" baseline="0" dirty="0" smtClean="0"/>
+              <a:t>	- info field</a:t>
             </a:r>
           </a:p>
           <a:p>
@@ -821,8 +651,44 @@
           <a:p>
             <a:r>
               <a:rPr lang="en-US" baseline="0" dirty="0" smtClean="0"/>
-              <a:t>-Server stress tester ensures, timely delivery</a:t>
-            </a:r>
+              <a:t>Sender called the </a:t>
+            </a:r>
+            <a:r>
+              <a:rPr lang="en-US" baseline="0" dirty="0" err="1" smtClean="0"/>
+              <a:t>sendInfo</a:t>
+            </a:r>
+            <a:r>
+              <a:rPr lang="en-US" baseline="0" dirty="0" smtClean="0"/>
+              <a:t>() method with a string as the parameter</a:t>
+            </a:r>
+          </a:p>
+          <a:p>
+            <a:r>
+              <a:rPr lang="en-US" baseline="0" dirty="0" smtClean="0"/>
+              <a:t>The data is packed and sent by the Sender </a:t>
+            </a:r>
+            <a:r>
+              <a:rPr lang="en-US" baseline="0" dirty="0" err="1" smtClean="0"/>
+              <a:t>DataChannel</a:t>
+            </a:r>
+            <a:endParaRPr lang="en-US" baseline="0" dirty="0" smtClean="0"/>
+          </a:p>
+          <a:p>
+            <a:r>
+              <a:rPr lang="en-US" baseline="0" dirty="0" smtClean="0"/>
+              <a:t>Received by receiving data channel and unpacked</a:t>
+            </a:r>
+          </a:p>
+          <a:p>
+            <a:endParaRPr lang="en-US" baseline="0" dirty="0" smtClean="0"/>
+          </a:p>
+          <a:p>
+            <a:r>
+              <a:rPr lang="en-US" baseline="0" dirty="0" smtClean="0"/>
+              <a:t>Packet type and fields are checked</a:t>
+            </a:r>
+          </a:p>
+          <a:p>
             <a:endParaRPr lang="en-US" dirty="0"/>
           </a:p>
         </p:txBody>
@@ -844,7 +710,7 @@
           <a:p>
             <a:fld id="{377211F2-1C6A-4F10-9506-C7C062274F4F}" type="slidenum">
               <a:rPr lang="en-CA" smtClean="0"/>
-              <a:t>23</a:t>
+              <a:t>10</a:t>
             </a:fld>
             <a:endParaRPr lang="en-CA"/>
           </a:p>
@@ -853,7 +719,7 @@
     </p:spTree>
     <p:extLst>
       <p:ext uri="{BB962C8B-B14F-4D97-AF65-F5344CB8AC3E}">
-        <p14:creationId xmlns:p14="http://schemas.microsoft.com/office/powerpoint/2010/main" val="3067485228"/>
+        <p14:creationId xmlns:p14="http://schemas.microsoft.com/office/powerpoint/2010/main" val="4092646395"/>
       </p:ext>
     </p:extLst>
   </p:cSld>
@@ -909,26 +775,49 @@
           <a:p>
             <a:r>
               <a:rPr lang="en-US" dirty="0" smtClean="0"/>
-              <a:t>-Delegation to modules</a:t>
-            </a:r>
-          </a:p>
-          <a:p>
-            <a:endParaRPr lang="en-US" dirty="0" smtClean="0"/>
-          </a:p>
-          <a:p>
-            <a:r>
-              <a:rPr lang="en-US" dirty="0" smtClean="0"/>
-              <a:t>Server Event Timer:</a:t>
-            </a:r>
-          </a:p>
-          <a:p>
-            <a:r>
-              <a:rPr lang="en-US" dirty="0" smtClean="0"/>
-              <a:t>-Thread</a:t>
+              <a:t>Empty info packets are used in our system as</a:t>
             </a:r>
             <a:r>
               <a:rPr lang="en-US" baseline="0" dirty="0" smtClean="0"/>
-              <a:t> that sleeps until the required time</a:t>
+              <a:t> an acknowledgment</a:t>
+            </a:r>
+          </a:p>
+          <a:p>
+            <a:r>
+              <a:rPr lang="en-US" baseline="0" dirty="0" err="1" smtClean="0"/>
+              <a:t>Ie</a:t>
+            </a:r>
+            <a:r>
+              <a:rPr lang="en-US" baseline="0" dirty="0" smtClean="0"/>
+              <a:t> if I set a timer to go off in an hour, the server will send back an empty info packet to confirm the timer has seen set</a:t>
+            </a:r>
+          </a:p>
+          <a:p>
+            <a:endParaRPr lang="en-US" baseline="0" dirty="0" smtClean="0"/>
+          </a:p>
+          <a:p>
+            <a:r>
+              <a:rPr lang="en-US" baseline="0" dirty="0" err="1" smtClean="0"/>
+              <a:t>sendInfo</a:t>
+            </a:r>
+            <a:r>
+              <a:rPr lang="en-US" baseline="0" dirty="0" smtClean="0"/>
+              <a:t>() method called and given a 0 length string</a:t>
+            </a:r>
+          </a:p>
+          <a:p>
+            <a:endParaRPr lang="en-US" baseline="0" dirty="0" smtClean="0"/>
+          </a:p>
+          <a:p>
+            <a:r>
+              <a:rPr lang="en-US" baseline="0" dirty="0" smtClean="0"/>
+              <a:t>Packed, sent, received, unpacked</a:t>
+            </a:r>
+          </a:p>
+          <a:p>
+            <a:r>
+              <a:rPr lang="en-US" baseline="0" dirty="0" smtClean="0"/>
+              <a:t>Original data compared to end data</a:t>
             </a:r>
           </a:p>
           <a:p>
@@ -953,7 +842,7 @@
           <a:p>
             <a:fld id="{377211F2-1C6A-4F10-9506-C7C062274F4F}" type="slidenum">
               <a:rPr lang="en-CA" smtClean="0"/>
-              <a:t>24</a:t>
+              <a:t>11</a:t>
             </a:fld>
             <a:endParaRPr lang="en-CA"/>
           </a:p>
@@ -962,7 +851,7 @@
     </p:spTree>
     <p:extLst>
       <p:ext uri="{BB962C8B-B14F-4D97-AF65-F5344CB8AC3E}">
-        <p14:creationId xmlns:p14="http://schemas.microsoft.com/office/powerpoint/2010/main" val="210964540"/>
+        <p14:creationId xmlns:p14="http://schemas.microsoft.com/office/powerpoint/2010/main" val="2383114488"/>
       </p:ext>
     </p:extLst>
   </p:cSld>
@@ -1018,32 +907,98 @@
           <a:p>
             <a:r>
               <a:rPr lang="en-US" dirty="0" smtClean="0"/>
-              <a:t>The</a:t>
+              <a:t>Every</a:t>
             </a:r>
             <a:r>
               <a:rPr lang="en-US" baseline="0" dirty="0" smtClean="0"/>
-              <a:t> </a:t>
-            </a:r>
-            <a:r>
-              <a:rPr lang="en-US" baseline="0" dirty="0" err="1" smtClean="0"/>
-              <a:t>RPi</a:t>
-            </a:r>
+              <a:t> device in our system must be registered with the server under some name</a:t>
+            </a:r>
+          </a:p>
+          <a:p>
             <a:r>
               <a:rPr lang="en-US" baseline="0" dirty="0" smtClean="0"/>
-              <a:t> relays control a 120V rated relay that connects the coffee maker to a 120V AC wall voltage.</a:t>
+              <a:t>Upon startup, each device sends server a handshake packet in order to begin a connection and register</a:t>
             </a:r>
           </a:p>
           <a:p>
             <a:r>
               <a:rPr lang="en-US" baseline="0" dirty="0" smtClean="0"/>
-              <a:t>A 130 ohm resistor combined with an LED demonstrates that current is present. </a:t>
+              <a:t>Two fields to correctly pack data into</a:t>
             </a:r>
           </a:p>
           <a:p>
             <a:r>
               <a:rPr lang="en-US" baseline="0" dirty="0" smtClean="0"/>
-              <a:t>Water is boiled by a heating element.</a:t>
-            </a:r>
+              <a:t>	- Handshake Key </a:t>
+            </a:r>
+            <a:r>
+              <a:rPr lang="en-US" baseline="0" dirty="0" smtClean="0">
+                <a:sym typeface="Wingdings" panose="05000000000000000000" pitchFamily="2" charset="2"/>
+              </a:rPr>
+              <a:t> a string key that must match the copy server has for a device to be register</a:t>
+            </a:r>
+            <a:endParaRPr lang="en-US" baseline="0" dirty="0" smtClean="0"/>
+          </a:p>
+          <a:p>
+            <a:r>
+              <a:rPr lang="en-US" baseline="0" dirty="0" smtClean="0"/>
+              <a:t>	- Device Name </a:t>
+            </a:r>
+            <a:r>
+              <a:rPr lang="en-US" baseline="0" dirty="0" smtClean="0">
+                <a:sym typeface="Wingdings" panose="05000000000000000000" pitchFamily="2" charset="2"/>
+              </a:rPr>
+              <a:t> the name we register under</a:t>
+            </a:r>
+          </a:p>
+          <a:p>
+            <a:endParaRPr lang="en-US" baseline="0" dirty="0" smtClean="0">
+              <a:sym typeface="Wingdings" panose="05000000000000000000" pitchFamily="2" charset="2"/>
+            </a:endParaRPr>
+          </a:p>
+          <a:p>
+            <a:r>
+              <a:rPr lang="en-US" baseline="0" dirty="0" err="1" smtClean="0">
+                <a:sym typeface="Wingdings" panose="05000000000000000000" pitchFamily="2" charset="2"/>
+              </a:rPr>
+              <a:t>sendHandshake</a:t>
+            </a:r>
+            <a:r>
+              <a:rPr lang="en-US" baseline="0" dirty="0" smtClean="0">
+                <a:sym typeface="Wingdings" panose="05000000000000000000" pitchFamily="2" charset="2"/>
+              </a:rPr>
+              <a:t>() method is called from sender with valid strings for both parameters</a:t>
+            </a:r>
+          </a:p>
+          <a:p>
+            <a:r>
+              <a:rPr lang="en-US" baseline="0" dirty="0" smtClean="0">
+                <a:sym typeface="Wingdings" panose="05000000000000000000" pitchFamily="2" charset="2"/>
+              </a:rPr>
+              <a:t>Packet is constructed and sent</a:t>
+            </a:r>
+          </a:p>
+          <a:p>
+            <a:r>
+              <a:rPr lang="en-US" baseline="0" dirty="0" smtClean="0">
+                <a:sym typeface="Wingdings" panose="05000000000000000000" pitchFamily="2" charset="2"/>
+              </a:rPr>
+              <a:t>Receiver gets packet, and unpacks it</a:t>
+            </a:r>
+          </a:p>
+          <a:p>
+            <a:endParaRPr lang="en-US" baseline="0" dirty="0" smtClean="0">
+              <a:sym typeface="Wingdings" panose="05000000000000000000" pitchFamily="2" charset="2"/>
+            </a:endParaRPr>
+          </a:p>
+          <a:p>
+            <a:r>
+              <a:rPr lang="en-US" baseline="0" dirty="0" smtClean="0">
+                <a:sym typeface="Wingdings" panose="05000000000000000000" pitchFamily="2" charset="2"/>
+              </a:rPr>
+              <a:t>We check to confirm that the resulting data contains the correct type, key, and device name</a:t>
+            </a:r>
+            <a:endParaRPr lang="en-US" baseline="0" dirty="0" smtClean="0"/>
           </a:p>
         </p:txBody>
       </p:sp>
@@ -1064,7 +1019,7 @@
           <a:p>
             <a:fld id="{377211F2-1C6A-4F10-9506-C7C062274F4F}" type="slidenum">
               <a:rPr lang="en-CA" smtClean="0"/>
-              <a:t>25</a:t>
+              <a:t>12</a:t>
             </a:fld>
             <a:endParaRPr lang="en-CA"/>
           </a:p>
@@ -1073,7 +1028,7 @@
     </p:spTree>
     <p:extLst>
       <p:ext uri="{BB962C8B-B14F-4D97-AF65-F5344CB8AC3E}">
-        <p14:creationId xmlns:p14="http://schemas.microsoft.com/office/powerpoint/2010/main" val="235079551"/>
+        <p14:creationId xmlns:p14="http://schemas.microsoft.com/office/powerpoint/2010/main" val="856885706"/>
       </p:ext>
     </p:extLst>
   </p:cSld>
@@ -1128,42 +1083,49 @@
           <a:lstStyle/>
           <a:p>
             <a:r>
-              <a:rPr lang="en-US" dirty="0"/>
-              <a:t>-Bot</a:t>
-            </a:r>
-            <a:r>
-              <a:rPr lang="en-US" baseline="0" dirty="0"/>
-              <a:t>h Terminal and Server complete </a:t>
-            </a:r>
-          </a:p>
-          <a:p>
-            <a:r>
-              <a:rPr lang="en-US" dirty="0"/>
-              <a:t>-App has a</a:t>
-            </a:r>
-            <a:r>
-              <a:rPr lang="en-US" baseline="0" dirty="0"/>
-              <a:t> framework, without any backend implementation</a:t>
-            </a:r>
-          </a:p>
-          <a:p>
-            <a:r>
-              <a:rPr lang="en-US" baseline="0" dirty="0"/>
-              <a:t>-Hardware has been ordered and most has arrived</a:t>
-            </a:r>
-          </a:p>
-          <a:p>
-            <a:r>
-              <a:rPr lang="en-US" baseline="0" dirty="0"/>
-              <a:t>	-integration of </a:t>
-            </a:r>
-            <a:r>
-              <a:rPr lang="en-US" baseline="0"/>
-              <a:t>arrived sensors </a:t>
-            </a:r>
-            <a:r>
-              <a:rPr lang="en-US" baseline="0" dirty="0"/>
-              <a:t>in underway</a:t>
+              <a:rPr lang="en-US" dirty="0" smtClean="0"/>
+              <a:t>If</a:t>
+            </a:r>
+            <a:r>
+              <a:rPr lang="en-US" baseline="0" dirty="0" smtClean="0"/>
+              <a:t> a device completes its registration correctly (</a:t>
+            </a:r>
+            <a:r>
+              <a:rPr lang="en-US" baseline="0" dirty="0" err="1" smtClean="0"/>
+              <a:t>ie</a:t>
+            </a:r>
+            <a:r>
+              <a:rPr lang="en-US" baseline="0" dirty="0" smtClean="0"/>
+              <a:t> the key it provided was valid), server responds with an empty handshake packet (2 0x00 bytes)</a:t>
+            </a:r>
+          </a:p>
+          <a:p>
+            <a:r>
+              <a:rPr lang="en-US" baseline="0" dirty="0" smtClean="0"/>
+              <a:t>We call the </a:t>
+            </a:r>
+            <a:r>
+              <a:rPr lang="en-US" baseline="0" dirty="0" err="1" smtClean="0"/>
+              <a:t>sendHandshake</a:t>
+            </a:r>
+            <a:r>
+              <a:rPr lang="en-US" baseline="0" dirty="0" smtClean="0"/>
+              <a:t>() method with empty strings for both parameters</a:t>
+            </a:r>
+          </a:p>
+          <a:p>
+            <a:endParaRPr lang="en-US" baseline="0" dirty="0" smtClean="0"/>
+          </a:p>
+          <a:p>
+            <a:r>
+              <a:rPr lang="en-US" baseline="0" dirty="0" smtClean="0"/>
+              <a:t>Data is packed, sent, received, and unpacked</a:t>
+            </a:r>
+          </a:p>
+          <a:p>
+            <a:r>
+              <a:rPr lang="en-US" baseline="0" dirty="0" smtClean="0"/>
+              <a:t>Check to confirm unpacking works even with empty fields</a:t>
             </a:r>
           </a:p>
         </p:txBody>
@@ -1185,7 +1147,7 @@
           <a:p>
             <a:fld id="{377211F2-1C6A-4F10-9506-C7C062274F4F}" type="slidenum">
               <a:rPr lang="en-CA" smtClean="0"/>
-              <a:t>27</a:t>
+              <a:t>13</a:t>
             </a:fld>
             <a:endParaRPr lang="en-CA"/>
           </a:p>
@@ -1194,7 +1156,726 @@
     </p:spTree>
     <p:extLst>
       <p:ext uri="{BB962C8B-B14F-4D97-AF65-F5344CB8AC3E}">
-        <p14:creationId xmlns:p14="http://schemas.microsoft.com/office/powerpoint/2010/main" val="198276861"/>
+        <p14:creationId xmlns:p14="http://schemas.microsoft.com/office/powerpoint/2010/main" val="3481347199"/>
+      </p:ext>
+    </p:extLst>
+  </p:cSld>
+  <p:clrMapOvr>
+    <a:masterClrMapping/>
+  </p:clrMapOvr>
+</p:notes>
+</file>
+
+<file path=ppt/notesSlides/notesSlide14.xml><?xml version="1.0" encoding="utf-8"?>
+<p:notes xmlns:a="http://schemas.openxmlformats.org/drawingml/2006/main" xmlns:r="http://schemas.openxmlformats.org/officeDocument/2006/relationships" xmlns:p="http://schemas.openxmlformats.org/presentationml/2006/main">
+  <p:cSld>
+    <p:spTree>
+      <p:nvGrpSpPr>
+        <p:cNvPr id="1" name=""/>
+        <p:cNvGrpSpPr/>
+        <p:nvPr/>
+      </p:nvGrpSpPr>
+      <p:grpSpPr>
+        <a:xfrm>
+          <a:off x="0" y="0"/>
+          <a:ext cx="0" cy="0"/>
+          <a:chOff x="0" y="0"/>
+          <a:chExt cx="0" cy="0"/>
+        </a:xfrm>
+      </p:grpSpPr>
+      <p:sp>
+        <p:nvSpPr>
+          <p:cNvPr id="2" name="Slide Image Placeholder 1"/>
+          <p:cNvSpPr>
+            <a:spLocks noGrp="1" noRot="1" noChangeAspect="1"/>
+          </p:cNvSpPr>
+          <p:nvPr>
+            <p:ph type="sldImg"/>
+          </p:nvPr>
+        </p:nvSpPr>
+        <p:spPr/>
+      </p:sp>
+      <p:sp>
+        <p:nvSpPr>
+          <p:cNvPr id="3" name="Notes Placeholder 2"/>
+          <p:cNvSpPr>
+            <a:spLocks noGrp="1"/>
+          </p:cNvSpPr>
+          <p:nvPr>
+            <p:ph type="body" idx="1"/>
+          </p:nvPr>
+        </p:nvSpPr>
+        <p:spPr/>
+        <p:txBody>
+          <a:bodyPr/>
+          <a:lstStyle/>
+          <a:p>
+            <a:r>
+              <a:rPr lang="en-US" dirty="0" smtClean="0"/>
+              <a:t>Summary of the 9 tests run on DataChannel.java</a:t>
+            </a:r>
+            <a:r>
+              <a:rPr lang="en-US" baseline="0" dirty="0" smtClean="0"/>
+              <a:t> class</a:t>
+            </a:r>
+            <a:endParaRPr lang="en-US" dirty="0"/>
+          </a:p>
+        </p:txBody>
+      </p:sp>
+      <p:sp>
+        <p:nvSpPr>
+          <p:cNvPr id="4" name="Slide Number Placeholder 3"/>
+          <p:cNvSpPr>
+            <a:spLocks noGrp="1"/>
+          </p:cNvSpPr>
+          <p:nvPr>
+            <p:ph type="sldNum" sz="quarter" idx="10"/>
+          </p:nvPr>
+        </p:nvSpPr>
+        <p:spPr/>
+        <p:txBody>
+          <a:bodyPr/>
+          <a:lstStyle/>
+          <a:p>
+            <a:fld id="{377211F2-1C6A-4F10-9506-C7C062274F4F}" type="slidenum">
+              <a:rPr lang="en-CA" smtClean="0"/>
+              <a:t>14</a:t>
+            </a:fld>
+            <a:endParaRPr lang="en-CA"/>
+          </a:p>
+        </p:txBody>
+      </p:sp>
+    </p:spTree>
+    <p:extLst>
+      <p:ext uri="{BB962C8B-B14F-4D97-AF65-F5344CB8AC3E}">
+        <p14:creationId xmlns:p14="http://schemas.microsoft.com/office/powerpoint/2010/main" val="3674502506"/>
+      </p:ext>
+    </p:extLst>
+  </p:cSld>
+  <p:clrMapOvr>
+    <a:masterClrMapping/>
+  </p:clrMapOvr>
+</p:notes>
+</file>
+
+<file path=ppt/notesSlides/notesSlide15.xml><?xml version="1.0" encoding="utf-8"?>
+<p:notes xmlns:a="http://schemas.openxmlformats.org/drawingml/2006/main" xmlns:r="http://schemas.openxmlformats.org/officeDocument/2006/relationships" xmlns:p="http://schemas.openxmlformats.org/presentationml/2006/main">
+  <p:cSld>
+    <p:spTree>
+      <p:nvGrpSpPr>
+        <p:cNvPr id="1" name=""/>
+        <p:cNvGrpSpPr/>
+        <p:nvPr/>
+      </p:nvGrpSpPr>
+      <p:grpSpPr>
+        <a:xfrm>
+          <a:off x="0" y="0"/>
+          <a:ext cx="0" cy="0"/>
+          <a:chOff x="0" y="0"/>
+          <a:chExt cx="0" cy="0"/>
+        </a:xfrm>
+      </p:grpSpPr>
+      <p:sp>
+        <p:nvSpPr>
+          <p:cNvPr id="2" name="Slide Image Placeholder 1"/>
+          <p:cNvSpPr>
+            <a:spLocks noGrp="1" noRot="1" noChangeAspect="1"/>
+          </p:cNvSpPr>
+          <p:nvPr>
+            <p:ph type="sldImg"/>
+          </p:nvPr>
+        </p:nvSpPr>
+        <p:spPr/>
+      </p:sp>
+      <p:sp>
+        <p:nvSpPr>
+          <p:cNvPr id="3" name="Notes Placeholder 2"/>
+          <p:cNvSpPr>
+            <a:spLocks noGrp="1"/>
+          </p:cNvSpPr>
+          <p:nvPr>
+            <p:ph type="body" idx="1"/>
+          </p:nvPr>
+        </p:nvSpPr>
+        <p:spPr/>
+        <p:txBody>
+          <a:bodyPr/>
+          <a:lstStyle/>
+          <a:p>
+            <a:r>
+              <a:rPr lang="en-US" dirty="0" smtClean="0"/>
+              <a:t>no star denotes packet from an interface to server</a:t>
+            </a:r>
+          </a:p>
+          <a:p>
+            <a:r>
+              <a:rPr lang="en-US" dirty="0" smtClean="0"/>
+              <a:t>* denotes packet from server to alarm</a:t>
+            </a:r>
+          </a:p>
+          <a:p>
+            <a:r>
+              <a:rPr lang="en-US" dirty="0" smtClean="0"/>
+              <a:t>** denotes packet from server </a:t>
+            </a:r>
+            <a:r>
+              <a:rPr lang="en-US" baseline="0" dirty="0" smtClean="0"/>
+              <a:t>to coffee maker</a:t>
+            </a:r>
+          </a:p>
+          <a:p>
+            <a:r>
+              <a:rPr lang="en-US" baseline="0" dirty="0" smtClean="0"/>
+              <a:t>*** denotes packet from coffee maker to server</a:t>
+            </a:r>
+          </a:p>
+          <a:p>
+            <a:endParaRPr lang="en-US" baseline="0" dirty="0" smtClean="0"/>
+          </a:p>
+          <a:p>
+            <a:endParaRPr lang="en-US" baseline="0" dirty="0" smtClean="0"/>
+          </a:p>
+          <a:p>
+            <a:r>
+              <a:rPr lang="en-US" baseline="0" dirty="0" smtClean="0"/>
+              <a:t>What we got so far, will be increased. </a:t>
+            </a:r>
+          </a:p>
+          <a:p>
+            <a:endParaRPr lang="en-US" baseline="0" dirty="0" smtClean="0"/>
+          </a:p>
+          <a:p>
+            <a:r>
+              <a:rPr lang="en-US" baseline="0" dirty="0" smtClean="0"/>
+              <a:t>Due to the high degree of modularity in the system, this list will change. Wee keep an updated list on our </a:t>
+            </a:r>
+            <a:r>
+              <a:rPr lang="en-US" baseline="0" dirty="0" err="1" smtClean="0"/>
+              <a:t>git</a:t>
+            </a:r>
+            <a:r>
+              <a:rPr lang="en-US" baseline="0" dirty="0" smtClean="0"/>
+              <a:t>. It describes all commands, parameters and expected outputs.</a:t>
+            </a:r>
+          </a:p>
+          <a:p>
+            <a:endParaRPr lang="en-US" baseline="0" dirty="0" smtClean="0"/>
+          </a:p>
+          <a:p>
+            <a:r>
+              <a:rPr lang="en-US" baseline="0" dirty="0" smtClean="0"/>
+              <a:t>Empty info pack=</a:t>
+            </a:r>
+            <a:r>
+              <a:rPr lang="en-US" baseline="0" dirty="0" err="1" smtClean="0"/>
+              <a:t>succesfull</a:t>
+            </a:r>
+            <a:r>
+              <a:rPr lang="en-US" baseline="0" dirty="0" smtClean="0"/>
+              <a:t> </a:t>
+            </a:r>
+            <a:endParaRPr lang="en-US" dirty="0" smtClean="0"/>
+          </a:p>
+          <a:p>
+            <a:endParaRPr lang="en-US" dirty="0"/>
+          </a:p>
+        </p:txBody>
+      </p:sp>
+      <p:sp>
+        <p:nvSpPr>
+          <p:cNvPr id="4" name="Slide Number Placeholder 3"/>
+          <p:cNvSpPr>
+            <a:spLocks noGrp="1"/>
+          </p:cNvSpPr>
+          <p:nvPr>
+            <p:ph type="sldNum" sz="quarter" idx="10"/>
+          </p:nvPr>
+        </p:nvSpPr>
+        <p:spPr/>
+        <p:txBody>
+          <a:bodyPr/>
+          <a:lstStyle/>
+          <a:p>
+            <a:fld id="{377211F2-1C6A-4F10-9506-C7C062274F4F}" type="slidenum">
+              <a:rPr lang="en-CA" smtClean="0"/>
+              <a:t>20</a:t>
+            </a:fld>
+            <a:endParaRPr lang="en-CA"/>
+          </a:p>
+        </p:txBody>
+      </p:sp>
+    </p:spTree>
+    <p:extLst>
+      <p:ext uri="{BB962C8B-B14F-4D97-AF65-F5344CB8AC3E}">
+        <p14:creationId xmlns:p14="http://schemas.microsoft.com/office/powerpoint/2010/main" val="608271338"/>
+      </p:ext>
+    </p:extLst>
+  </p:cSld>
+  <p:clrMapOvr>
+    <a:masterClrMapping/>
+  </p:clrMapOvr>
+</p:notes>
+</file>
+
+<file path=ppt/notesSlides/notesSlide16.xml><?xml version="1.0" encoding="utf-8"?>
+<p:notes xmlns:a="http://schemas.openxmlformats.org/drawingml/2006/main" xmlns:r="http://schemas.openxmlformats.org/officeDocument/2006/relationships" xmlns:p="http://schemas.openxmlformats.org/presentationml/2006/main">
+  <p:cSld>
+    <p:spTree>
+      <p:nvGrpSpPr>
+        <p:cNvPr id="1" name=""/>
+        <p:cNvGrpSpPr/>
+        <p:nvPr/>
+      </p:nvGrpSpPr>
+      <p:grpSpPr>
+        <a:xfrm>
+          <a:off x="0" y="0"/>
+          <a:ext cx="0" cy="0"/>
+          <a:chOff x="0" y="0"/>
+          <a:chExt cx="0" cy="0"/>
+        </a:xfrm>
+      </p:grpSpPr>
+      <p:sp>
+        <p:nvSpPr>
+          <p:cNvPr id="2" name="Slide Image Placeholder 1"/>
+          <p:cNvSpPr>
+            <a:spLocks noGrp="1" noRot="1" noChangeAspect="1"/>
+          </p:cNvSpPr>
+          <p:nvPr>
+            <p:ph type="sldImg"/>
+          </p:nvPr>
+        </p:nvSpPr>
+        <p:spPr/>
+      </p:sp>
+      <p:sp>
+        <p:nvSpPr>
+          <p:cNvPr id="3" name="Notes Placeholder 2"/>
+          <p:cNvSpPr>
+            <a:spLocks noGrp="1"/>
+          </p:cNvSpPr>
+          <p:nvPr>
+            <p:ph type="body" idx="1"/>
+          </p:nvPr>
+        </p:nvSpPr>
+        <p:spPr/>
+        <p:txBody>
+          <a:bodyPr/>
+          <a:lstStyle/>
+          <a:p>
+            <a:r>
+              <a:rPr lang="en-US" dirty="0" smtClean="0"/>
+              <a:t>no star denotes packet from an interface to server</a:t>
+            </a:r>
+          </a:p>
+          <a:p>
+            <a:r>
+              <a:rPr lang="en-US" dirty="0" smtClean="0"/>
+              <a:t>* denotes packet from server to alarm</a:t>
+            </a:r>
+          </a:p>
+          <a:p>
+            <a:r>
+              <a:rPr lang="en-US" dirty="0" smtClean="0"/>
+              <a:t>** denotes packet from server </a:t>
+            </a:r>
+            <a:r>
+              <a:rPr lang="en-US" baseline="0" dirty="0" smtClean="0"/>
+              <a:t>to coffee maker</a:t>
+            </a:r>
+          </a:p>
+          <a:p>
+            <a:r>
+              <a:rPr lang="en-US" baseline="0" dirty="0" smtClean="0"/>
+              <a:t>*** denotes packet from coffee maker to server</a:t>
+            </a:r>
+            <a:endParaRPr lang="en-US" dirty="0" smtClean="0"/>
+          </a:p>
+        </p:txBody>
+      </p:sp>
+      <p:sp>
+        <p:nvSpPr>
+          <p:cNvPr id="4" name="Slide Number Placeholder 3"/>
+          <p:cNvSpPr>
+            <a:spLocks noGrp="1"/>
+          </p:cNvSpPr>
+          <p:nvPr>
+            <p:ph type="sldNum" sz="quarter" idx="10"/>
+          </p:nvPr>
+        </p:nvSpPr>
+        <p:spPr/>
+        <p:txBody>
+          <a:bodyPr/>
+          <a:lstStyle/>
+          <a:p>
+            <a:fld id="{377211F2-1C6A-4F10-9506-C7C062274F4F}" type="slidenum">
+              <a:rPr lang="en-CA" smtClean="0"/>
+              <a:t>21</a:t>
+            </a:fld>
+            <a:endParaRPr lang="en-CA"/>
+          </a:p>
+        </p:txBody>
+      </p:sp>
+    </p:spTree>
+    <p:extLst>
+      <p:ext uri="{BB962C8B-B14F-4D97-AF65-F5344CB8AC3E}">
+        <p14:creationId xmlns:p14="http://schemas.microsoft.com/office/powerpoint/2010/main" val="719209822"/>
+      </p:ext>
+    </p:extLst>
+  </p:cSld>
+  <p:clrMapOvr>
+    <a:masterClrMapping/>
+  </p:clrMapOvr>
+</p:notes>
+</file>
+
+<file path=ppt/notesSlides/notesSlide17.xml><?xml version="1.0" encoding="utf-8"?>
+<p:notes xmlns:a="http://schemas.openxmlformats.org/drawingml/2006/main" xmlns:r="http://schemas.openxmlformats.org/officeDocument/2006/relationships" xmlns:p="http://schemas.openxmlformats.org/presentationml/2006/main">
+  <p:cSld>
+    <p:spTree>
+      <p:nvGrpSpPr>
+        <p:cNvPr id="1" name=""/>
+        <p:cNvGrpSpPr/>
+        <p:nvPr/>
+      </p:nvGrpSpPr>
+      <p:grpSpPr>
+        <a:xfrm>
+          <a:off x="0" y="0"/>
+          <a:ext cx="0" cy="0"/>
+          <a:chOff x="0" y="0"/>
+          <a:chExt cx="0" cy="0"/>
+        </a:xfrm>
+      </p:grpSpPr>
+      <p:sp>
+        <p:nvSpPr>
+          <p:cNvPr id="2" name="Slide Image Placeholder 1"/>
+          <p:cNvSpPr>
+            <a:spLocks noGrp="1" noRot="1" noChangeAspect="1"/>
+          </p:cNvSpPr>
+          <p:nvPr>
+            <p:ph type="sldImg"/>
+          </p:nvPr>
+        </p:nvSpPr>
+        <p:spPr/>
+      </p:sp>
+      <p:sp>
+        <p:nvSpPr>
+          <p:cNvPr id="3" name="Notes Placeholder 2"/>
+          <p:cNvSpPr>
+            <a:spLocks noGrp="1"/>
+          </p:cNvSpPr>
+          <p:nvPr>
+            <p:ph type="body" idx="1"/>
+          </p:nvPr>
+        </p:nvSpPr>
+        <p:spPr/>
+        <p:txBody>
+          <a:bodyPr/>
+          <a:lstStyle/>
+          <a:p>
+            <a:r>
+              <a:rPr lang="en-US" dirty="0" smtClean="0"/>
+              <a:t>Commands can be seen @ </a:t>
+            </a:r>
+            <a:r>
+              <a:rPr lang="en-US" dirty="0" smtClean="0">
+                <a:sym typeface="Wingdings" panose="05000000000000000000" pitchFamily="2" charset="2"/>
+              </a:rPr>
+              <a:t> </a:t>
+            </a:r>
+            <a:r>
+              <a:rPr lang="en-US" dirty="0" smtClean="0"/>
+              <a:t>https://github.com/SYSC-3010-F5/AVA-SH/blob/master/docs/AVA-Command-Manifest.txt</a:t>
+            </a:r>
+          </a:p>
+          <a:p>
+            <a:endParaRPr lang="en-US" dirty="0" smtClean="0"/>
+          </a:p>
+          <a:p>
+            <a:r>
+              <a:rPr lang="en-US" dirty="0" smtClean="0"/>
+              <a:t>no star denotes packet from an interface to server</a:t>
+            </a:r>
+          </a:p>
+          <a:p>
+            <a:r>
+              <a:rPr lang="en-US" dirty="0" smtClean="0"/>
+              <a:t>* denotes packet from server to alarm</a:t>
+            </a:r>
+          </a:p>
+          <a:p>
+            <a:r>
+              <a:rPr lang="en-US" dirty="0" smtClean="0"/>
+              <a:t>** denotes packet from server </a:t>
+            </a:r>
+            <a:r>
+              <a:rPr lang="en-US" baseline="0" dirty="0" smtClean="0"/>
+              <a:t>to coffee maker</a:t>
+            </a:r>
+          </a:p>
+          <a:p>
+            <a:r>
+              <a:rPr lang="en-US" baseline="0" dirty="0" smtClean="0"/>
+              <a:t>*** denotes packet from coffee maker to server</a:t>
+            </a:r>
+            <a:endParaRPr lang="en-US" dirty="0" smtClean="0"/>
+          </a:p>
+          <a:p>
+            <a:endParaRPr lang="en-US" dirty="0"/>
+          </a:p>
+        </p:txBody>
+      </p:sp>
+      <p:sp>
+        <p:nvSpPr>
+          <p:cNvPr id="4" name="Slide Number Placeholder 3"/>
+          <p:cNvSpPr>
+            <a:spLocks noGrp="1"/>
+          </p:cNvSpPr>
+          <p:nvPr>
+            <p:ph type="sldNum" sz="quarter" idx="10"/>
+          </p:nvPr>
+        </p:nvSpPr>
+        <p:spPr/>
+        <p:txBody>
+          <a:bodyPr/>
+          <a:lstStyle/>
+          <a:p>
+            <a:fld id="{377211F2-1C6A-4F10-9506-C7C062274F4F}" type="slidenum">
+              <a:rPr lang="en-CA" smtClean="0"/>
+              <a:t>22</a:t>
+            </a:fld>
+            <a:endParaRPr lang="en-CA"/>
+          </a:p>
+        </p:txBody>
+      </p:sp>
+    </p:spTree>
+    <p:extLst>
+      <p:ext uri="{BB962C8B-B14F-4D97-AF65-F5344CB8AC3E}">
+        <p14:creationId xmlns:p14="http://schemas.microsoft.com/office/powerpoint/2010/main" val="1550857964"/>
+      </p:ext>
+    </p:extLst>
+  </p:cSld>
+  <p:clrMapOvr>
+    <a:masterClrMapping/>
+  </p:clrMapOvr>
+</p:notes>
+</file>
+
+<file path=ppt/notesSlides/notesSlide18.xml><?xml version="1.0" encoding="utf-8"?>
+<p:notes xmlns:a="http://schemas.openxmlformats.org/drawingml/2006/main" xmlns:r="http://schemas.openxmlformats.org/officeDocument/2006/relationships" xmlns:p="http://schemas.openxmlformats.org/presentationml/2006/main">
+  <p:cSld>
+    <p:spTree>
+      <p:nvGrpSpPr>
+        <p:cNvPr id="1" name=""/>
+        <p:cNvGrpSpPr/>
+        <p:nvPr/>
+      </p:nvGrpSpPr>
+      <p:grpSpPr>
+        <a:xfrm>
+          <a:off x="0" y="0"/>
+          <a:ext cx="0" cy="0"/>
+          <a:chOff x="0" y="0"/>
+          <a:chExt cx="0" cy="0"/>
+        </a:xfrm>
+      </p:grpSpPr>
+      <p:sp>
+        <p:nvSpPr>
+          <p:cNvPr id="2" name="Slide Image Placeholder 1"/>
+          <p:cNvSpPr>
+            <a:spLocks noGrp="1" noRot="1" noChangeAspect="1"/>
+          </p:cNvSpPr>
+          <p:nvPr>
+            <p:ph type="sldImg"/>
+          </p:nvPr>
+        </p:nvSpPr>
+        <p:spPr/>
+      </p:sp>
+      <p:sp>
+        <p:nvSpPr>
+          <p:cNvPr id="3" name="Notes Placeholder 2"/>
+          <p:cNvSpPr>
+            <a:spLocks noGrp="1"/>
+          </p:cNvSpPr>
+          <p:nvPr>
+            <p:ph type="body" idx="1"/>
+          </p:nvPr>
+        </p:nvSpPr>
+        <p:spPr/>
+        <p:txBody>
+          <a:bodyPr/>
+          <a:lstStyle/>
+          <a:p>
+            <a:r>
+              <a:rPr lang="en-US" dirty="0"/>
+              <a:t>The system will need to be able to execute certain</a:t>
+            </a:r>
+            <a:r>
+              <a:rPr lang="en-US" baseline="0" dirty="0"/>
+              <a:t> actions at pre-defined times, such as brightening the wake-up lamp a certain time before wake-up</a:t>
+            </a:r>
+          </a:p>
+          <a:p>
+            <a:r>
+              <a:rPr lang="en-US" baseline="0" dirty="0"/>
+              <a:t>The system will need to answer and execute user commands quickly, with little perceived delay</a:t>
+            </a:r>
+          </a:p>
+          <a:p>
+            <a:r>
+              <a:rPr lang="en-US" baseline="0" dirty="0"/>
+              <a:t>The system should be highly modular, to make adding new modules easy, as well as encourage the use of </a:t>
+            </a:r>
+            <a:r>
+              <a:rPr lang="en-US" baseline="0" dirty="0" smtClean="0"/>
+              <a:t>modules</a:t>
+            </a:r>
+          </a:p>
+          <a:p>
+            <a:endParaRPr lang="en-US" baseline="0" dirty="0" smtClean="0"/>
+          </a:p>
+          <a:p>
+            <a:r>
+              <a:rPr lang="en-US" baseline="0" dirty="0" smtClean="0"/>
+              <a:t>-Server stress tester ensures, timely delivery</a:t>
+            </a:r>
+            <a:endParaRPr lang="en-US" dirty="0"/>
+          </a:p>
+        </p:txBody>
+      </p:sp>
+      <p:sp>
+        <p:nvSpPr>
+          <p:cNvPr id="4" name="Slide Number Placeholder 3"/>
+          <p:cNvSpPr>
+            <a:spLocks noGrp="1"/>
+          </p:cNvSpPr>
+          <p:nvPr>
+            <p:ph type="sldNum" sz="quarter" idx="10"/>
+          </p:nvPr>
+        </p:nvSpPr>
+        <p:spPr/>
+        <p:txBody>
+          <a:bodyPr/>
+          <a:lstStyle/>
+          <a:p>
+            <a:fld id="{377211F2-1C6A-4F10-9506-C7C062274F4F}" type="slidenum">
+              <a:rPr lang="en-CA" smtClean="0"/>
+              <a:t>23</a:t>
+            </a:fld>
+            <a:endParaRPr lang="en-CA"/>
+          </a:p>
+        </p:txBody>
+      </p:sp>
+    </p:spTree>
+    <p:extLst>
+      <p:ext uri="{BB962C8B-B14F-4D97-AF65-F5344CB8AC3E}">
+        <p14:creationId xmlns:p14="http://schemas.microsoft.com/office/powerpoint/2010/main" val="3067485228"/>
+      </p:ext>
+    </p:extLst>
+  </p:cSld>
+  <p:clrMapOvr>
+    <a:masterClrMapping/>
+  </p:clrMapOvr>
+</p:notes>
+</file>
+
+<file path=ppt/notesSlides/notesSlide19.xml><?xml version="1.0" encoding="utf-8"?>
+<p:notes xmlns:a="http://schemas.openxmlformats.org/drawingml/2006/main" xmlns:r="http://schemas.openxmlformats.org/officeDocument/2006/relationships" xmlns:p="http://schemas.openxmlformats.org/presentationml/2006/main">
+  <p:cSld>
+    <p:spTree>
+      <p:nvGrpSpPr>
+        <p:cNvPr id="1" name=""/>
+        <p:cNvGrpSpPr/>
+        <p:nvPr/>
+      </p:nvGrpSpPr>
+      <p:grpSpPr>
+        <a:xfrm>
+          <a:off x="0" y="0"/>
+          <a:ext cx="0" cy="0"/>
+          <a:chOff x="0" y="0"/>
+          <a:chExt cx="0" cy="0"/>
+        </a:xfrm>
+      </p:grpSpPr>
+      <p:sp>
+        <p:nvSpPr>
+          <p:cNvPr id="2" name="Slide Image Placeholder 1"/>
+          <p:cNvSpPr>
+            <a:spLocks noGrp="1" noRot="1" noChangeAspect="1"/>
+          </p:cNvSpPr>
+          <p:nvPr>
+            <p:ph type="sldImg"/>
+          </p:nvPr>
+        </p:nvSpPr>
+        <p:spPr/>
+      </p:sp>
+      <p:sp>
+        <p:nvSpPr>
+          <p:cNvPr id="3" name="Notes Placeholder 2"/>
+          <p:cNvSpPr>
+            <a:spLocks noGrp="1"/>
+          </p:cNvSpPr>
+          <p:nvPr>
+            <p:ph type="body" idx="1"/>
+          </p:nvPr>
+        </p:nvSpPr>
+        <p:spPr/>
+        <p:txBody>
+          <a:bodyPr/>
+          <a:lstStyle/>
+          <a:p>
+            <a:r>
+              <a:rPr lang="en-US" dirty="0" smtClean="0"/>
+              <a:t>-Delegation to modules</a:t>
+            </a:r>
+          </a:p>
+          <a:p>
+            <a:endParaRPr lang="en-US" dirty="0" smtClean="0"/>
+          </a:p>
+          <a:p>
+            <a:r>
+              <a:rPr lang="en-US" dirty="0" smtClean="0"/>
+              <a:t>Server Event Timer:</a:t>
+            </a:r>
+          </a:p>
+          <a:p>
+            <a:r>
+              <a:rPr lang="en-US" dirty="0" smtClean="0"/>
+              <a:t>-Thread</a:t>
+            </a:r>
+            <a:r>
+              <a:rPr lang="en-US" baseline="0" dirty="0" smtClean="0"/>
+              <a:t> that sleeps until the required time</a:t>
+            </a:r>
+          </a:p>
+          <a:p>
+            <a:endParaRPr lang="en-US" dirty="0"/>
+          </a:p>
+        </p:txBody>
+      </p:sp>
+      <p:sp>
+        <p:nvSpPr>
+          <p:cNvPr id="4" name="Slide Number Placeholder 3"/>
+          <p:cNvSpPr>
+            <a:spLocks noGrp="1"/>
+          </p:cNvSpPr>
+          <p:nvPr>
+            <p:ph type="sldNum" sz="quarter" idx="10"/>
+          </p:nvPr>
+        </p:nvSpPr>
+        <p:spPr/>
+        <p:txBody>
+          <a:bodyPr/>
+          <a:lstStyle/>
+          <a:p>
+            <a:fld id="{377211F2-1C6A-4F10-9506-C7C062274F4F}" type="slidenum">
+              <a:rPr lang="en-CA" smtClean="0"/>
+              <a:t>24</a:t>
+            </a:fld>
+            <a:endParaRPr lang="en-CA"/>
+          </a:p>
+        </p:txBody>
+      </p:sp>
+    </p:spTree>
+    <p:extLst>
+      <p:ext uri="{BB962C8B-B14F-4D97-AF65-F5344CB8AC3E}">
+        <p14:creationId xmlns:p14="http://schemas.microsoft.com/office/powerpoint/2010/main" val="210964540"/>
       </p:ext>
     </p:extLst>
   </p:cSld>
@@ -1250,33 +1931,165 @@
           <a:p>
             <a:r>
               <a:rPr lang="en-US" dirty="0"/>
-              <a:t>Network Diagram of</a:t>
+              <a:t>Windows/Linux</a:t>
             </a:r>
             <a:r>
               <a:rPr lang="en-US" baseline="0" dirty="0"/>
-              <a:t> the AVA-SH</a:t>
+              <a:t> PC:</a:t>
             </a:r>
           </a:p>
           <a:p>
             <a:r>
               <a:rPr lang="en-US" baseline="0" dirty="0"/>
-              <a:t>The user interfaces do not communicate directly with the modules, they only communicate with the server which can then pass the commands to the modules</a:t>
-            </a:r>
-          </a:p>
-          <a:p>
+              <a:t>-will be acting as server, using a </a:t>
+            </a:r>
+            <a:r>
+              <a:rPr lang="en-US" baseline="0" dirty="0" err="1"/>
+              <a:t>MainServer</a:t>
+            </a:r>
             <a:r>
               <a:rPr lang="en-US" baseline="0" dirty="0"/>
-              <a:t>The modules also should not communicate directly with each other, to maintain high modularity</a:t>
+              <a:t> class, the DSKY interface and custom made datatypes</a:t>
+            </a:r>
+          </a:p>
+          <a:p>
+            <a:r>
+              <a:rPr lang="en-US" baseline="0" dirty="0"/>
+              <a:t>-able to communicate with all modules using UDP</a:t>
+            </a:r>
+          </a:p>
+          <a:p>
+            <a:r>
+              <a:rPr lang="en-US" baseline="0" dirty="0"/>
+              <a:t/>
+            </a:r>
+            <a:br>
+              <a:rPr lang="en-US" baseline="0" dirty="0"/>
+            </a:br>
+            <a:r>
+              <a:rPr lang="en-US" baseline="0" dirty="0"/>
+              <a:t>Media Controller</a:t>
+            </a:r>
+          </a:p>
+          <a:p>
+            <a:r>
+              <a:rPr lang="en-US" baseline="0" dirty="0"/>
+              <a:t>-used to play music, and possibly video</a:t>
+            </a:r>
+          </a:p>
+          <a:p>
+            <a:r>
+              <a:rPr lang="en-US" baseline="0" dirty="0"/>
+              <a:t>-Has database of music and video the user can play</a:t>
             </a:r>
           </a:p>
           <a:p>
             <a:endParaRPr lang="en-US" baseline="0" dirty="0"/>
           </a:p>
           <a:p>
+            <a:endParaRPr lang="en-US" baseline="0" dirty="0"/>
+          </a:p>
+          <a:p>
             <a:r>
               <a:rPr lang="en-US" baseline="0" dirty="0"/>
-              <a:t>Uses Client-Server design, wherein the modules/interfaces are the clients and the server is the main AVA serve</a:t>
-            </a:r>
+              <a:t>Light Controller:</a:t>
+            </a:r>
+          </a:p>
+          <a:p>
+            <a:r>
+              <a:rPr lang="en-US" baseline="0" dirty="0"/>
+              <a:t>-RPi will communicate with 1 component</a:t>
+            </a:r>
+          </a:p>
+          <a:p>
+            <a:r>
+              <a:rPr lang="en-US" baseline="0" dirty="0"/>
+              <a:t>	1. LED’s: used to slowly brighten room</a:t>
+            </a:r>
+          </a:p>
+          <a:p>
+            <a:r>
+              <a:rPr lang="en-US" baseline="0" dirty="0"/>
+              <a:t>	     -will be controlled using PWM on a GPIO pin</a:t>
+            </a:r>
+          </a:p>
+          <a:p>
+            <a:r>
+              <a:rPr lang="en-US" baseline="0" dirty="0"/>
+              <a:t>-also has a speaker used to play an alarm (using the 3.5mm jack on the RPi)</a:t>
+            </a:r>
+          </a:p>
+          <a:p>
+            <a:endParaRPr lang="en-US" baseline="0" dirty="0"/>
+          </a:p>
+          <a:p>
+            <a:endParaRPr lang="en-US" baseline="0" dirty="0"/>
+          </a:p>
+          <a:p>
+            <a:r>
+              <a:rPr lang="en-US" baseline="0" dirty="0"/>
+              <a:t>Coffee Maker:</a:t>
+            </a:r>
+          </a:p>
+          <a:p>
+            <a:r>
+              <a:rPr lang="en-US" baseline="0" dirty="0"/>
+              <a:t>-RPi will communicate with 3 components:</a:t>
+            </a:r>
+          </a:p>
+          <a:p>
+            <a:r>
+              <a:rPr lang="en-US" baseline="0" dirty="0"/>
+              <a:t>	1. Electronic Scale: used to weigh cup before and during coffee making to make sure proper amounts of coffee are made</a:t>
+            </a:r>
+          </a:p>
+          <a:p>
+            <a:r>
+              <a:rPr lang="en-US" baseline="0" dirty="0"/>
+              <a:t>	     -interfaced using USB port on RPi</a:t>
+            </a:r>
+          </a:p>
+          <a:p>
+            <a:r>
+              <a:rPr lang="en-US" baseline="0" dirty="0"/>
+              <a:t>	2. Thermometer: used to monitor water temp</a:t>
+            </a:r>
+          </a:p>
+          <a:p>
+            <a:r>
+              <a:rPr lang="en-US" baseline="0" dirty="0"/>
+              <a:t>	    -interfaced using AD converted on Gertboard</a:t>
+            </a:r>
+          </a:p>
+          <a:p>
+            <a:r>
+              <a:rPr lang="en-US" baseline="0" dirty="0"/>
+              <a:t>	3. Heating Element: used to heat water</a:t>
+            </a:r>
+          </a:p>
+          <a:p>
+            <a:r>
+              <a:rPr lang="en-US" baseline="0" dirty="0"/>
+              <a:t>	    -interfaced via RPi GPIO connected to a simple transistor</a:t>
+            </a:r>
+          </a:p>
+          <a:p>
+            <a:endParaRPr lang="en-US" baseline="0" dirty="0"/>
+          </a:p>
+          <a:p>
+            <a:r>
+              <a:rPr lang="en-US" baseline="0" dirty="0"/>
+              <a:t>Terminal:</a:t>
+            </a:r>
+          </a:p>
+          <a:p>
+            <a:r>
+              <a:rPr lang="en-US" baseline="0" dirty="0"/>
+              <a:t>-GUI for user to enter commands to AVA</a:t>
+            </a:r>
+          </a:p>
+          <a:p>
+            <a:endParaRPr lang="en-US" baseline="0" dirty="0"/>
           </a:p>
         </p:txBody>
       </p:sp>
@@ -1297,7 +2110,7 @@
           <a:p>
             <a:fld id="{377211F2-1C6A-4F10-9506-C7C062274F4F}" type="slidenum">
               <a:rPr lang="en-CA" smtClean="0"/>
-              <a:t>3</a:t>
+              <a:t>2</a:t>
             </a:fld>
             <a:endParaRPr lang="en-CA"/>
           </a:p>
@@ -1306,7 +2119,240 @@
     </p:spTree>
     <p:extLst>
       <p:ext uri="{BB962C8B-B14F-4D97-AF65-F5344CB8AC3E}">
-        <p14:creationId xmlns:p14="http://schemas.microsoft.com/office/powerpoint/2010/main" val="36808023"/>
+        <p14:creationId xmlns:p14="http://schemas.microsoft.com/office/powerpoint/2010/main" val="4293445802"/>
+      </p:ext>
+    </p:extLst>
+  </p:cSld>
+  <p:clrMapOvr>
+    <a:masterClrMapping/>
+  </p:clrMapOvr>
+</p:notes>
+</file>
+
+<file path=ppt/notesSlides/notesSlide20.xml><?xml version="1.0" encoding="utf-8"?>
+<p:notes xmlns:a="http://schemas.openxmlformats.org/drawingml/2006/main" xmlns:r="http://schemas.openxmlformats.org/officeDocument/2006/relationships" xmlns:p="http://schemas.openxmlformats.org/presentationml/2006/main">
+  <p:cSld>
+    <p:spTree>
+      <p:nvGrpSpPr>
+        <p:cNvPr id="1" name=""/>
+        <p:cNvGrpSpPr/>
+        <p:nvPr/>
+      </p:nvGrpSpPr>
+      <p:grpSpPr>
+        <a:xfrm>
+          <a:off x="0" y="0"/>
+          <a:ext cx="0" cy="0"/>
+          <a:chOff x="0" y="0"/>
+          <a:chExt cx="0" cy="0"/>
+        </a:xfrm>
+      </p:grpSpPr>
+      <p:sp>
+        <p:nvSpPr>
+          <p:cNvPr id="2" name="Slide Image Placeholder 1"/>
+          <p:cNvSpPr>
+            <a:spLocks noGrp="1" noRot="1" noChangeAspect="1"/>
+          </p:cNvSpPr>
+          <p:nvPr>
+            <p:ph type="sldImg"/>
+          </p:nvPr>
+        </p:nvSpPr>
+        <p:spPr/>
+      </p:sp>
+      <p:sp>
+        <p:nvSpPr>
+          <p:cNvPr id="3" name="Notes Placeholder 2"/>
+          <p:cNvSpPr>
+            <a:spLocks noGrp="1"/>
+          </p:cNvSpPr>
+          <p:nvPr>
+            <p:ph type="body" idx="1"/>
+          </p:nvPr>
+        </p:nvSpPr>
+        <p:spPr/>
+        <p:txBody>
+          <a:bodyPr/>
+          <a:lstStyle/>
+          <a:p>
+            <a:r>
+              <a:rPr lang="en-US" dirty="0" smtClean="0"/>
+              <a:t>The</a:t>
+            </a:r>
+            <a:r>
+              <a:rPr lang="en-US" baseline="0" dirty="0" smtClean="0"/>
+              <a:t> </a:t>
+            </a:r>
+            <a:r>
+              <a:rPr lang="en-US" baseline="0" dirty="0" err="1" smtClean="0"/>
+              <a:t>RPi</a:t>
+            </a:r>
+            <a:r>
+              <a:rPr lang="en-US" baseline="0" dirty="0" smtClean="0"/>
+              <a:t> relays control a 120V rated relay that connects the coffee maker to a 120V AC wall voltage.</a:t>
+            </a:r>
+          </a:p>
+          <a:p>
+            <a:r>
+              <a:rPr lang="en-US" baseline="0" dirty="0" smtClean="0"/>
+              <a:t>A </a:t>
+            </a:r>
+            <a:r>
+              <a:rPr lang="en-US" baseline="0" dirty="0" smtClean="0"/>
+              <a:t>330 </a:t>
+            </a:r>
+            <a:r>
+              <a:rPr lang="en-US" baseline="0" dirty="0" smtClean="0"/>
+              <a:t>ohm resistor combined with an LED demonstrates that current is present. </a:t>
+            </a:r>
+          </a:p>
+          <a:p>
+            <a:r>
+              <a:rPr lang="en-US" baseline="0" dirty="0" smtClean="0"/>
+              <a:t>Water is boiled by a heating element.</a:t>
+            </a:r>
+          </a:p>
+        </p:txBody>
+      </p:sp>
+      <p:sp>
+        <p:nvSpPr>
+          <p:cNvPr id="4" name="Slide Number Placeholder 3"/>
+          <p:cNvSpPr>
+            <a:spLocks noGrp="1"/>
+          </p:cNvSpPr>
+          <p:nvPr>
+            <p:ph type="sldNum" sz="quarter" idx="10"/>
+          </p:nvPr>
+        </p:nvSpPr>
+        <p:spPr/>
+        <p:txBody>
+          <a:bodyPr/>
+          <a:lstStyle/>
+          <a:p>
+            <a:fld id="{377211F2-1C6A-4F10-9506-C7C062274F4F}" type="slidenum">
+              <a:rPr lang="en-CA" smtClean="0"/>
+              <a:t>25</a:t>
+            </a:fld>
+            <a:endParaRPr lang="en-CA"/>
+          </a:p>
+        </p:txBody>
+      </p:sp>
+    </p:spTree>
+    <p:extLst>
+      <p:ext uri="{BB962C8B-B14F-4D97-AF65-F5344CB8AC3E}">
+        <p14:creationId xmlns:p14="http://schemas.microsoft.com/office/powerpoint/2010/main" val="235079551"/>
+      </p:ext>
+    </p:extLst>
+  </p:cSld>
+  <p:clrMapOvr>
+    <a:masterClrMapping/>
+  </p:clrMapOvr>
+</p:notes>
+</file>
+
+<file path=ppt/notesSlides/notesSlide21.xml><?xml version="1.0" encoding="utf-8"?>
+<p:notes xmlns:a="http://schemas.openxmlformats.org/drawingml/2006/main" xmlns:r="http://schemas.openxmlformats.org/officeDocument/2006/relationships" xmlns:p="http://schemas.openxmlformats.org/presentationml/2006/main">
+  <p:cSld>
+    <p:spTree>
+      <p:nvGrpSpPr>
+        <p:cNvPr id="1" name=""/>
+        <p:cNvGrpSpPr/>
+        <p:nvPr/>
+      </p:nvGrpSpPr>
+      <p:grpSpPr>
+        <a:xfrm>
+          <a:off x="0" y="0"/>
+          <a:ext cx="0" cy="0"/>
+          <a:chOff x="0" y="0"/>
+          <a:chExt cx="0" cy="0"/>
+        </a:xfrm>
+      </p:grpSpPr>
+      <p:sp>
+        <p:nvSpPr>
+          <p:cNvPr id="2" name="Slide Image Placeholder 1"/>
+          <p:cNvSpPr>
+            <a:spLocks noGrp="1" noRot="1" noChangeAspect="1"/>
+          </p:cNvSpPr>
+          <p:nvPr>
+            <p:ph type="sldImg"/>
+          </p:nvPr>
+        </p:nvSpPr>
+        <p:spPr/>
+      </p:sp>
+      <p:sp>
+        <p:nvSpPr>
+          <p:cNvPr id="3" name="Notes Placeholder 2"/>
+          <p:cNvSpPr>
+            <a:spLocks noGrp="1"/>
+          </p:cNvSpPr>
+          <p:nvPr>
+            <p:ph type="body" idx="1"/>
+          </p:nvPr>
+        </p:nvSpPr>
+        <p:spPr/>
+        <p:txBody>
+          <a:bodyPr/>
+          <a:lstStyle/>
+          <a:p>
+            <a:r>
+              <a:rPr lang="en-US" dirty="0"/>
+              <a:t>-Bot</a:t>
+            </a:r>
+            <a:r>
+              <a:rPr lang="en-US" baseline="0" dirty="0"/>
+              <a:t>h Terminal and Server complete </a:t>
+            </a:r>
+          </a:p>
+          <a:p>
+            <a:r>
+              <a:rPr lang="en-US" dirty="0" smtClean="0"/>
+              <a:t>-App</a:t>
+            </a:r>
+            <a:r>
+              <a:rPr lang="en-US" baseline="0" dirty="0" smtClean="0"/>
+              <a:t> functional</a:t>
+            </a:r>
+          </a:p>
+          <a:p>
+            <a:r>
+              <a:rPr lang="en-US" baseline="0" dirty="0" smtClean="0"/>
+              <a:t>-Server can schedule events to occur at various times</a:t>
+            </a:r>
+          </a:p>
+          <a:p>
+            <a:r>
+              <a:rPr lang="en-US" baseline="0" dirty="0" smtClean="0"/>
+              <a:t>-Half of the coffee maker hardware is built</a:t>
+            </a:r>
+            <a:endParaRPr lang="en-US" baseline="0" dirty="0"/>
+          </a:p>
+        </p:txBody>
+      </p:sp>
+      <p:sp>
+        <p:nvSpPr>
+          <p:cNvPr id="4" name="Slide Number Placeholder 3"/>
+          <p:cNvSpPr>
+            <a:spLocks noGrp="1"/>
+          </p:cNvSpPr>
+          <p:nvPr>
+            <p:ph type="sldNum" sz="quarter" idx="10"/>
+          </p:nvPr>
+        </p:nvSpPr>
+        <p:spPr/>
+        <p:txBody>
+          <a:bodyPr/>
+          <a:lstStyle/>
+          <a:p>
+            <a:fld id="{377211F2-1C6A-4F10-9506-C7C062274F4F}" type="slidenum">
+              <a:rPr lang="en-CA" smtClean="0"/>
+              <a:t>27</a:t>
+            </a:fld>
+            <a:endParaRPr lang="en-CA"/>
+          </a:p>
+        </p:txBody>
+      </p:sp>
+    </p:spTree>
+    <p:extLst>
+      <p:ext uri="{BB962C8B-B14F-4D97-AF65-F5344CB8AC3E}">
+        <p14:creationId xmlns:p14="http://schemas.microsoft.com/office/powerpoint/2010/main" val="198276861"/>
       </p:ext>
     </p:extLst>
   </p:cSld>
@@ -1361,87 +2407,34 @@
           <a:lstStyle/>
           <a:p>
             <a:r>
-              <a:rPr lang="en-US" dirty="0" smtClean="0"/>
-              <a:t>-Automatically</a:t>
-            </a:r>
-            <a:r>
-              <a:rPr lang="en-US" baseline="0" dirty="0" smtClean="0"/>
-              <a:t> packs and unpacks packets</a:t>
-            </a:r>
-          </a:p>
-          <a:p>
-            <a:r>
-              <a:rPr lang="en-US" baseline="0" dirty="0" smtClean="0"/>
-              <a:t>-Ease of formatting</a:t>
-            </a:r>
-          </a:p>
-          <a:p>
-            <a:r>
-              <a:rPr lang="en-US" baseline="0" dirty="0" smtClean="0"/>
-              <a:t>-Used globally throughout the system</a:t>
-            </a:r>
-            <a:endParaRPr lang="en-US" dirty="0" smtClean="0"/>
-          </a:p>
-          <a:p>
-            <a:r>
-              <a:rPr lang="en-US" dirty="0" smtClean="0"/>
-              <a:t>-</a:t>
-            </a:r>
-            <a:r>
-              <a:rPr lang="en-US" baseline="0" dirty="0" smtClean="0"/>
-              <a:t>UDP packets</a:t>
-            </a:r>
-          </a:p>
-          <a:p>
-            <a:endParaRPr lang="en-US" baseline="0" dirty="0" smtClean="0"/>
-          </a:p>
-          <a:p>
-            <a:r>
-              <a:rPr lang="en-US" baseline="0" dirty="0" smtClean="0"/>
-              <a:t>For all tests we use </a:t>
-            </a:r>
-            <a:r>
-              <a:rPr lang="en-US" b="1" baseline="0" dirty="0" smtClean="0"/>
-              <a:t>TWO</a:t>
-            </a:r>
-            <a:r>
-              <a:rPr lang="en-US" b="0" baseline="0" dirty="0" smtClean="0"/>
-              <a:t> instances of </a:t>
-            </a:r>
-            <a:r>
-              <a:rPr lang="en-US" b="0" baseline="0" dirty="0" err="1" smtClean="0"/>
-              <a:t>DataChannel</a:t>
-            </a:r>
-            <a:endParaRPr lang="en-US" b="0" baseline="0" dirty="0" smtClean="0"/>
-          </a:p>
-          <a:p>
-            <a:r>
-              <a:rPr lang="en-US" b="0" baseline="0" dirty="0" smtClean="0"/>
-              <a:t>	One for </a:t>
-            </a:r>
-            <a:r>
-              <a:rPr lang="en-US" b="0" baseline="0" dirty="0" err="1" smtClean="0"/>
-              <a:t>sending+packing</a:t>
-            </a:r>
-            <a:r>
-              <a:rPr lang="en-US" b="0" baseline="0" dirty="0" smtClean="0"/>
-              <a:t> packets</a:t>
-            </a:r>
-          </a:p>
-          <a:p>
-            <a:r>
-              <a:rPr lang="en-US" b="0" baseline="0" dirty="0" smtClean="0"/>
-              <a:t>	One for </a:t>
-            </a:r>
-            <a:r>
-              <a:rPr lang="en-US" b="0" baseline="0" dirty="0" err="1" smtClean="0"/>
-              <a:t>receiving+unpacking</a:t>
-            </a:r>
-            <a:r>
-              <a:rPr lang="en-US" b="0" baseline="0" dirty="0" smtClean="0"/>
-              <a:t> packets</a:t>
-            </a:r>
-            <a:endParaRPr lang="en-US" dirty="0"/>
+              <a:rPr lang="en-US" dirty="0"/>
+              <a:t>Network Diagram of</a:t>
+            </a:r>
+            <a:r>
+              <a:rPr lang="en-US" baseline="0" dirty="0"/>
+              <a:t> the AVA-SH</a:t>
+            </a:r>
+          </a:p>
+          <a:p>
+            <a:r>
+              <a:rPr lang="en-US" baseline="0" dirty="0"/>
+              <a:t>The user interfaces do not communicate directly with the modules, they only communicate with the server which can then pass the commands to the modules</a:t>
+            </a:r>
+          </a:p>
+          <a:p>
+            <a:r>
+              <a:rPr lang="en-US" baseline="0" dirty="0"/>
+              <a:t>The modules also should not communicate directly with each other, to maintain high modularity</a:t>
+            </a:r>
+          </a:p>
+          <a:p>
+            <a:endParaRPr lang="en-US" baseline="0" dirty="0"/>
+          </a:p>
+          <a:p>
+            <a:r>
+              <a:rPr lang="en-US" baseline="0" dirty="0"/>
+              <a:t>Uses Client-Server design, wherein the modules/interfaces are the clients and the server is the main AVA serve</a:t>
+            </a:r>
           </a:p>
         </p:txBody>
       </p:sp>
@@ -1462,7 +2455,7 @@
           <a:p>
             <a:fld id="{377211F2-1C6A-4F10-9506-C7C062274F4F}" type="slidenum">
               <a:rPr lang="en-CA" smtClean="0"/>
-              <a:t>4</a:t>
+              <a:t>3</a:t>
             </a:fld>
             <a:endParaRPr lang="en-CA"/>
           </a:p>
@@ -1471,7 +2464,7 @@
     </p:spTree>
     <p:extLst>
       <p:ext uri="{BB962C8B-B14F-4D97-AF65-F5344CB8AC3E}">
-        <p14:creationId xmlns:p14="http://schemas.microsoft.com/office/powerpoint/2010/main" val="351545078"/>
+        <p14:creationId xmlns:p14="http://schemas.microsoft.com/office/powerpoint/2010/main" val="36808023"/>
       </p:ext>
     </p:extLst>
   </p:cSld>
@@ -1525,119 +2518,174 @@
           <a:bodyPr/>
           <a:lstStyle/>
           <a:p>
-            <a:pPr marL="0" marR="0" lvl="0" indent="0" algn="l" defTabSz="914400" rtl="0" eaLnBrk="1" fontAlgn="auto" latinLnBrk="0" hangingPunct="1">
-              <a:lnSpc>
-                <a:spcPct val="100000"/>
-              </a:lnSpc>
-              <a:spcBef>
-                <a:spcPts val="0"/>
-              </a:spcBef>
-              <a:spcAft>
-                <a:spcPts val="0"/>
-              </a:spcAft>
-              <a:buClrTx/>
-              <a:buSzTx/>
-              <a:buFontTx/>
-              <a:buNone/>
-              <a:tabLst/>
-              <a:defRPr/>
-            </a:pPr>
             <a:r>
               <a:rPr lang="en-US" dirty="0" smtClean="0"/>
-              <a:t>Document</a:t>
+              <a:t>-Automatically</a:t>
             </a:r>
             <a:r>
               <a:rPr lang="en-US" baseline="0" dirty="0" smtClean="0"/>
-              <a:t> on packet types and uses @ </a:t>
-            </a:r>
-            <a:r>
-              <a:rPr lang="en-US" baseline="0" dirty="0" smtClean="0">
-                <a:sym typeface="Wingdings" panose="05000000000000000000" pitchFamily="2" charset="2"/>
-              </a:rPr>
-              <a:t> https://github.com/SYSC-3010-F5/AVA-SH/blob/master/docs/Packet-Format.txt</a:t>
-            </a:r>
-          </a:p>
-          <a:p>
-            <a:pPr marL="0" marR="0" lvl="0" indent="0" algn="l" defTabSz="914400" rtl="0" eaLnBrk="1" fontAlgn="auto" latinLnBrk="0" hangingPunct="1">
-              <a:lnSpc>
-                <a:spcPct val="100000"/>
-              </a:lnSpc>
-              <a:spcBef>
-                <a:spcPts val="0"/>
-              </a:spcBef>
-              <a:spcAft>
-                <a:spcPts val="0"/>
-              </a:spcAft>
-              <a:buClrTx/>
-              <a:buSzTx/>
-              <a:buFontTx/>
-              <a:buNone/>
-              <a:tabLst/>
-              <a:defRPr/>
-            </a:pPr>
-            <a:endParaRPr lang="en-US" baseline="0" dirty="0" smtClean="0">
-              <a:sym typeface="Wingdings" panose="05000000000000000000" pitchFamily="2" charset="2"/>
-            </a:endParaRPr>
-          </a:p>
-          <a:p>
-            <a:pPr marL="0" marR="0" lvl="0" indent="0" algn="l" defTabSz="914400" rtl="0" eaLnBrk="1" fontAlgn="auto" latinLnBrk="0" hangingPunct="1">
-              <a:lnSpc>
-                <a:spcPct val="100000"/>
-              </a:lnSpc>
-              <a:spcBef>
-                <a:spcPts val="0"/>
-              </a:spcBef>
-              <a:spcAft>
-                <a:spcPts val="0"/>
-              </a:spcAft>
-              <a:buClrTx/>
-              <a:buSzTx/>
-              <a:buFontTx/>
-              <a:buNone/>
-              <a:tabLst/>
-              <a:defRPr/>
-            </a:pPr>
-            <a:r>
-              <a:rPr lang="en-US" baseline="0" dirty="0" smtClean="0">
-                <a:sym typeface="Wingdings" panose="05000000000000000000" pitchFamily="2" charset="2"/>
-              </a:rPr>
-              <a:t>Packet send with invalid opcode</a:t>
-            </a:r>
-          </a:p>
-          <a:p>
-            <a:pPr marL="0" marR="0" lvl="0" indent="0" algn="l" defTabSz="914400" rtl="0" eaLnBrk="1" fontAlgn="auto" latinLnBrk="0" hangingPunct="1">
-              <a:lnSpc>
-                <a:spcPct val="100000"/>
-              </a:lnSpc>
-              <a:spcBef>
-                <a:spcPts val="0"/>
-              </a:spcBef>
-              <a:spcAft>
-                <a:spcPts val="0"/>
-              </a:spcAft>
-              <a:buClrTx/>
-              <a:buSzTx/>
-              <a:buFontTx/>
-              <a:buNone/>
-              <a:tabLst/>
-              <a:defRPr/>
-            </a:pPr>
-            <a:r>
-              <a:rPr lang="en-US" baseline="0" dirty="0" smtClean="0">
-                <a:sym typeface="Wingdings" panose="05000000000000000000" pitchFamily="2" charset="2"/>
-              </a:rPr>
-              <a:t>Receiving </a:t>
-            </a:r>
-            <a:r>
-              <a:rPr lang="en-US" baseline="0" dirty="0" err="1" smtClean="0">
-                <a:sym typeface="Wingdings" panose="05000000000000000000" pitchFamily="2" charset="2"/>
-              </a:rPr>
+              <a:t> packs and unpacks packets</a:t>
+            </a:r>
+          </a:p>
+          <a:p>
+            <a:r>
+              <a:rPr lang="en-US" baseline="0" dirty="0" smtClean="0"/>
+              <a:t>-Ease of formatting</a:t>
+            </a:r>
+          </a:p>
+          <a:p>
+            <a:r>
+              <a:rPr lang="en-US" baseline="0" dirty="0" smtClean="0"/>
+              <a:t>-Used globally throughout the system</a:t>
+            </a:r>
+            <a:endParaRPr lang="en-US" dirty="0" smtClean="0"/>
+          </a:p>
+          <a:p>
+            <a:r>
+              <a:rPr lang="en-US" dirty="0" smtClean="0"/>
+              <a:t>-</a:t>
+            </a:r>
+            <a:r>
+              <a:rPr lang="en-US" baseline="0" dirty="0" smtClean="0"/>
+              <a:t>UDP </a:t>
+            </a:r>
+            <a:r>
+              <a:rPr lang="en-US" baseline="0" dirty="0" smtClean="0"/>
+              <a:t>packets</a:t>
+            </a:r>
+            <a:endParaRPr lang="en-US" baseline="0" dirty="0" smtClean="0"/>
+          </a:p>
+          <a:p>
+            <a:endParaRPr lang="en-US" baseline="0" dirty="0" smtClean="0"/>
+          </a:p>
+          <a:p>
+            <a:r>
+              <a:rPr lang="en-US" baseline="0" dirty="0" smtClean="0"/>
+              <a:t>For all tests we use </a:t>
+            </a:r>
+            <a:r>
+              <a:rPr lang="en-US" b="1" baseline="0" dirty="0" smtClean="0"/>
+              <a:t>TWO</a:t>
+            </a:r>
+            <a:r>
+              <a:rPr lang="en-US" b="0" baseline="0" dirty="0" smtClean="0"/>
+              <a:t> instances of </a:t>
+            </a:r>
+            <a:r>
+              <a:rPr lang="en-US" b="0" baseline="0" dirty="0" err="1" smtClean="0"/>
               <a:t>DataChannel</a:t>
             </a:r>
-            <a:endParaRPr lang="en-US" dirty="0" smtClean="0"/>
-          </a:p>
-          <a:p>
-            <a:endParaRPr lang="en-US" dirty="0"/>
+            <a:endParaRPr lang="en-US" b="0" baseline="0" dirty="0" smtClean="0"/>
+          </a:p>
+          <a:p>
+            <a:r>
+              <a:rPr lang="en-US" b="0" baseline="0" dirty="0" smtClean="0"/>
+              <a:t>	One for </a:t>
+            </a:r>
+            <a:r>
+              <a:rPr lang="en-US" b="0" baseline="0" dirty="0" err="1" smtClean="0"/>
+              <a:t>sending+packing</a:t>
+            </a:r>
+            <a:r>
+              <a:rPr lang="en-US" b="0" baseline="0" dirty="0" smtClean="0"/>
+              <a:t> packets</a:t>
+            </a:r>
+          </a:p>
+          <a:p>
+            <a:r>
+              <a:rPr lang="en-US" b="0" baseline="0" dirty="0" smtClean="0"/>
+              <a:t>	One for </a:t>
+            </a:r>
+            <a:r>
+              <a:rPr lang="en-US" b="0" baseline="0" dirty="0" err="1" smtClean="0"/>
+              <a:t>receiving+unpacking</a:t>
+            </a:r>
+            <a:r>
+              <a:rPr lang="en-US" b="0" baseline="0" dirty="0" smtClean="0"/>
+              <a:t> </a:t>
+            </a:r>
+            <a:r>
+              <a:rPr lang="en-US" b="0" baseline="0" dirty="0" smtClean="0"/>
+              <a:t>packets</a:t>
+            </a:r>
+          </a:p>
+          <a:p>
+            <a:endParaRPr lang="en-US" b="0" baseline="0" dirty="0" smtClean="0"/>
+          </a:p>
+          <a:p>
+            <a:r>
+              <a:rPr lang="en-US" b="0" baseline="0" dirty="0" smtClean="0"/>
+              <a:t>Sender </a:t>
+            </a:r>
+            <a:r>
+              <a:rPr lang="en-US" b="0" baseline="0" dirty="0" err="1" smtClean="0"/>
+              <a:t>DataChannel</a:t>
+            </a:r>
+            <a:r>
+              <a:rPr lang="en-US" b="0" baseline="0" dirty="0" smtClean="0"/>
+              <a:t> packs the data and sends it to the local address on socket 1234</a:t>
+            </a:r>
+          </a:p>
+          <a:p>
+            <a:r>
+              <a:rPr lang="en-US" b="0" baseline="0" dirty="0" smtClean="0"/>
+              <a:t>Receiver </a:t>
+            </a:r>
+            <a:r>
+              <a:rPr lang="en-US" b="0" baseline="0" dirty="0" err="1" smtClean="0"/>
+              <a:t>DataChannel</a:t>
+            </a:r>
+            <a:r>
+              <a:rPr lang="en-US" b="0" baseline="0" dirty="0" smtClean="0"/>
+              <a:t> receives the data on socket 1234 and unpacks it</a:t>
+            </a:r>
+            <a:br>
+              <a:rPr lang="en-US" b="0" baseline="0" dirty="0" smtClean="0"/>
+            </a:br>
+            <a:r>
+              <a:rPr lang="en-US" b="0" baseline="0" dirty="0" smtClean="0"/>
+              <a:t>The unpacked data is then compared to the original data</a:t>
+            </a:r>
+          </a:p>
+          <a:p>
+            <a:r>
+              <a:rPr lang="en-US" b="0" baseline="0" dirty="0" smtClean="0"/>
+              <a:t>Total of 9 tests total</a:t>
+            </a:r>
+            <a:br>
+              <a:rPr lang="en-US" b="0" baseline="0" dirty="0" smtClean="0"/>
+            </a:br>
+            <a:r>
+              <a:rPr lang="en-US" b="0" baseline="0" dirty="0" smtClean="0"/>
+              <a:t/>
+            </a:r>
+            <a:br>
+              <a:rPr lang="en-US" b="0" baseline="0" dirty="0" smtClean="0"/>
+            </a:br>
+            <a:r>
+              <a:rPr lang="en-US" b="0" baseline="0" dirty="0" smtClean="0"/>
+              <a:t>Describe picture</a:t>
+            </a:r>
+          </a:p>
+          <a:p>
+            <a:r>
+              <a:rPr lang="en-US" b="0" baseline="0" dirty="0" smtClean="0"/>
+              <a:t>	Use of </a:t>
+            </a:r>
+            <a:r>
+              <a:rPr lang="en-US" b="0" baseline="0" dirty="0" err="1" smtClean="0"/>
+              <a:t>JUnitTest</a:t>
+            </a:r>
+            <a:r>
+              <a:rPr lang="en-US" b="0" baseline="0" dirty="0" smtClean="0"/>
+              <a:t> framework for quick test summaries	(left side of image)</a:t>
+            </a:r>
+          </a:p>
+          <a:p>
+            <a:r>
+              <a:rPr lang="en-US" b="0" baseline="0" dirty="0" smtClean="0"/>
+              <a:t>	Use of printing detailed logs for debugging if tests fail	(right side of image)</a:t>
+            </a:r>
           </a:p>
         </p:txBody>
       </p:sp>
@@ -1658,7 +2706,7 @@
           <a:p>
             <a:fld id="{377211F2-1C6A-4F10-9506-C7C062274F4F}" type="slidenum">
               <a:rPr lang="en-CA" smtClean="0"/>
-              <a:t>5</a:t>
+              <a:t>4</a:t>
             </a:fld>
             <a:endParaRPr lang="en-CA"/>
           </a:p>
@@ -1667,7 +2715,7 @@
     </p:spTree>
     <p:extLst>
       <p:ext uri="{BB962C8B-B14F-4D97-AF65-F5344CB8AC3E}">
-        <p14:creationId xmlns:p14="http://schemas.microsoft.com/office/powerpoint/2010/main" val="863603200"/>
+        <p14:creationId xmlns:p14="http://schemas.microsoft.com/office/powerpoint/2010/main" val="351545078"/>
       </p:ext>
     </p:extLst>
   </p:cSld>
@@ -1721,38 +2769,181 @@
           <a:bodyPr/>
           <a:lstStyle/>
           <a:p>
+            <a:pPr marL="0" marR="0" lvl="0" indent="0" algn="l" defTabSz="914400" rtl="0" eaLnBrk="1" fontAlgn="auto" latinLnBrk="0" hangingPunct="1">
+              <a:lnSpc>
+                <a:spcPct val="100000"/>
+              </a:lnSpc>
+              <a:spcBef>
+                <a:spcPts val="0"/>
+              </a:spcBef>
+              <a:spcAft>
+                <a:spcPts val="0"/>
+              </a:spcAft>
+              <a:buClrTx/>
+              <a:buSzTx/>
+              <a:buFontTx/>
+              <a:buNone/>
+              <a:tabLst/>
+              <a:defRPr/>
+            </a:pPr>
             <a:r>
               <a:rPr lang="en-US" dirty="0" smtClean="0"/>
-              <a:t>-Command</a:t>
+              <a:t>Document</a:t>
             </a:r>
             <a:r>
               <a:rPr lang="en-US" baseline="0" dirty="0" smtClean="0"/>
-              <a:t> packets contain two fields</a:t>
-            </a:r>
-          </a:p>
-          <a:p>
+              <a:t> on packet types and uses @ </a:t>
+            </a:r>
+            <a:r>
+              <a:rPr lang="en-US" baseline="0" dirty="0" smtClean="0">
+                <a:sym typeface="Wingdings" panose="05000000000000000000" pitchFamily="2" charset="2"/>
+              </a:rPr>
+              <a:t> https://github.com/SYSC-3010-F5/AVA-SH/blob/master/docs/Packet-Format.txt</a:t>
+            </a:r>
+          </a:p>
+          <a:p>
+            <a:pPr marL="0" marR="0" lvl="0" indent="0" algn="l" defTabSz="914400" rtl="0" eaLnBrk="1" fontAlgn="auto" latinLnBrk="0" hangingPunct="1">
+              <a:lnSpc>
+                <a:spcPct val="100000"/>
+              </a:lnSpc>
+              <a:spcBef>
+                <a:spcPts val="0"/>
+              </a:spcBef>
+              <a:spcAft>
+                <a:spcPts val="0"/>
+              </a:spcAft>
+              <a:buClrTx/>
+              <a:buSzTx/>
+              <a:buFontTx/>
+              <a:buNone/>
+              <a:tabLst/>
+              <a:defRPr/>
+            </a:pPr>
+            <a:endParaRPr lang="en-US" baseline="0" dirty="0" smtClean="0">
+              <a:sym typeface="Wingdings" panose="05000000000000000000" pitchFamily="2" charset="2"/>
+            </a:endParaRPr>
+          </a:p>
+          <a:p>
+            <a:pPr marL="0" marR="0" lvl="0" indent="0" algn="l" defTabSz="914400" rtl="0" eaLnBrk="1" fontAlgn="auto" latinLnBrk="0" hangingPunct="1">
+              <a:lnSpc>
+                <a:spcPct val="100000"/>
+              </a:lnSpc>
+              <a:spcBef>
+                <a:spcPts val="0"/>
+              </a:spcBef>
+              <a:spcAft>
+                <a:spcPts val="0"/>
+              </a:spcAft>
+              <a:buClrTx/>
+              <a:buSzTx/>
+              <a:buFontTx/>
+              <a:buNone/>
+              <a:tabLst/>
+              <a:defRPr/>
+            </a:pPr>
+            <a:r>
+              <a:rPr lang="en-US" baseline="0" dirty="0" smtClean="0">
+                <a:sym typeface="Wingdings" panose="05000000000000000000" pitchFamily="2" charset="2"/>
+              </a:rPr>
+              <a:t>Testing a packet </a:t>
+            </a:r>
+            <a:r>
+              <a:rPr lang="en-US" baseline="0" dirty="0" smtClean="0">
+                <a:sym typeface="Wingdings" panose="05000000000000000000" pitchFamily="2" charset="2"/>
+              </a:rPr>
+              <a:t>send with invalid opcode</a:t>
+            </a:r>
+          </a:p>
+          <a:p>
+            <a:pPr marL="0" marR="0" lvl="0" indent="0" algn="l" defTabSz="914400" rtl="0" eaLnBrk="1" fontAlgn="auto" latinLnBrk="0" hangingPunct="1">
+              <a:lnSpc>
+                <a:spcPct val="100000"/>
+              </a:lnSpc>
+              <a:spcBef>
+                <a:spcPts val="0"/>
+              </a:spcBef>
+              <a:spcAft>
+                <a:spcPts val="0"/>
+              </a:spcAft>
+              <a:buClrTx/>
+              <a:buSzTx/>
+              <a:buFontTx/>
+              <a:buNone/>
+              <a:tabLst/>
+              <a:defRPr/>
+            </a:pPr>
+            <a:r>
+              <a:rPr lang="en-US" baseline="0" dirty="0" smtClean="0">
+                <a:sym typeface="Wingdings" panose="05000000000000000000" pitchFamily="2" charset="2"/>
+              </a:rPr>
+              <a:t>Packet with bad opcode is manually constructed as a byte array and sent to the receiving data channel</a:t>
+            </a:r>
+          </a:p>
+          <a:p>
+            <a:pPr marL="0" marR="0" lvl="0" indent="0" algn="l" defTabSz="914400" rtl="0" eaLnBrk="1" fontAlgn="auto" latinLnBrk="0" hangingPunct="1">
+              <a:lnSpc>
+                <a:spcPct val="100000"/>
+              </a:lnSpc>
+              <a:spcBef>
+                <a:spcPts val="0"/>
+              </a:spcBef>
+              <a:spcAft>
+                <a:spcPts val="0"/>
+              </a:spcAft>
+              <a:buClrTx/>
+              <a:buSzTx/>
+              <a:buFontTx/>
+              <a:buNone/>
+              <a:tabLst/>
+              <a:defRPr/>
+            </a:pPr>
+            <a:r>
+              <a:rPr lang="en-US" dirty="0" err="1" smtClean="0"/>
+              <a:t>Receving</a:t>
+            </a:r>
             <a:r>
               <a:rPr lang="en-US" baseline="0" dirty="0" smtClean="0"/>
-              <a:t>	-Command Key</a:t>
-            </a:r>
-          </a:p>
-          <a:p>
+              <a:t> </a:t>
+            </a:r>
+            <a:r>
+              <a:rPr lang="en-US" baseline="0" dirty="0" err="1" smtClean="0"/>
+              <a:t>DataChannel</a:t>
+            </a:r>
             <a:r>
               <a:rPr lang="en-US" baseline="0" dirty="0" smtClean="0"/>
-              <a:t>	-Extra Info</a:t>
-            </a:r>
-          </a:p>
-          <a:p>
+              <a:t> attempts to unpack the packet</a:t>
+            </a:r>
+          </a:p>
+          <a:p>
+            <a:pPr marL="0" marR="0" lvl="0" indent="0" algn="l" defTabSz="914400" rtl="0" eaLnBrk="1" fontAlgn="auto" latinLnBrk="0" hangingPunct="1">
+              <a:lnSpc>
+                <a:spcPct val="100000"/>
+              </a:lnSpc>
+              <a:spcBef>
+                <a:spcPts val="0"/>
+              </a:spcBef>
+              <a:spcAft>
+                <a:spcPts val="0"/>
+              </a:spcAft>
+              <a:buClrTx/>
+              <a:buSzTx/>
+              <a:buFontTx/>
+              <a:buNone/>
+              <a:tabLst/>
+              <a:defRPr/>
+            </a:pPr>
             <a:r>
               <a:rPr lang="en-US" baseline="0" dirty="0" smtClean="0"/>
-              <a:t>-These fields change for each type of command we wish to send</a:t>
-            </a:r>
-          </a:p>
-          <a:p>
-            <a:r>
-              <a:rPr lang="en-US" baseline="0" dirty="0" smtClean="0"/>
-              <a:t>-The sender inputs the parameters, Command Key and Extra Info</a:t>
-            </a:r>
+              <a:t>Detects an invalid opcode and throws a </a:t>
+            </a:r>
+            <a:r>
+              <a:rPr lang="en-US" baseline="0" dirty="0" err="1" smtClean="0"/>
+              <a:t>NetworkException</a:t>
+            </a:r>
+            <a:endParaRPr lang="en-US" dirty="0" smtClean="0"/>
+          </a:p>
+          <a:p>
+            <a:endParaRPr lang="en-US" dirty="0"/>
           </a:p>
         </p:txBody>
       </p:sp>
@@ -1773,7 +2964,7 @@
           <a:p>
             <a:fld id="{377211F2-1C6A-4F10-9506-C7C062274F4F}" type="slidenum">
               <a:rPr lang="en-CA" smtClean="0"/>
-              <a:t>6</a:t>
+              <a:t>5</a:t>
             </a:fld>
             <a:endParaRPr lang="en-CA"/>
           </a:p>
@@ -1782,7 +2973,7 @@
     </p:spTree>
     <p:extLst>
       <p:ext uri="{BB962C8B-B14F-4D97-AF65-F5344CB8AC3E}">
-        <p14:creationId xmlns:p14="http://schemas.microsoft.com/office/powerpoint/2010/main" val="4135356250"/>
+        <p14:creationId xmlns:p14="http://schemas.microsoft.com/office/powerpoint/2010/main" val="863603200"/>
       </p:ext>
     </p:extLst>
   </p:cSld>
@@ -1836,7 +3027,73 @@
           <a:bodyPr/>
           <a:lstStyle/>
           <a:p>
-            <a:endParaRPr lang="en-US" dirty="0"/>
+            <a:r>
+              <a:rPr lang="en-US" dirty="0" smtClean="0"/>
+              <a:t>-Command</a:t>
+            </a:r>
+            <a:r>
+              <a:rPr lang="en-US" baseline="0" dirty="0" smtClean="0"/>
+              <a:t> packets contain two </a:t>
+            </a:r>
+            <a:r>
+              <a:rPr lang="en-US" baseline="0" dirty="0" smtClean="0"/>
+              <a:t>fields of data, they are used to tell the server and modules to do a task</a:t>
+            </a:r>
+            <a:endParaRPr lang="en-US" baseline="0" dirty="0" smtClean="0"/>
+          </a:p>
+          <a:p>
+            <a:r>
+              <a:rPr lang="en-US" baseline="0" dirty="0" smtClean="0"/>
+              <a:t>	-Command Key</a:t>
+            </a:r>
+          </a:p>
+          <a:p>
+            <a:r>
+              <a:rPr lang="en-US" baseline="0" dirty="0" smtClean="0"/>
+              <a:t>	-Extra </a:t>
+            </a:r>
+            <a:r>
+              <a:rPr lang="en-US" baseline="0" dirty="0" smtClean="0"/>
+              <a:t>Info</a:t>
+            </a:r>
+          </a:p>
+          <a:p>
+            <a:endParaRPr lang="en-US" baseline="0" dirty="0" smtClean="0"/>
+          </a:p>
+          <a:p>
+            <a:r>
+              <a:rPr lang="en-US" baseline="0" dirty="0" smtClean="0"/>
+              <a:t>-These fields change for each type of command we wish to send</a:t>
+            </a:r>
+          </a:p>
+          <a:p>
+            <a:r>
+              <a:rPr lang="en-US" baseline="0" dirty="0" smtClean="0"/>
+              <a:t>-The sender inputs the parameters, Command Key and Extra </a:t>
+            </a:r>
+            <a:r>
+              <a:rPr lang="en-US" baseline="0" dirty="0" smtClean="0"/>
+              <a:t>Info</a:t>
+            </a:r>
+          </a:p>
+          <a:p>
+            <a:r>
+              <a:rPr lang="en-US" baseline="0" dirty="0" smtClean="0"/>
+              <a:t>- Sending data channel constructs a packet with these information fields and sends it</a:t>
+            </a:r>
+          </a:p>
+          <a:p>
+            <a:r>
+              <a:rPr lang="en-US" baseline="0" dirty="0" smtClean="0"/>
+              <a:t>- Receiving data channel receives the packet, unpacks it, and returns the information</a:t>
+            </a:r>
+          </a:p>
+          <a:p>
+            <a:r>
+              <a:rPr lang="en-US" baseline="0" dirty="0" smtClean="0"/>
+              <a:t>- Returned command key and extra info are compared to the original command key and extra info</a:t>
+            </a:r>
+            <a:endParaRPr lang="en-US" baseline="0" dirty="0" smtClean="0"/>
           </a:p>
         </p:txBody>
       </p:sp>
@@ -1857,7 +3114,7 @@
           <a:p>
             <a:fld id="{377211F2-1C6A-4F10-9506-C7C062274F4F}" type="slidenum">
               <a:rPr lang="en-CA" smtClean="0"/>
-              <a:t>14</a:t>
+              <a:t>6</a:t>
             </a:fld>
             <a:endParaRPr lang="en-CA"/>
           </a:p>
@@ -1866,7 +3123,7 @@
     </p:spTree>
     <p:extLst>
       <p:ext uri="{BB962C8B-B14F-4D97-AF65-F5344CB8AC3E}">
-        <p14:creationId xmlns:p14="http://schemas.microsoft.com/office/powerpoint/2010/main" val="3674502506"/>
+        <p14:creationId xmlns:p14="http://schemas.microsoft.com/office/powerpoint/2010/main" val="4135356250"/>
       </p:ext>
     </p:extLst>
   </p:cSld>
@@ -1922,79 +3179,63 @@
           <a:p>
             <a:r>
               <a:rPr lang="en-US" dirty="0" smtClean="0"/>
-              <a:t>no star denotes packet from an interface to server</a:t>
-            </a:r>
-          </a:p>
-          <a:p>
-            <a:r>
-              <a:rPr lang="en-US" dirty="0" smtClean="0"/>
-              <a:t>* denotes packet from server to alarm</a:t>
-            </a:r>
-          </a:p>
-          <a:p>
-            <a:r>
-              <a:rPr lang="en-US" dirty="0" smtClean="0"/>
-              <a:t>** denotes packet from server </a:t>
+              <a:t>Similar</a:t>
             </a:r>
             <a:r>
               <a:rPr lang="en-US" baseline="0" dirty="0" smtClean="0"/>
-              <a:t>to coffee maker</a:t>
+              <a:t> test to the previous</a:t>
             </a:r>
           </a:p>
           <a:p>
             <a:r>
               <a:rPr lang="en-US" baseline="0" dirty="0" smtClean="0"/>
-              <a:t>*** denotes packet from coffee maker to server</a:t>
+              <a:t>The extra info field is empty, </a:t>
+            </a:r>
+            <a:r>
+              <a:rPr lang="en-US" baseline="0" dirty="0" err="1" smtClean="0"/>
+              <a:t>ie</a:t>
+            </a:r>
+            <a:r>
+              <a:rPr lang="en-US" baseline="0" dirty="0" smtClean="0"/>
+              <a:t> two 0x00 bytes after the command key</a:t>
             </a:r>
           </a:p>
           <a:p>
             <a:endParaRPr lang="en-US" baseline="0" dirty="0" smtClean="0"/>
           </a:p>
           <a:p>
-            <a:endParaRPr lang="en-US" baseline="0" dirty="0" smtClean="0"/>
-          </a:p>
-          <a:p>
             <a:r>
               <a:rPr lang="en-US" baseline="0" dirty="0" smtClean="0"/>
-              <a:t>What we got so far, will be increased. </a:t>
-            </a:r>
-          </a:p>
-          <a:p>
-            <a:endParaRPr lang="en-US" baseline="0" dirty="0" smtClean="0"/>
-          </a:p>
-          <a:p>
+              <a:t>Sender packs and sends the packet</a:t>
+            </a:r>
+          </a:p>
+          <a:p>
+            <a:r>
+              <a:rPr lang="en-US" baseline="0" dirty="0" err="1" smtClean="0"/>
+              <a:t>Reciever</a:t>
+            </a:r>
             <a:r>
               <a:rPr lang="en-US" baseline="0" dirty="0" smtClean="0"/>
-              <a:t>Due to the high degree of modularity in the system, this list will change. Wee keep an updated list on our </a:t>
+              <a:t> gets and </a:t>
             </a:r>
             <a:r>
               <a:rPr lang="en-US" baseline="0" dirty="0" err="1" smtClean="0"/>
-              <a:t>git</a:t>
+              <a:t>unpackets</a:t>
             </a:r>
             <a:r>
               <a:rPr lang="en-US" baseline="0" dirty="0" smtClean="0"/>
-              <a:t>. It describes all commands, parameters and expected outputs.</a:t>
-            </a:r>
-          </a:p>
-          <a:p>
-            <a:endParaRPr lang="en-US" baseline="0" dirty="0" smtClean="0"/>
-          </a:p>
-          <a:p>
+              <a:t> the packet</a:t>
+            </a:r>
+          </a:p>
+          <a:p>
+            <a:r>
+              <a:rPr lang="en-US" baseline="0" dirty="0" err="1" smtClean="0"/>
+              <a:t>Orignal</a:t>
+            </a:r>
             <a:r>
               <a:rPr lang="en-US" baseline="0" dirty="0" smtClean="0"/>
-              <a:t>Empty info pack=</a:t>
-            </a:r>
-            <a:r>
-              <a:rPr lang="en-US" baseline="0" dirty="0" err="1" smtClean="0"/>
-              <a:t>succesfull</a:t>
-            </a:r>
-            <a:r>
-              <a:rPr lang="en-US" baseline="0" dirty="0" smtClean="0"/>
-              <a:t> </a:t>
-            </a:r>
-            <a:endParaRPr lang="en-US" dirty="0" smtClean="0"/>
-          </a:p>
-          <a:p>
+              <a:t> data is compared to received data</a:t>
+            </a:r>
             <a:endParaRPr lang="en-US" dirty="0"/>
           </a:p>
         </p:txBody>
@@ -2016,7 +3257,7 @@
           <a:p>
             <a:fld id="{377211F2-1C6A-4F10-9506-C7C062274F4F}" type="slidenum">
               <a:rPr lang="en-CA" smtClean="0"/>
-              <a:t>20</a:t>
+              <a:t>7</a:t>
             </a:fld>
             <a:endParaRPr lang="en-CA"/>
           </a:p>
@@ -2025,7 +3266,7 @@
     </p:spTree>
     <p:extLst>
       <p:ext uri="{BB962C8B-B14F-4D97-AF65-F5344CB8AC3E}">
-        <p14:creationId xmlns:p14="http://schemas.microsoft.com/office/powerpoint/2010/main" val="608271338"/>
+        <p14:creationId xmlns:p14="http://schemas.microsoft.com/office/powerpoint/2010/main" val="2499904373"/>
       </p:ext>
     </p:extLst>
   </p:cSld>
@@ -2081,31 +3322,76 @@
           <a:p>
             <a:r>
               <a:rPr lang="en-US" dirty="0" smtClean="0"/>
-              <a:t>no star denotes packet from an interface to server</a:t>
-            </a:r>
-          </a:p>
-          <a:p>
-            <a:r>
-              <a:rPr lang="en-US" dirty="0" smtClean="0"/>
-              <a:t>* denotes packet from server to alarm</a:t>
-            </a:r>
-          </a:p>
-          <a:p>
-            <a:r>
-              <a:rPr lang="en-US" dirty="0" smtClean="0"/>
-              <a:t>** denotes packet from server </a:t>
+              <a:t>Error </a:t>
             </a:r>
             <a:r>
               <a:rPr lang="en-US" baseline="0" dirty="0" smtClean="0"/>
-              <a:t>to coffee maker</a:t>
+              <a:t>packets contain one field of data</a:t>
             </a:r>
           </a:p>
           <a:p>
             <a:r>
               <a:rPr lang="en-US" baseline="0" dirty="0" smtClean="0"/>
-              <a:t>*** denotes packet from coffee maker to server</a:t>
-            </a:r>
-            <a:endParaRPr lang="en-US" dirty="0" smtClean="0"/>
+              <a:t>	-Error </a:t>
+            </a:r>
+            <a:r>
+              <a:rPr lang="en-US" baseline="0" dirty="0" err="1" smtClean="0"/>
+              <a:t>msg</a:t>
+            </a:r>
+            <a:endParaRPr lang="en-US" baseline="0" dirty="0" smtClean="0"/>
+          </a:p>
+          <a:p>
+            <a:r>
+              <a:rPr lang="en-US" baseline="0" dirty="0" smtClean="0"/>
+              <a:t>Used to denote an error has occurred in some form</a:t>
+            </a:r>
+          </a:p>
+          <a:p>
+            <a:endParaRPr lang="en-US" baseline="0" dirty="0" smtClean="0"/>
+          </a:p>
+          <a:p>
+            <a:r>
+              <a:rPr lang="en-US" baseline="0" dirty="0" smtClean="0"/>
+              <a:t>The sender calls its </a:t>
+            </a:r>
+            <a:r>
+              <a:rPr lang="en-US" baseline="0" dirty="0" err="1" smtClean="0"/>
+              <a:t>sendError</a:t>
+            </a:r>
+            <a:r>
+              <a:rPr lang="en-US" baseline="0" dirty="0" smtClean="0"/>
+              <a:t>() method with a string as the parameter</a:t>
+            </a:r>
+          </a:p>
+          <a:p>
+            <a:r>
+              <a:rPr lang="en-US" baseline="0" dirty="0" smtClean="0"/>
+              <a:t>Sender packs and sends</a:t>
+            </a:r>
+          </a:p>
+          <a:p>
+            <a:r>
+              <a:rPr lang="en-US" baseline="0" dirty="0" smtClean="0"/>
+              <a:t>The receiving data channel gets and unpacks the packet</a:t>
+            </a:r>
+          </a:p>
+          <a:p>
+            <a:endParaRPr lang="en-US" baseline="0" dirty="0" smtClean="0"/>
+          </a:p>
+          <a:p>
+            <a:r>
+              <a:rPr lang="en-US" baseline="0" dirty="0" smtClean="0"/>
+              <a:t>We check to make sure </a:t>
+            </a:r>
+            <a:r>
+              <a:rPr lang="en-US" baseline="0" dirty="0" err="1" smtClean="0"/>
+              <a:t>DataChannel</a:t>
+            </a:r>
+            <a:r>
+              <a:rPr lang="en-US" baseline="0" dirty="0" smtClean="0"/>
+              <a:t> recognized the packet as an error type, and parsed out the error message correctly </a:t>
+            </a:r>
+            <a:endParaRPr lang="en-US" dirty="0"/>
           </a:p>
         </p:txBody>
       </p:sp>
@@ -2126,7 +3412,7 @@
           <a:p>
             <a:fld id="{377211F2-1C6A-4F10-9506-C7C062274F4F}" type="slidenum">
               <a:rPr lang="en-CA" smtClean="0"/>
-              <a:t>21</a:t>
+              <a:t>8</a:t>
             </a:fld>
             <a:endParaRPr lang="en-CA"/>
           </a:p>
@@ -2135,7 +3421,7 @@
     </p:spTree>
     <p:extLst>
       <p:ext uri="{BB962C8B-B14F-4D97-AF65-F5344CB8AC3E}">
-        <p14:creationId xmlns:p14="http://schemas.microsoft.com/office/powerpoint/2010/main" val="719209822"/>
+        <p14:creationId xmlns:p14="http://schemas.microsoft.com/office/powerpoint/2010/main" val="2677303488"/>
       </p:ext>
     </p:extLst>
   </p:cSld>
@@ -2191,52 +3477,37 @@
           <a:p>
             <a:r>
               <a:rPr lang="en-US" dirty="0" smtClean="0"/>
-              <a:t>Commands can be seen @ </a:t>
-            </a:r>
-            <a:r>
-              <a:rPr lang="en-US" dirty="0" smtClean="0">
-                <a:sym typeface="Wingdings" panose="05000000000000000000" pitchFamily="2" charset="2"/>
-              </a:rPr>
-              <a:t> </a:t>
-            </a:r>
-            <a:r>
-              <a:rPr lang="en-US" dirty="0" smtClean="0"/>
-              <a:t>https://github.com/SYSC-3010-F5/AVA-SH/blob/master/docs/AVA-Command-Manifest.txt</a:t>
-            </a:r>
-          </a:p>
-          <a:p>
-            <a:endParaRPr lang="en-US" dirty="0" smtClean="0"/>
-          </a:p>
-          <a:p>
-            <a:r>
-              <a:rPr lang="en-US" dirty="0" smtClean="0"/>
-              <a:t>no star denotes packet from an interface to server</a:t>
-            </a:r>
-          </a:p>
-          <a:p>
-            <a:r>
-              <a:rPr lang="en-US" dirty="0" smtClean="0"/>
-              <a:t>* denotes packet from server to alarm</a:t>
-            </a:r>
-          </a:p>
-          <a:p>
-            <a:r>
-              <a:rPr lang="en-US" dirty="0" smtClean="0"/>
-              <a:t>** denotes packet from server </a:t>
+              <a:t>Same concept as previous test, but with an empty</a:t>
             </a:r>
             <a:r>
               <a:rPr lang="en-US" baseline="0" dirty="0" smtClean="0"/>
-              <a:t>to coffee maker</a:t>
-            </a:r>
-          </a:p>
-          <a:p>
+              <a:t> error message</a:t>
+            </a:r>
+          </a:p>
+          <a:p>
+            <a:r>
+              <a:rPr lang="en-US" baseline="0" dirty="0" err="1" smtClean="0"/>
+              <a:t>sendError</a:t>
+            </a:r>
             <a:r>
               <a:rPr lang="en-US" baseline="0" dirty="0" smtClean="0"/>
-              <a:t>*** denotes packet from coffee maker to server</a:t>
-            </a:r>
-            <a:endParaRPr lang="en-US" dirty="0" smtClean="0"/>
-          </a:p>
-          <a:p>
+              <a:t>() method called again with an empty string for the parameter</a:t>
+            </a:r>
+          </a:p>
+          <a:p>
+            <a:endParaRPr lang="en-US" baseline="0" dirty="0" smtClean="0"/>
+          </a:p>
+          <a:p>
+            <a:r>
+              <a:rPr lang="en-US" baseline="0" dirty="0" smtClean="0"/>
+              <a:t>Same process of packing, sending, receiving, unpacking</a:t>
+            </a:r>
+          </a:p>
+          <a:p>
+            <a:r>
+              <a:rPr lang="en-US" baseline="0" dirty="0" smtClean="0"/>
+              <a:t>Check to make sure the type and error message are the same from start to end</a:t>
+            </a:r>
             <a:endParaRPr lang="en-US" dirty="0"/>
           </a:p>
         </p:txBody>
@@ -2258,7 +3529,7 @@
           <a:p>
             <a:fld id="{377211F2-1C6A-4F10-9506-C7C062274F4F}" type="slidenum">
               <a:rPr lang="en-CA" smtClean="0"/>
-              <a:t>22</a:t>
+              <a:t>9</a:t>
             </a:fld>
             <a:endParaRPr lang="en-CA"/>
           </a:p>
@@ -2267,7 +3538,7 @@
     </p:spTree>
     <p:extLst>
       <p:ext uri="{BB962C8B-B14F-4D97-AF65-F5344CB8AC3E}">
-        <p14:creationId xmlns:p14="http://schemas.microsoft.com/office/powerpoint/2010/main" val="1550857964"/>
+        <p14:creationId xmlns:p14="http://schemas.microsoft.com/office/powerpoint/2010/main" val="2126297357"/>
       </p:ext>
     </p:extLst>
   </p:cSld>
@@ -2503,7 +3774,7 @@
           <a:p>
             <a:fld id="{96DFF08F-DC6B-4601-B491-B0F83F6DD2DA}" type="datetimeFigureOut">
               <a:rPr lang="en-US" smtClean="0"/>
-              <a:t>3/12/17</a:t>
+              <a:t>13-Mar-17</a:t>
             </a:fld>
             <a:endParaRPr lang="en-US" dirty="0"/>
           </a:p>
@@ -2716,7 +3987,7 @@
           <a:p>
             <a:fld id="{96DFF08F-DC6B-4601-B491-B0F83F6DD2DA}" type="datetimeFigureOut">
               <a:rPr lang="en-US" smtClean="0"/>
-              <a:t>3/12/17</a:t>
+              <a:t>13-Mar-17</a:t>
             </a:fld>
             <a:endParaRPr lang="en-US" dirty="0"/>
           </a:p>
@@ -2972,7 +4243,7 @@
           <a:p>
             <a:fld id="{96DFF08F-DC6B-4601-B491-B0F83F6DD2DA}" type="datetimeFigureOut">
               <a:rPr lang="en-US" smtClean="0"/>
-              <a:t>3/12/17</a:t>
+              <a:t>13-Mar-17</a:t>
             </a:fld>
             <a:endParaRPr lang="en-US" dirty="0"/>
           </a:p>
@@ -3142,7 +4413,7 @@
           <a:p>
             <a:fld id="{96DFF08F-DC6B-4601-B491-B0F83F6DD2DA}" type="datetimeFigureOut">
               <a:rPr lang="en-US" smtClean="0"/>
-              <a:t>3/12/17</a:t>
+              <a:t>13-Mar-17</a:t>
             </a:fld>
             <a:endParaRPr lang="en-US" dirty="0"/>
           </a:p>
@@ -3486,7 +4757,7 @@
             <a:fld id="{96DFF08F-DC6B-4601-B491-B0F83F6DD2DA}" type="datetimeFigureOut">
               <a:rPr lang="en-US" smtClean="0"/>
               <a:pPr/>
-              <a:t>3/12/17</a:t>
+              <a:t>13-Mar-17</a:t>
             </a:fld>
             <a:endParaRPr lang="en-US" dirty="0"/>
           </a:p>
@@ -3762,7 +5033,7 @@
           <a:p>
             <a:fld id="{96DFF08F-DC6B-4601-B491-B0F83F6DD2DA}" type="datetimeFigureOut">
               <a:rPr lang="en-US" smtClean="0"/>
-              <a:t>3/12/17</a:t>
+              <a:t>13-Mar-17</a:t>
             </a:fld>
             <a:endParaRPr lang="en-US" dirty="0"/>
           </a:p>
@@ -4146,7 +5417,7 @@
           <a:p>
             <a:fld id="{96DFF08F-DC6B-4601-B491-B0F83F6DD2DA}" type="datetimeFigureOut">
               <a:rPr lang="en-US" smtClean="0"/>
-              <a:t>3/12/17</a:t>
+              <a:t>13-Mar-17</a:t>
             </a:fld>
             <a:endParaRPr lang="en-US" dirty="0"/>
           </a:p>
@@ -4269,7 +5540,7 @@
           <a:p>
             <a:fld id="{96DFF08F-DC6B-4601-B491-B0F83F6DD2DA}" type="datetimeFigureOut">
               <a:rPr lang="en-US" smtClean="0"/>
-              <a:t>3/12/17</a:t>
+              <a:t>13-Mar-17</a:t>
             </a:fld>
             <a:endParaRPr lang="en-US" dirty="0"/>
           </a:p>
@@ -4440,7 +5711,7 @@
           <a:p>
             <a:fld id="{96DFF08F-DC6B-4601-B491-B0F83F6DD2DA}" type="datetimeFigureOut">
               <a:rPr lang="en-US" smtClean="0"/>
-              <a:t>3/12/17</a:t>
+              <a:t>13-Mar-17</a:t>
             </a:fld>
             <a:endParaRPr lang="en-US" dirty="0"/>
           </a:p>
@@ -4799,7 +6070,7 @@
           <a:p>
             <a:fld id="{96DFF08F-DC6B-4601-B491-B0F83F6DD2DA}" type="datetimeFigureOut">
               <a:rPr lang="en-US" smtClean="0"/>
-              <a:t>3/12/17</a:t>
+              <a:t>13-Mar-17</a:t>
             </a:fld>
             <a:endParaRPr lang="en-US" dirty="0"/>
           </a:p>
@@ -5181,7 +6452,7 @@
           <a:p>
             <a:fld id="{96DFF08F-DC6B-4601-B491-B0F83F6DD2DA}" type="datetimeFigureOut">
               <a:rPr lang="en-US" smtClean="0"/>
-              <a:t>3/12/17</a:t>
+              <a:t>13-Mar-17</a:t>
             </a:fld>
             <a:endParaRPr lang="en-US" dirty="0"/>
           </a:p>
@@ -5469,7 +6740,7 @@
             <a:fld id="{96DFF08F-DC6B-4601-B491-B0F83F6DD2DA}" type="datetimeFigureOut">
               <a:rPr lang="en-US" smtClean="0"/>
               <a:pPr/>
-              <a:t>3/12/17</a:t>
+              <a:t>13-Mar-17</a:t>
             </a:fld>
             <a:endParaRPr lang="en-US" dirty="0"/>
           </a:p>
@@ -6059,7 +7330,7 @@
           <p:nvPr/>
         </p:nvPicPr>
         <p:blipFill>
-          <a:blip r:embed="rId2">
+          <a:blip r:embed="rId3">
             <a:extLst>
               <a:ext uri="{28A0092B-C50C-407E-A947-70E740481C1C}">
                 <a14:useLocalDpi xmlns:a14="http://schemas.microsoft.com/office/drawing/2010/main" val="0"/>
@@ -6289,7 +7560,7 @@
           <p:nvPr/>
         </p:nvPicPr>
         <p:blipFill>
-          <a:blip r:embed="rId2"/>
+          <a:blip r:embed="rId3"/>
           <a:stretch>
             <a:fillRect/>
           </a:stretch>
@@ -6389,7 +7660,7 @@
           <p:nvPr/>
         </p:nvPicPr>
         <p:blipFill>
-          <a:blip r:embed="rId3">
+          <a:blip r:embed="rId4">
             <a:extLst>
               <a:ext uri="{28A0092B-C50C-407E-A947-70E740481C1C}">
                 <a14:useLocalDpi xmlns:a14="http://schemas.microsoft.com/office/drawing/2010/main" val="0"/>
@@ -6543,7 +7814,7 @@
           <p:nvPr/>
         </p:nvPicPr>
         <p:blipFill>
-          <a:blip r:embed="rId2"/>
+          <a:blip r:embed="rId3"/>
           <a:stretch>
             <a:fillRect/>
           </a:stretch>
@@ -6643,7 +7914,7 @@
           <p:nvPr/>
         </p:nvPicPr>
         <p:blipFill>
-          <a:blip r:embed="rId3">
+          <a:blip r:embed="rId4">
             <a:extLst>
               <a:ext uri="{28A0092B-C50C-407E-A947-70E740481C1C}">
                 <a14:useLocalDpi xmlns:a14="http://schemas.microsoft.com/office/drawing/2010/main" val="0"/>
@@ -6812,7 +8083,7 @@
           <p:nvPr/>
         </p:nvPicPr>
         <p:blipFill>
-          <a:blip r:embed="rId2"/>
+          <a:blip r:embed="rId3"/>
           <a:stretch>
             <a:fillRect/>
           </a:stretch>
@@ -6912,7 +8183,7 @@
           <p:nvPr/>
         </p:nvPicPr>
         <p:blipFill>
-          <a:blip r:embed="rId3">
+          <a:blip r:embed="rId4">
             <a:extLst>
               <a:ext uri="{28A0092B-C50C-407E-A947-70E740481C1C}">
                 <a14:useLocalDpi xmlns:a14="http://schemas.microsoft.com/office/drawing/2010/main" val="0"/>
@@ -7081,7 +8352,7 @@
           <p:nvPr/>
         </p:nvPicPr>
         <p:blipFill>
-          <a:blip r:embed="rId2"/>
+          <a:blip r:embed="rId3"/>
           <a:stretch>
             <a:fillRect/>
           </a:stretch>
@@ -7181,7 +8452,7 @@
           <p:nvPr/>
         </p:nvPicPr>
         <p:blipFill>
-          <a:blip r:embed="rId3">
+          <a:blip r:embed="rId4">
             <a:extLst>
               <a:ext uri="{28A0092B-C50C-407E-A947-70E740481C1C}">
                 <a14:useLocalDpi xmlns:a14="http://schemas.microsoft.com/office/drawing/2010/main" val="0"/>
@@ -7268,35 +8539,35 @@
                 <a:gridCol w="894599">
                   <a:extLst>
                     <a:ext uri="{9D8B030D-6E8A-4147-A177-3AD203B41FA5}">
-                      <a16:colId xmlns="" xmlns:a16="http://schemas.microsoft.com/office/drawing/2014/main" val="3950110134"/>
+                      <a16:colId xmlns:a16="http://schemas.microsoft.com/office/drawing/2014/main" xmlns="" val="3950110134"/>
                     </a:ext>
                   </a:extLst>
                 </a:gridCol>
                 <a:gridCol w="2089899">
                   <a:extLst>
                     <a:ext uri="{9D8B030D-6E8A-4147-A177-3AD203B41FA5}">
-                      <a16:colId xmlns="" xmlns:a16="http://schemas.microsoft.com/office/drawing/2014/main" val="3506418350"/>
+                      <a16:colId xmlns:a16="http://schemas.microsoft.com/office/drawing/2014/main" xmlns="" val="3506418350"/>
                     </a:ext>
                   </a:extLst>
                 </a:gridCol>
                 <a:gridCol w="1638300">
                   <a:extLst>
                     <a:ext uri="{9D8B030D-6E8A-4147-A177-3AD203B41FA5}">
-                      <a16:colId xmlns="" xmlns:a16="http://schemas.microsoft.com/office/drawing/2014/main" val="3436258832"/>
+                      <a16:colId xmlns:a16="http://schemas.microsoft.com/office/drawing/2014/main" xmlns="" val="3436258832"/>
                     </a:ext>
                   </a:extLst>
                 </a:gridCol>
                 <a:gridCol w="3924300">
                   <a:extLst>
                     <a:ext uri="{9D8B030D-6E8A-4147-A177-3AD203B41FA5}">
-                      <a16:colId xmlns="" xmlns:a16="http://schemas.microsoft.com/office/drawing/2014/main" val="927178543"/>
+                      <a16:colId xmlns:a16="http://schemas.microsoft.com/office/drawing/2014/main" xmlns="" val="927178543"/>
                     </a:ext>
                   </a:extLst>
                 </a:gridCol>
                 <a:gridCol w="3644900">
                   <a:extLst>
                     <a:ext uri="{9D8B030D-6E8A-4147-A177-3AD203B41FA5}">
-                      <a16:colId xmlns="" xmlns:a16="http://schemas.microsoft.com/office/drawing/2014/main" val="1058635423"/>
+                      <a16:colId xmlns:a16="http://schemas.microsoft.com/office/drawing/2014/main" xmlns="" val="1058635423"/>
                     </a:ext>
                   </a:extLst>
                 </a:gridCol>
@@ -7389,7 +8660,7 @@
                 </a:tc>
                 <a:extLst>
                   <a:ext uri="{0D108BD9-81ED-4DB2-BD59-A6C34878D82A}">
-                    <a16:rowId xmlns="" xmlns:a16="http://schemas.microsoft.com/office/drawing/2014/main" val="2518014868"/>
+                    <a16:rowId xmlns:a16="http://schemas.microsoft.com/office/drawing/2014/main" xmlns="" val="2518014868"/>
                   </a:ext>
                 </a:extLst>
               </a:tr>
@@ -7502,7 +8773,7 @@
                 </a:tc>
                 <a:extLst>
                   <a:ext uri="{0D108BD9-81ED-4DB2-BD59-A6C34878D82A}">
-                    <a16:rowId xmlns="" xmlns:a16="http://schemas.microsoft.com/office/drawing/2014/main" val="1506722424"/>
+                    <a16:rowId xmlns:a16="http://schemas.microsoft.com/office/drawing/2014/main" xmlns="" val="1506722424"/>
                   </a:ext>
                 </a:extLst>
               </a:tr>
@@ -7640,7 +8911,7 @@
                 </a:tc>
                 <a:extLst>
                   <a:ext uri="{0D108BD9-81ED-4DB2-BD59-A6C34878D82A}">
-                    <a16:rowId xmlns="" xmlns:a16="http://schemas.microsoft.com/office/drawing/2014/main" val="1020769687"/>
+                    <a16:rowId xmlns:a16="http://schemas.microsoft.com/office/drawing/2014/main" xmlns="" val="1020769687"/>
                   </a:ext>
                 </a:extLst>
               </a:tr>
@@ -7770,7 +9041,7 @@
                 </a:tc>
                 <a:extLst>
                   <a:ext uri="{0D108BD9-81ED-4DB2-BD59-A6C34878D82A}">
-                    <a16:rowId xmlns="" xmlns:a16="http://schemas.microsoft.com/office/drawing/2014/main" val="4009803894"/>
+                    <a16:rowId xmlns:a16="http://schemas.microsoft.com/office/drawing/2014/main" xmlns="" val="4009803894"/>
                   </a:ext>
                 </a:extLst>
               </a:tr>
@@ -7908,7 +9179,7 @@
                 </a:tc>
                 <a:extLst>
                   <a:ext uri="{0D108BD9-81ED-4DB2-BD59-A6C34878D82A}">
-                    <a16:rowId xmlns="" xmlns:a16="http://schemas.microsoft.com/office/drawing/2014/main" val="3597353604"/>
+                    <a16:rowId xmlns:a16="http://schemas.microsoft.com/office/drawing/2014/main" xmlns="" val="3597353604"/>
                   </a:ext>
                 </a:extLst>
               </a:tr>
@@ -8049,7 +9320,7 @@
                 </a:tc>
                 <a:extLst>
                   <a:ext uri="{0D108BD9-81ED-4DB2-BD59-A6C34878D82A}">
-                    <a16:rowId xmlns="" xmlns:a16="http://schemas.microsoft.com/office/drawing/2014/main" val="905511772"/>
+                    <a16:rowId xmlns:a16="http://schemas.microsoft.com/office/drawing/2014/main" xmlns="" val="905511772"/>
                   </a:ext>
                 </a:extLst>
               </a:tr>
@@ -8190,7 +9461,7 @@
                 </a:tc>
                 <a:extLst>
                   <a:ext uri="{0D108BD9-81ED-4DB2-BD59-A6C34878D82A}">
-                    <a16:rowId xmlns="" xmlns:a16="http://schemas.microsoft.com/office/drawing/2014/main" val="3520352664"/>
+                    <a16:rowId xmlns:a16="http://schemas.microsoft.com/office/drawing/2014/main" xmlns="" val="3520352664"/>
                   </a:ext>
                 </a:extLst>
               </a:tr>
@@ -8334,7 +9605,7 @@
                 </a:tc>
                 <a:extLst>
                   <a:ext uri="{0D108BD9-81ED-4DB2-BD59-A6C34878D82A}">
-                    <a16:rowId xmlns="" xmlns:a16="http://schemas.microsoft.com/office/drawing/2014/main" val="1210360995"/>
+                    <a16:rowId xmlns:a16="http://schemas.microsoft.com/office/drawing/2014/main" xmlns="" val="1210360995"/>
                   </a:ext>
                 </a:extLst>
               </a:tr>
@@ -8465,7 +9736,7 @@
                 </a:tc>
                 <a:extLst>
                   <a:ext uri="{0D108BD9-81ED-4DB2-BD59-A6C34878D82A}">
-                    <a16:rowId xmlns="" xmlns:a16="http://schemas.microsoft.com/office/drawing/2014/main" val="10008"/>
+                    <a16:rowId xmlns:a16="http://schemas.microsoft.com/office/drawing/2014/main" xmlns="" val="10008"/>
                   </a:ext>
                 </a:extLst>
               </a:tr>
@@ -8602,7 +9873,7 @@
                 </a:tc>
                 <a:extLst>
                   <a:ext uri="{0D108BD9-81ED-4DB2-BD59-A6C34878D82A}">
-                    <a16:rowId xmlns="" xmlns:a16="http://schemas.microsoft.com/office/drawing/2014/main" val="10009"/>
+                    <a16:rowId xmlns:a16="http://schemas.microsoft.com/office/drawing/2014/main" xmlns="" val="10009"/>
                   </a:ext>
                 </a:extLst>
               </a:tr>
@@ -9753,35 +11024,35 @@
                 <a:gridCol w="576650">
                   <a:extLst>
                     <a:ext uri="{9D8B030D-6E8A-4147-A177-3AD203B41FA5}">
-                      <a16:colId xmlns="" xmlns:a16="http://schemas.microsoft.com/office/drawing/2014/main" val="3950110134"/>
+                      <a16:colId xmlns:a16="http://schemas.microsoft.com/office/drawing/2014/main" xmlns="" val="3950110134"/>
                     </a:ext>
                   </a:extLst>
                 </a:gridCol>
                 <a:gridCol w="2054479">
                   <a:extLst>
                     <a:ext uri="{9D8B030D-6E8A-4147-A177-3AD203B41FA5}">
-                      <a16:colId xmlns="" xmlns:a16="http://schemas.microsoft.com/office/drawing/2014/main" val="3506418350"/>
+                      <a16:colId xmlns:a16="http://schemas.microsoft.com/office/drawing/2014/main" xmlns="" val="3506418350"/>
                     </a:ext>
                   </a:extLst>
                 </a:gridCol>
                 <a:gridCol w="2040618">
                   <a:extLst>
                     <a:ext uri="{9D8B030D-6E8A-4147-A177-3AD203B41FA5}">
-                      <a16:colId xmlns="" xmlns:a16="http://schemas.microsoft.com/office/drawing/2014/main" val="3436258832"/>
+                      <a16:colId xmlns:a16="http://schemas.microsoft.com/office/drawing/2014/main" xmlns="" val="3436258832"/>
                     </a:ext>
                   </a:extLst>
                 </a:gridCol>
                 <a:gridCol w="2805848">
                   <a:extLst>
                     <a:ext uri="{9D8B030D-6E8A-4147-A177-3AD203B41FA5}">
-                      <a16:colId xmlns="" xmlns:a16="http://schemas.microsoft.com/office/drawing/2014/main" val="927178543"/>
+                      <a16:colId xmlns:a16="http://schemas.microsoft.com/office/drawing/2014/main" xmlns="" val="927178543"/>
                     </a:ext>
                   </a:extLst>
                 </a:gridCol>
                 <a:gridCol w="2671081">
                   <a:extLst>
                     <a:ext uri="{9D8B030D-6E8A-4147-A177-3AD203B41FA5}">
-                      <a16:colId xmlns="" xmlns:a16="http://schemas.microsoft.com/office/drawing/2014/main" val="1058635423"/>
+                      <a16:colId xmlns:a16="http://schemas.microsoft.com/office/drawing/2014/main" xmlns="" val="1058635423"/>
                     </a:ext>
                   </a:extLst>
                 </a:gridCol>
@@ -9874,7 +11145,7 @@
                 </a:tc>
                 <a:extLst>
                   <a:ext uri="{0D108BD9-81ED-4DB2-BD59-A6C34878D82A}">
-                    <a16:rowId xmlns="" xmlns:a16="http://schemas.microsoft.com/office/drawing/2014/main" val="2518014868"/>
+                    <a16:rowId xmlns:a16="http://schemas.microsoft.com/office/drawing/2014/main" xmlns="" val="2518014868"/>
                   </a:ext>
                 </a:extLst>
               </a:tr>
@@ -9970,7 +11241,7 @@
                 </a:tc>
                 <a:extLst>
                   <a:ext uri="{0D108BD9-81ED-4DB2-BD59-A6C34878D82A}">
-                    <a16:rowId xmlns="" xmlns:a16="http://schemas.microsoft.com/office/drawing/2014/main" val="1020769687"/>
+                    <a16:rowId xmlns:a16="http://schemas.microsoft.com/office/drawing/2014/main" xmlns="" val="1020769687"/>
                   </a:ext>
                 </a:extLst>
               </a:tr>
@@ -10082,7 +11353,7 @@
                 </a:tc>
                 <a:extLst>
                   <a:ext uri="{0D108BD9-81ED-4DB2-BD59-A6C34878D82A}">
-                    <a16:rowId xmlns="" xmlns:a16="http://schemas.microsoft.com/office/drawing/2014/main" val="4009803894"/>
+                    <a16:rowId xmlns:a16="http://schemas.microsoft.com/office/drawing/2014/main" xmlns="" val="4009803894"/>
                   </a:ext>
                 </a:extLst>
               </a:tr>
@@ -10179,7 +11450,7 @@
                 </a:tc>
                 <a:extLst>
                   <a:ext uri="{0D108BD9-81ED-4DB2-BD59-A6C34878D82A}">
-                    <a16:rowId xmlns="" xmlns:a16="http://schemas.microsoft.com/office/drawing/2014/main" val="3597353604"/>
+                    <a16:rowId xmlns:a16="http://schemas.microsoft.com/office/drawing/2014/main" xmlns="" val="3597353604"/>
                   </a:ext>
                 </a:extLst>
               </a:tr>
@@ -10620,28 +11891,28 @@
                 <a:gridCol w="1138213">
                   <a:extLst>
                     <a:ext uri="{9D8B030D-6E8A-4147-A177-3AD203B41FA5}">
-                      <a16:colId xmlns="" xmlns:a16="http://schemas.microsoft.com/office/drawing/2014/main" val="3950110134"/>
+                      <a16:colId xmlns:a16="http://schemas.microsoft.com/office/drawing/2014/main" xmlns="" val="3950110134"/>
                     </a:ext>
                   </a:extLst>
                 </a:gridCol>
                 <a:gridCol w="1876812">
                   <a:extLst>
                     <a:ext uri="{9D8B030D-6E8A-4147-A177-3AD203B41FA5}">
-                      <a16:colId xmlns="" xmlns:a16="http://schemas.microsoft.com/office/drawing/2014/main" val="3506418350"/>
+                      <a16:colId xmlns:a16="http://schemas.microsoft.com/office/drawing/2014/main" xmlns="" val="3506418350"/>
                     </a:ext>
                   </a:extLst>
                 </a:gridCol>
                 <a:gridCol w="4834253">
                   <a:extLst>
                     <a:ext uri="{9D8B030D-6E8A-4147-A177-3AD203B41FA5}">
-                      <a16:colId xmlns="" xmlns:a16="http://schemas.microsoft.com/office/drawing/2014/main" val="927178543"/>
+                      <a16:colId xmlns:a16="http://schemas.microsoft.com/office/drawing/2014/main" xmlns="" val="927178543"/>
                     </a:ext>
                   </a:extLst>
                 </a:gridCol>
                 <a:gridCol w="3355532">
                   <a:extLst>
                     <a:ext uri="{9D8B030D-6E8A-4147-A177-3AD203B41FA5}">
-                      <a16:colId xmlns="" xmlns:a16="http://schemas.microsoft.com/office/drawing/2014/main" val="1058635423"/>
+                      <a16:colId xmlns:a16="http://schemas.microsoft.com/office/drawing/2014/main" xmlns="" val="1058635423"/>
                     </a:ext>
                   </a:extLst>
                 </a:gridCol>
@@ -10718,7 +11989,7 @@
                 </a:tc>
                 <a:extLst>
                   <a:ext uri="{0D108BD9-81ED-4DB2-BD59-A6C34878D82A}">
-                    <a16:rowId xmlns="" xmlns:a16="http://schemas.microsoft.com/office/drawing/2014/main" val="2518014868"/>
+                    <a16:rowId xmlns:a16="http://schemas.microsoft.com/office/drawing/2014/main" xmlns="" val="2518014868"/>
                   </a:ext>
                 </a:extLst>
               </a:tr>
@@ -10797,7 +12068,7 @@
                 </a:tc>
                 <a:extLst>
                   <a:ext uri="{0D108BD9-81ED-4DB2-BD59-A6C34878D82A}">
-                    <a16:rowId xmlns="" xmlns:a16="http://schemas.microsoft.com/office/drawing/2014/main" val="1506722424"/>
+                    <a16:rowId xmlns:a16="http://schemas.microsoft.com/office/drawing/2014/main" xmlns="" val="1506722424"/>
                   </a:ext>
                 </a:extLst>
               </a:tr>
@@ -10909,7 +12180,7 @@
                 </a:tc>
                 <a:extLst>
                   <a:ext uri="{0D108BD9-81ED-4DB2-BD59-A6C34878D82A}">
-                    <a16:rowId xmlns="" xmlns:a16="http://schemas.microsoft.com/office/drawing/2014/main" val="1020769687"/>
+                    <a16:rowId xmlns:a16="http://schemas.microsoft.com/office/drawing/2014/main" xmlns="" val="1020769687"/>
                   </a:ext>
                 </a:extLst>
               </a:tr>
@@ -11017,7 +12288,7 @@
                 </a:tc>
                 <a:extLst>
                   <a:ext uri="{0D108BD9-81ED-4DB2-BD59-A6C34878D82A}">
-                    <a16:rowId xmlns="" xmlns:a16="http://schemas.microsoft.com/office/drawing/2014/main" val="4009803894"/>
+                    <a16:rowId xmlns:a16="http://schemas.microsoft.com/office/drawing/2014/main" xmlns="" val="4009803894"/>
                   </a:ext>
                 </a:extLst>
               </a:tr>
@@ -11104,7 +12375,7 @@
                 </a:tc>
                 <a:extLst>
                   <a:ext uri="{0D108BD9-81ED-4DB2-BD59-A6C34878D82A}">
-                    <a16:rowId xmlns="" xmlns:a16="http://schemas.microsoft.com/office/drawing/2014/main" val="3597353604"/>
+                    <a16:rowId xmlns:a16="http://schemas.microsoft.com/office/drawing/2014/main" xmlns="" val="3597353604"/>
                   </a:ext>
                 </a:extLst>
               </a:tr>
@@ -11183,7 +12454,7 @@
                 </a:tc>
                 <a:extLst>
                   <a:ext uri="{0D108BD9-81ED-4DB2-BD59-A6C34878D82A}">
-                    <a16:rowId xmlns="" xmlns:a16="http://schemas.microsoft.com/office/drawing/2014/main" val="905511772"/>
+                    <a16:rowId xmlns:a16="http://schemas.microsoft.com/office/drawing/2014/main" xmlns="" val="905511772"/>
                   </a:ext>
                 </a:extLst>
               </a:tr>
@@ -11286,7 +12557,7 @@
                 </a:tc>
                 <a:extLst>
                   <a:ext uri="{0D108BD9-81ED-4DB2-BD59-A6C34878D82A}">
-                    <a16:rowId xmlns="" xmlns:a16="http://schemas.microsoft.com/office/drawing/2014/main" val="3520352664"/>
+                    <a16:rowId xmlns:a16="http://schemas.microsoft.com/office/drawing/2014/main" xmlns="" val="3520352664"/>
                   </a:ext>
                 </a:extLst>
               </a:tr>
@@ -11377,7 +12648,7 @@
                 </a:tc>
                 <a:extLst>
                   <a:ext uri="{0D108BD9-81ED-4DB2-BD59-A6C34878D82A}">
-                    <a16:rowId xmlns="" xmlns:a16="http://schemas.microsoft.com/office/drawing/2014/main" val="1210360995"/>
+                    <a16:rowId xmlns:a16="http://schemas.microsoft.com/office/drawing/2014/main" xmlns="" val="1210360995"/>
                   </a:ext>
                 </a:extLst>
               </a:tr>
@@ -11559,28 +12830,28 @@
                 <a:gridCol w="771286">
                   <a:extLst>
                     <a:ext uri="{9D8B030D-6E8A-4147-A177-3AD203B41FA5}">
-                      <a16:colId xmlns="" xmlns:a16="http://schemas.microsoft.com/office/drawing/2014/main" val="3950110134"/>
+                      <a16:colId xmlns:a16="http://schemas.microsoft.com/office/drawing/2014/main" xmlns="" val="3950110134"/>
                     </a:ext>
                   </a:extLst>
                 </a:gridCol>
                 <a:gridCol w="1944243">
                   <a:extLst>
                     <a:ext uri="{9D8B030D-6E8A-4147-A177-3AD203B41FA5}">
-                      <a16:colId xmlns="" xmlns:a16="http://schemas.microsoft.com/office/drawing/2014/main" val="3506418350"/>
+                      <a16:colId xmlns:a16="http://schemas.microsoft.com/office/drawing/2014/main" xmlns="" val="3506418350"/>
                     </a:ext>
                   </a:extLst>
                 </a:gridCol>
                 <a:gridCol w="3520131">
                   <a:extLst>
                     <a:ext uri="{9D8B030D-6E8A-4147-A177-3AD203B41FA5}">
-                      <a16:colId xmlns="" xmlns:a16="http://schemas.microsoft.com/office/drawing/2014/main" val="927178543"/>
+                      <a16:colId xmlns:a16="http://schemas.microsoft.com/office/drawing/2014/main" xmlns="" val="927178543"/>
                     </a:ext>
                   </a:extLst>
                 </a:gridCol>
                 <a:gridCol w="5354493">
                   <a:extLst>
                     <a:ext uri="{9D8B030D-6E8A-4147-A177-3AD203B41FA5}">
-                      <a16:colId xmlns="" xmlns:a16="http://schemas.microsoft.com/office/drawing/2014/main" val="1058635423"/>
+                      <a16:colId xmlns:a16="http://schemas.microsoft.com/office/drawing/2014/main" xmlns="" val="1058635423"/>
                     </a:ext>
                   </a:extLst>
                 </a:gridCol>
@@ -11657,7 +12928,7 @@
                 </a:tc>
                 <a:extLst>
                   <a:ext uri="{0D108BD9-81ED-4DB2-BD59-A6C34878D82A}">
-                    <a16:rowId xmlns="" xmlns:a16="http://schemas.microsoft.com/office/drawing/2014/main" val="2518014868"/>
+                    <a16:rowId xmlns:a16="http://schemas.microsoft.com/office/drawing/2014/main" xmlns="" val="2518014868"/>
                   </a:ext>
                 </a:extLst>
               </a:tr>
@@ -11740,7 +13011,7 @@
                 </a:tc>
                 <a:extLst>
                   <a:ext uri="{0D108BD9-81ED-4DB2-BD59-A6C34878D82A}">
-                    <a16:rowId xmlns="" xmlns:a16="http://schemas.microsoft.com/office/drawing/2014/main" val="1506722424"/>
+                    <a16:rowId xmlns:a16="http://schemas.microsoft.com/office/drawing/2014/main" xmlns="" val="1506722424"/>
                   </a:ext>
                 </a:extLst>
               </a:tr>
@@ -11831,7 +13102,7 @@
                 </a:tc>
                 <a:extLst>
                   <a:ext uri="{0D108BD9-81ED-4DB2-BD59-A6C34878D82A}">
-                    <a16:rowId xmlns="" xmlns:a16="http://schemas.microsoft.com/office/drawing/2014/main" val="1020769687"/>
+                    <a16:rowId xmlns:a16="http://schemas.microsoft.com/office/drawing/2014/main" xmlns="" val="1020769687"/>
                   </a:ext>
                 </a:extLst>
               </a:tr>
@@ -11918,7 +13189,7 @@
                 </a:tc>
                 <a:extLst>
                   <a:ext uri="{0D108BD9-81ED-4DB2-BD59-A6C34878D82A}">
-                    <a16:rowId xmlns="" xmlns:a16="http://schemas.microsoft.com/office/drawing/2014/main" val="4009803894"/>
+                    <a16:rowId xmlns:a16="http://schemas.microsoft.com/office/drawing/2014/main" xmlns="" val="4009803894"/>
                   </a:ext>
                 </a:extLst>
               </a:tr>
@@ -12005,7 +13276,7 @@
                 </a:tc>
                 <a:extLst>
                   <a:ext uri="{0D108BD9-81ED-4DB2-BD59-A6C34878D82A}">
-                    <a16:rowId xmlns="" xmlns:a16="http://schemas.microsoft.com/office/drawing/2014/main" val="3597353604"/>
+                    <a16:rowId xmlns:a16="http://schemas.microsoft.com/office/drawing/2014/main" xmlns="" val="3597353604"/>
                   </a:ext>
                 </a:extLst>
               </a:tr>
@@ -12108,7 +13379,7 @@
                 </a:tc>
                 <a:extLst>
                   <a:ext uri="{0D108BD9-81ED-4DB2-BD59-A6C34878D82A}">
-                    <a16:rowId xmlns="" xmlns:a16="http://schemas.microsoft.com/office/drawing/2014/main" val="905511772"/>
+                    <a16:rowId xmlns:a16="http://schemas.microsoft.com/office/drawing/2014/main" xmlns="" val="905511772"/>
                   </a:ext>
                 </a:extLst>
               </a:tr>
@@ -12203,7 +13474,7 @@
                 </a:tc>
                 <a:extLst>
                   <a:ext uri="{0D108BD9-81ED-4DB2-BD59-A6C34878D82A}">
-                    <a16:rowId xmlns="" xmlns:a16="http://schemas.microsoft.com/office/drawing/2014/main" val="3520352664"/>
+                    <a16:rowId xmlns:a16="http://schemas.microsoft.com/office/drawing/2014/main" xmlns="" val="3520352664"/>
                   </a:ext>
                 </a:extLst>
               </a:tr>
@@ -12405,28 +13676,28 @@
                 <a:gridCol w="832514">
                   <a:extLst>
                     <a:ext uri="{9D8B030D-6E8A-4147-A177-3AD203B41FA5}">
-                      <a16:colId xmlns="" xmlns:a16="http://schemas.microsoft.com/office/drawing/2014/main" val="3950110134"/>
+                      <a16:colId xmlns:a16="http://schemas.microsoft.com/office/drawing/2014/main" xmlns="" val="3950110134"/>
                     </a:ext>
                   </a:extLst>
                 </a:gridCol>
                 <a:gridCol w="1867511">
                   <a:extLst>
                     <a:ext uri="{9D8B030D-6E8A-4147-A177-3AD203B41FA5}">
-                      <a16:colId xmlns="" xmlns:a16="http://schemas.microsoft.com/office/drawing/2014/main" val="3506418350"/>
+                      <a16:colId xmlns:a16="http://schemas.microsoft.com/office/drawing/2014/main" xmlns="" val="3506418350"/>
                     </a:ext>
                   </a:extLst>
                 </a:gridCol>
                 <a:gridCol w="2990615">
                   <a:extLst>
                     <a:ext uri="{9D8B030D-6E8A-4147-A177-3AD203B41FA5}">
-                      <a16:colId xmlns="" xmlns:a16="http://schemas.microsoft.com/office/drawing/2014/main" val="927178543"/>
+                      <a16:colId xmlns:a16="http://schemas.microsoft.com/office/drawing/2014/main" xmlns="" val="927178543"/>
                     </a:ext>
                   </a:extLst>
                 </a:gridCol>
                 <a:gridCol w="4586125">
                   <a:extLst>
                     <a:ext uri="{9D8B030D-6E8A-4147-A177-3AD203B41FA5}">
-                      <a16:colId xmlns="" xmlns:a16="http://schemas.microsoft.com/office/drawing/2014/main" val="1058635423"/>
+                      <a16:colId xmlns:a16="http://schemas.microsoft.com/office/drawing/2014/main" xmlns="" val="1058635423"/>
                     </a:ext>
                   </a:extLst>
                 </a:gridCol>
@@ -12503,7 +13774,7 @@
                 </a:tc>
                 <a:extLst>
                   <a:ext uri="{0D108BD9-81ED-4DB2-BD59-A6C34878D82A}">
-                    <a16:rowId xmlns="" xmlns:a16="http://schemas.microsoft.com/office/drawing/2014/main" val="2518014868"/>
+                    <a16:rowId xmlns:a16="http://schemas.microsoft.com/office/drawing/2014/main" xmlns="" val="2518014868"/>
                   </a:ext>
                 </a:extLst>
               </a:tr>
@@ -12590,7 +13861,7 @@
                 </a:tc>
                 <a:extLst>
                   <a:ext uri="{0D108BD9-81ED-4DB2-BD59-A6C34878D82A}">
-                    <a16:rowId xmlns="" xmlns:a16="http://schemas.microsoft.com/office/drawing/2014/main" val="905511772"/>
+                    <a16:rowId xmlns:a16="http://schemas.microsoft.com/office/drawing/2014/main" xmlns="" val="905511772"/>
                   </a:ext>
                 </a:extLst>
               </a:tr>
@@ -12665,7 +13936,7 @@
                 </a:tc>
                 <a:extLst>
                   <a:ext uri="{0D108BD9-81ED-4DB2-BD59-A6C34878D82A}">
-                    <a16:rowId xmlns="" xmlns:a16="http://schemas.microsoft.com/office/drawing/2014/main" val="3520352664"/>
+                    <a16:rowId xmlns:a16="http://schemas.microsoft.com/office/drawing/2014/main" xmlns="" val="3520352664"/>
                   </a:ext>
                 </a:extLst>
               </a:tr>
@@ -12740,7 +14011,7 @@
                 </a:tc>
                 <a:extLst>
                   <a:ext uri="{0D108BD9-81ED-4DB2-BD59-A6C34878D82A}">
-                    <a16:rowId xmlns="" xmlns:a16="http://schemas.microsoft.com/office/drawing/2014/main" val="1210360995"/>
+                    <a16:rowId xmlns:a16="http://schemas.microsoft.com/office/drawing/2014/main" xmlns="" val="1210360995"/>
                   </a:ext>
                 </a:extLst>
               </a:tr>
@@ -14282,21 +15553,21 @@
                 <a:gridCol w="5018222">
                   <a:extLst>
                     <a:ext uri="{9D8B030D-6E8A-4147-A177-3AD203B41FA5}">
-                      <a16:colId xmlns="" xmlns:a16="http://schemas.microsoft.com/office/drawing/2014/main" val="20000"/>
+                      <a16:colId xmlns:a16="http://schemas.microsoft.com/office/drawing/2014/main" xmlns="" val="20000"/>
                     </a:ext>
                   </a:extLst>
                 </a:gridCol>
                 <a:gridCol w="2500314">
                   <a:extLst>
                     <a:ext uri="{9D8B030D-6E8A-4147-A177-3AD203B41FA5}">
-                      <a16:colId xmlns="" xmlns:a16="http://schemas.microsoft.com/office/drawing/2014/main" val="20001"/>
+                      <a16:colId xmlns:a16="http://schemas.microsoft.com/office/drawing/2014/main" xmlns="" val="20001"/>
                     </a:ext>
                   </a:extLst>
                 </a:gridCol>
                 <a:gridCol w="2200276">
                   <a:extLst>
                     <a:ext uri="{9D8B030D-6E8A-4147-A177-3AD203B41FA5}">
-                      <a16:colId xmlns="" xmlns:a16="http://schemas.microsoft.com/office/drawing/2014/main" val="20002"/>
+                      <a16:colId xmlns:a16="http://schemas.microsoft.com/office/drawing/2014/main" xmlns="" val="20002"/>
                     </a:ext>
                   </a:extLst>
                 </a:gridCol>
@@ -14346,7 +15617,7 @@
                 </a:tc>
                 <a:extLst>
                   <a:ext uri="{0D108BD9-81ED-4DB2-BD59-A6C34878D82A}">
-                    <a16:rowId xmlns="" xmlns:a16="http://schemas.microsoft.com/office/drawing/2014/main" val="10000"/>
+                    <a16:rowId xmlns:a16="http://schemas.microsoft.com/office/drawing/2014/main" xmlns="" val="10000"/>
                   </a:ext>
                 </a:extLst>
               </a:tr>
@@ -14421,7 +15692,7 @@
                 </a:tc>
                 <a:extLst>
                   <a:ext uri="{0D108BD9-81ED-4DB2-BD59-A6C34878D82A}">
-                    <a16:rowId xmlns="" xmlns:a16="http://schemas.microsoft.com/office/drawing/2014/main" val="10001"/>
+                    <a16:rowId xmlns:a16="http://schemas.microsoft.com/office/drawing/2014/main" xmlns="" val="10001"/>
                   </a:ext>
                 </a:extLst>
               </a:tr>
@@ -14491,7 +15762,7 @@
                 </a:tc>
                 <a:extLst>
                   <a:ext uri="{0D108BD9-81ED-4DB2-BD59-A6C34878D82A}">
-                    <a16:rowId xmlns="" xmlns:a16="http://schemas.microsoft.com/office/drawing/2014/main" val="10002"/>
+                    <a16:rowId xmlns:a16="http://schemas.microsoft.com/office/drawing/2014/main" xmlns="" val="10002"/>
                   </a:ext>
                 </a:extLst>
               </a:tr>
@@ -14562,7 +15833,7 @@
                 </a:tc>
                 <a:extLst>
                   <a:ext uri="{0D108BD9-81ED-4DB2-BD59-A6C34878D82A}">
-                    <a16:rowId xmlns="" xmlns:a16="http://schemas.microsoft.com/office/drawing/2014/main" val="10003"/>
+                    <a16:rowId xmlns:a16="http://schemas.microsoft.com/office/drawing/2014/main" xmlns="" val="10003"/>
                   </a:ext>
                 </a:extLst>
               </a:tr>
@@ -14632,7 +15903,7 @@
                 </a:tc>
                 <a:extLst>
                   <a:ext uri="{0D108BD9-81ED-4DB2-BD59-A6C34878D82A}">
-                    <a16:rowId xmlns="" xmlns:a16="http://schemas.microsoft.com/office/drawing/2014/main" val="10004"/>
+                    <a16:rowId xmlns:a16="http://schemas.microsoft.com/office/drawing/2014/main" xmlns="" val="10004"/>
                   </a:ext>
                 </a:extLst>
               </a:tr>
@@ -14698,7 +15969,7 @@
                 </a:tc>
                 <a:extLst>
                   <a:ext uri="{0D108BD9-81ED-4DB2-BD59-A6C34878D82A}">
-                    <a16:rowId xmlns="" xmlns:a16="http://schemas.microsoft.com/office/drawing/2014/main" val="10005"/>
+                    <a16:rowId xmlns:a16="http://schemas.microsoft.com/office/drawing/2014/main" xmlns="" val="10005"/>
                   </a:ext>
                 </a:extLst>
               </a:tr>
@@ -14765,7 +16036,7 @@
                 </a:tc>
                 <a:extLst>
                   <a:ext uri="{0D108BD9-81ED-4DB2-BD59-A6C34878D82A}">
-                    <a16:rowId xmlns="" xmlns:a16="http://schemas.microsoft.com/office/drawing/2014/main" val="10006"/>
+                    <a16:rowId xmlns:a16="http://schemas.microsoft.com/office/drawing/2014/main" xmlns="" val="10006"/>
                   </a:ext>
                 </a:extLst>
               </a:tr>
@@ -14827,7 +16098,7 @@
                 </a:tc>
                 <a:extLst>
                   <a:ext uri="{0D108BD9-81ED-4DB2-BD59-A6C34878D82A}">
-                    <a16:rowId xmlns="" xmlns:a16="http://schemas.microsoft.com/office/drawing/2014/main" val="10007"/>
+                    <a16:rowId xmlns:a16="http://schemas.microsoft.com/office/drawing/2014/main" xmlns="" val="10007"/>
                   </a:ext>
                 </a:extLst>
               </a:tr>
@@ -17191,7 +18462,7 @@
           <p:nvPr/>
         </p:nvPicPr>
         <p:blipFill>
-          <a:blip r:embed="rId2"/>
+          <a:blip r:embed="rId3"/>
           <a:stretch>
             <a:fillRect/>
           </a:stretch>
@@ -17291,7 +18562,7 @@
           <p:nvPr/>
         </p:nvPicPr>
         <p:blipFill>
-          <a:blip r:embed="rId3">
+          <a:blip r:embed="rId4">
             <a:extLst>
               <a:ext uri="{28A0092B-C50C-407E-A947-70E740481C1C}">
                 <a14:useLocalDpi xmlns:a14="http://schemas.microsoft.com/office/drawing/2010/main" val="0"/>
@@ -17445,7 +18716,7 @@
           <p:nvPr/>
         </p:nvPicPr>
         <p:blipFill>
-          <a:blip r:embed="rId2"/>
+          <a:blip r:embed="rId3"/>
           <a:stretch>
             <a:fillRect/>
           </a:stretch>
@@ -17545,7 +18816,7 @@
           <p:nvPr/>
         </p:nvPicPr>
         <p:blipFill>
-          <a:blip r:embed="rId3">
+          <a:blip r:embed="rId4">
             <a:extLst>
               <a:ext uri="{28A0092B-C50C-407E-A947-70E740481C1C}">
                 <a14:useLocalDpi xmlns:a14="http://schemas.microsoft.com/office/drawing/2010/main" val="0"/>
@@ -17699,7 +18970,7 @@
           <p:nvPr/>
         </p:nvPicPr>
         <p:blipFill>
-          <a:blip r:embed="rId2"/>
+          <a:blip r:embed="rId3"/>
           <a:stretch>
             <a:fillRect/>
           </a:stretch>
@@ -17799,7 +19070,7 @@
           <p:nvPr/>
         </p:nvPicPr>
         <p:blipFill>
-          <a:blip r:embed="rId3">
+          <a:blip r:embed="rId4">
             <a:extLst>
               <a:ext uri="{28A0092B-C50C-407E-A947-70E740481C1C}">
                 <a14:useLocalDpi xmlns:a14="http://schemas.microsoft.com/office/drawing/2010/main" val="0"/>

</xml_diff>